<commit_message>
Extra info in Week 5 PPT
</commit_message>
<xml_diff>
--- a/PPTs/Week5.pptx
+++ b/PPTs/Week5.pptx
@@ -9,12 +9,18 @@
     <p:sldId id="257" r:id="rId3"/>
     <p:sldId id="258" r:id="rId4"/>
     <p:sldId id="259" r:id="rId5"/>
-    <p:sldId id="260" r:id="rId6"/>
-    <p:sldId id="261" r:id="rId7"/>
-    <p:sldId id="262" r:id="rId8"/>
-    <p:sldId id="263" r:id="rId9"/>
-    <p:sldId id="264" r:id="rId10"/>
-    <p:sldId id="265" r:id="rId11"/>
+    <p:sldId id="266" r:id="rId6"/>
+    <p:sldId id="260" r:id="rId7"/>
+    <p:sldId id="261" r:id="rId8"/>
+    <p:sldId id="267" r:id="rId9"/>
+    <p:sldId id="268" r:id="rId10"/>
+    <p:sldId id="269" r:id="rId11"/>
+    <p:sldId id="270" r:id="rId12"/>
+    <p:sldId id="271" r:id="rId13"/>
+    <p:sldId id="262" r:id="rId14"/>
+    <p:sldId id="263" r:id="rId15"/>
+    <p:sldId id="264" r:id="rId16"/>
+    <p:sldId id="265" r:id="rId17"/>
   </p:sldIdLst>
   <p:sldSz cx="12192000" cy="6858000"/>
   <p:notesSz cx="6858000" cy="9144000"/>
@@ -456,7 +462,7 @@
           <a:p>
             <a:fld id="{911D48D3-D9A0-44A7-B806-1FECC2308CB0}" type="datetimeFigureOut">
               <a:rPr lang="en-CA" smtClean="0"/>
-              <a:t>2022-07-18</a:t>
+              <a:t>2022-07-21</a:t>
             </a:fld>
             <a:endParaRPr lang="en-CA"/>
           </a:p>
@@ -1544,7 +1550,7 @@
           <a:p>
             <a:fld id="{911D48D3-D9A0-44A7-B806-1FECC2308CB0}" type="datetimeFigureOut">
               <a:rPr lang="en-CA" smtClean="0"/>
-              <a:t>2022-07-18</a:t>
+              <a:t>2022-07-21</a:t>
             </a:fld>
             <a:endParaRPr lang="en-CA"/>
           </a:p>
@@ -2524,7 +2530,7 @@
           <a:p>
             <a:fld id="{911D48D3-D9A0-44A7-B806-1FECC2308CB0}" type="datetimeFigureOut">
               <a:rPr lang="en-CA" smtClean="0"/>
-              <a:t>2022-07-18</a:t>
+              <a:t>2022-07-21</a:t>
             </a:fld>
             <a:endParaRPr lang="en-CA"/>
           </a:p>
@@ -3658,7 +3664,7 @@
           <a:p>
             <a:fld id="{911D48D3-D9A0-44A7-B806-1FECC2308CB0}" type="datetimeFigureOut">
               <a:rPr lang="en-CA" smtClean="0"/>
-              <a:t>2022-07-18</a:t>
+              <a:t>2022-07-21</a:t>
             </a:fld>
             <a:endParaRPr lang="en-CA"/>
           </a:p>
@@ -4691,7 +4697,7 @@
           <a:p>
             <a:fld id="{911D48D3-D9A0-44A7-B806-1FECC2308CB0}" type="datetimeFigureOut">
               <a:rPr lang="en-CA" smtClean="0"/>
-              <a:t>2022-07-18</a:t>
+              <a:t>2022-07-21</a:t>
             </a:fld>
             <a:endParaRPr lang="en-CA"/>
           </a:p>
@@ -5351,7 +5357,7 @@
           <a:p>
             <a:fld id="{911D48D3-D9A0-44A7-B806-1FECC2308CB0}" type="datetimeFigureOut">
               <a:rPr lang="en-CA" smtClean="0"/>
-              <a:t>2022-07-18</a:t>
+              <a:t>2022-07-21</a:t>
             </a:fld>
             <a:endParaRPr lang="en-CA"/>
           </a:p>
@@ -6212,7 +6218,7 @@
           <a:p>
             <a:fld id="{911D48D3-D9A0-44A7-B806-1FECC2308CB0}" type="datetimeFigureOut">
               <a:rPr lang="en-CA" smtClean="0"/>
-              <a:t>2022-07-18</a:t>
+              <a:t>2022-07-21</a:t>
             </a:fld>
             <a:endParaRPr lang="en-CA"/>
           </a:p>
@@ -6402,7 +6408,7 @@
           <a:p>
             <a:fld id="{911D48D3-D9A0-44A7-B806-1FECC2308CB0}" type="datetimeFigureOut">
               <a:rPr lang="en-CA" smtClean="0"/>
-              <a:t>2022-07-18</a:t>
+              <a:t>2022-07-21</a:t>
             </a:fld>
             <a:endParaRPr lang="en-CA"/>
           </a:p>
@@ -7374,7 +7380,7 @@
           <a:p>
             <a:fld id="{911D48D3-D9A0-44A7-B806-1FECC2308CB0}" type="datetimeFigureOut">
               <a:rPr lang="en-CA" smtClean="0"/>
-              <a:t>2022-07-18</a:t>
+              <a:t>2022-07-21</a:t>
             </a:fld>
             <a:endParaRPr lang="en-CA"/>
           </a:p>
@@ -7585,7 +7591,7 @@
           <a:p>
             <a:fld id="{911D48D3-D9A0-44A7-B806-1FECC2308CB0}" type="datetimeFigureOut">
               <a:rPr lang="en-CA" smtClean="0"/>
-              <a:t>2022-07-18</a:t>
+              <a:t>2022-07-21</a:t>
             </a:fld>
             <a:endParaRPr lang="en-CA"/>
           </a:p>
@@ -8619,7 +8625,7 @@
           <a:p>
             <a:fld id="{911D48D3-D9A0-44A7-B806-1FECC2308CB0}" type="datetimeFigureOut">
               <a:rPr lang="en-CA" smtClean="0"/>
-              <a:t>2022-07-18</a:t>
+              <a:t>2022-07-21</a:t>
             </a:fld>
             <a:endParaRPr lang="en-CA"/>
           </a:p>
@@ -8891,7 +8897,7 @@
           <a:p>
             <a:fld id="{911D48D3-D9A0-44A7-B806-1FECC2308CB0}" type="datetimeFigureOut">
               <a:rPr lang="en-CA" smtClean="0"/>
-              <a:t>2022-07-18</a:t>
+              <a:t>2022-07-21</a:t>
             </a:fld>
             <a:endParaRPr lang="en-CA"/>
           </a:p>
@@ -9301,7 +9307,7 @@
           <a:p>
             <a:fld id="{911D48D3-D9A0-44A7-B806-1FECC2308CB0}" type="datetimeFigureOut">
               <a:rPr lang="en-CA" smtClean="0"/>
-              <a:t>2022-07-18</a:t>
+              <a:t>2022-07-21</a:t>
             </a:fld>
             <a:endParaRPr lang="en-CA"/>
           </a:p>
@@ -9428,7 +9434,7 @@
           <a:p>
             <a:fld id="{911D48D3-D9A0-44A7-B806-1FECC2308CB0}" type="datetimeFigureOut">
               <a:rPr lang="en-CA" smtClean="0"/>
-              <a:t>2022-07-18</a:t>
+              <a:t>2022-07-21</a:t>
             </a:fld>
             <a:endParaRPr lang="en-CA"/>
           </a:p>
@@ -9523,7 +9529,7 @@
           <a:p>
             <a:fld id="{911D48D3-D9A0-44A7-B806-1FECC2308CB0}" type="datetimeFigureOut">
               <a:rPr lang="en-CA" smtClean="0"/>
-              <a:t>2022-07-18</a:t>
+              <a:t>2022-07-21</a:t>
             </a:fld>
             <a:endParaRPr lang="en-CA"/>
           </a:p>
@@ -10604,7 +10610,7 @@
           <a:p>
             <a:fld id="{911D48D3-D9A0-44A7-B806-1FECC2308CB0}" type="datetimeFigureOut">
               <a:rPr lang="en-CA" smtClean="0"/>
-              <a:t>2022-07-18</a:t>
+              <a:t>2022-07-21</a:t>
             </a:fld>
             <a:endParaRPr lang="en-CA"/>
           </a:p>
@@ -11712,7 +11718,7 @@
           <a:p>
             <a:fld id="{911D48D3-D9A0-44A7-B806-1FECC2308CB0}" type="datetimeFigureOut">
               <a:rPr lang="en-CA" smtClean="0"/>
-              <a:t>2022-07-18</a:t>
+              <a:t>2022-07-21</a:t>
             </a:fld>
             <a:endParaRPr lang="en-CA"/>
           </a:p>
@@ -12709,7 +12715,7 @@
           <a:p>
             <a:fld id="{911D48D3-D9A0-44A7-B806-1FECC2308CB0}" type="datetimeFigureOut">
               <a:rPr lang="en-CA" smtClean="0"/>
-              <a:t>2022-07-18</a:t>
+              <a:t>2022-07-21</a:t>
             </a:fld>
             <a:endParaRPr lang="en-CA"/>
           </a:p>
@@ -13568,7 +13574,7 @@
           <p:cNvPr id="2" name="Title 1">
             <a:extLst>
               <a:ext uri="{FF2B5EF4-FFF2-40B4-BE49-F238E27FC236}">
-                <a16:creationId xmlns:a16="http://schemas.microsoft.com/office/drawing/2014/main" id="{6A52CF54-D915-A114-0276-6693824C14E1}"/>
+                <a16:creationId xmlns:a16="http://schemas.microsoft.com/office/drawing/2014/main" id="{B1BD4189-C187-134F-D29F-1F792A1B6DE4}"/>
               </a:ext>
             </a:extLst>
           </p:cNvPr>
@@ -13585,9 +13591,10 @@
           <a:lstStyle/>
           <a:p>
             <a:r>
-              <a:rPr lang="en-CA" dirty="0"/>
-              <a:t>Review Exercises</a:t>
-            </a:r>
+              <a:rPr lang="en-US" dirty="0"/>
+              <a:t>Built-in Python methods</a:t>
+            </a:r>
+            <a:endParaRPr lang="en-CA" dirty="0"/>
           </a:p>
         </p:txBody>
       </p:sp>
@@ -13596,7 +13603,7 @@
           <p:cNvPr id="3" name="Content Placeholder 2">
             <a:extLst>
               <a:ext uri="{FF2B5EF4-FFF2-40B4-BE49-F238E27FC236}">
-                <a16:creationId xmlns:a16="http://schemas.microsoft.com/office/drawing/2014/main" id="{910141A2-1E03-4F85-3DF6-E12642778538}"/>
+                <a16:creationId xmlns:a16="http://schemas.microsoft.com/office/drawing/2014/main" id="{B3FF2698-182C-7DDF-D613-A0AF99D6B020}"/>
               </a:ext>
             </a:extLst>
           </p:cNvPr>
@@ -13609,8 +13616,8 @@
         </p:nvSpPr>
         <p:spPr>
           <a:xfrm>
-            <a:off x="1683170" y="2468032"/>
-            <a:ext cx="8825659" cy="3416300"/>
+            <a:off x="1154954" y="2603500"/>
+            <a:ext cx="8825659" cy="1704549"/>
           </a:xfrm>
         </p:spPr>
         <p:txBody>
@@ -13620,16 +13627,97 @@
           <a:lstStyle/>
           <a:p>
             <a:r>
-              <a:rPr lang="en-CA" sz="2400" dirty="0"/>
-              <a:t>Let’s work through all the exercises for Week 5 today!</a:t>
+              <a:rPr lang="en-US" sz="2000" dirty="0"/>
+              <a:t>A few useful built-in methods include:</a:t>
+            </a:r>
+          </a:p>
+          <a:p>
+            <a:pPr lvl="1"/>
+            <a:r>
+              <a:rPr lang="en-US" sz="1800" dirty="0"/>
+              <a:t>sort</a:t>
+            </a:r>
+          </a:p>
+          <a:p>
+            <a:pPr lvl="2"/>
+            <a:r>
+              <a:rPr lang="en-US" sz="1600" dirty="0"/>
+              <a:t>sorts a list in alphanumerical order</a:t>
+            </a:r>
+          </a:p>
+          <a:p>
+            <a:pPr lvl="2"/>
+            <a:r>
+              <a:rPr lang="en-US" sz="1600" dirty="0"/>
+              <a:t>E.g.</a:t>
             </a:r>
           </a:p>
         </p:txBody>
       </p:sp>
+      <p:pic>
+        <p:nvPicPr>
+          <p:cNvPr id="5" name="Picture 4">
+            <a:extLst>
+              <a:ext uri="{FF2B5EF4-FFF2-40B4-BE49-F238E27FC236}">
+                <a16:creationId xmlns:a16="http://schemas.microsoft.com/office/drawing/2014/main" id="{074AC26B-3659-7B9F-97E7-51FB636502F1}"/>
+              </a:ext>
+            </a:extLst>
+          </p:cNvPr>
+          <p:cNvPicPr>
+            <a:picLocks noChangeAspect="1"/>
+          </p:cNvPicPr>
+          <p:nvPr/>
+        </p:nvPicPr>
+        <p:blipFill>
+          <a:blip r:embed="rId2"/>
+          <a:stretch>
+            <a:fillRect/>
+          </a:stretch>
+        </p:blipFill>
+        <p:spPr>
+          <a:xfrm>
+            <a:off x="3236408" y="3988537"/>
+            <a:ext cx="6039693" cy="1162212"/>
+          </a:xfrm>
+          <a:prstGeom prst="rect">
+            <a:avLst/>
+          </a:prstGeom>
+        </p:spPr>
+      </p:pic>
+      <p:pic>
+        <p:nvPicPr>
+          <p:cNvPr id="7" name="Picture 6">
+            <a:extLst>
+              <a:ext uri="{FF2B5EF4-FFF2-40B4-BE49-F238E27FC236}">
+                <a16:creationId xmlns:a16="http://schemas.microsoft.com/office/drawing/2014/main" id="{D612DCC0-A720-874B-BF07-B5A261E17938}"/>
+              </a:ext>
+            </a:extLst>
+          </p:cNvPr>
+          <p:cNvPicPr>
+            <a:picLocks noChangeAspect="1"/>
+          </p:cNvPicPr>
+          <p:nvPr/>
+        </p:nvPicPr>
+        <p:blipFill>
+          <a:blip r:embed="rId3"/>
+          <a:stretch>
+            <a:fillRect/>
+          </a:stretch>
+        </p:blipFill>
+        <p:spPr>
+          <a:xfrm>
+            <a:off x="3776339" y="5392626"/>
+            <a:ext cx="4639322" cy="1143160"/>
+          </a:xfrm>
+          <a:prstGeom prst="rect">
+            <a:avLst/>
+          </a:prstGeom>
+        </p:spPr>
+      </p:pic>
     </p:spTree>
     <p:extLst>
       <p:ext uri="{BB962C8B-B14F-4D97-AF65-F5344CB8AC3E}">
-        <p14:creationId xmlns:p14="http://schemas.microsoft.com/office/powerpoint/2010/main" val="251330630"/>
+        <p14:creationId xmlns:p14="http://schemas.microsoft.com/office/powerpoint/2010/main" val="4231050272"/>
       </p:ext>
     </p:extLst>
   </p:cSld>
@@ -13639,7 +13727,7 @@
 </p:sld>
 </file>
 
-<file path=ppt/slides/slide2.xml><?xml version="1.0" encoding="utf-8"?>
+<file path=ppt/slides/slide11.xml><?xml version="1.0" encoding="utf-8"?>
 <p:sld xmlns:a="http://schemas.openxmlformats.org/drawingml/2006/main" xmlns:r="http://schemas.openxmlformats.org/officeDocument/2006/relationships" xmlns:p="http://schemas.openxmlformats.org/presentationml/2006/main">
   <p:cSld>
     <p:spTree>
@@ -13661,7 +13749,7 @@
           <p:cNvPr id="2" name="Title 1">
             <a:extLst>
               <a:ext uri="{FF2B5EF4-FFF2-40B4-BE49-F238E27FC236}">
-                <a16:creationId xmlns:a16="http://schemas.microsoft.com/office/drawing/2014/main" id="{3ADF0212-B1D3-9CC0-EFD6-07689E8FE279}"/>
+                <a16:creationId xmlns:a16="http://schemas.microsoft.com/office/drawing/2014/main" id="{B1BD4189-C187-134F-D29F-1F792A1B6DE4}"/>
               </a:ext>
             </a:extLst>
           </p:cNvPr>
@@ -13678,9 +13766,10 @@
           <a:lstStyle/>
           <a:p>
             <a:r>
-              <a:rPr lang="en-CA" dirty="0"/>
-              <a:t>What we learned so far…</a:t>
-            </a:r>
+              <a:rPr lang="en-US" dirty="0"/>
+              <a:t>Built-in Python methods (cont.)</a:t>
+            </a:r>
+            <a:endParaRPr lang="en-CA" dirty="0"/>
           </a:p>
         </p:txBody>
       </p:sp>
@@ -13689,7 +13778,7 @@
           <p:cNvPr id="3" name="Content Placeholder 2">
             <a:extLst>
               <a:ext uri="{FF2B5EF4-FFF2-40B4-BE49-F238E27FC236}">
-                <a16:creationId xmlns:a16="http://schemas.microsoft.com/office/drawing/2014/main" id="{B316358C-FDE3-B022-6258-5E763F545C75}"/>
+                <a16:creationId xmlns:a16="http://schemas.microsoft.com/office/drawing/2014/main" id="{B3FF2698-182C-7DDF-D613-A0AF99D6B020}"/>
               </a:ext>
             </a:extLst>
           </p:cNvPr>
@@ -13702,8 +13791,8 @@
         </p:nvSpPr>
         <p:spPr>
           <a:xfrm>
-            <a:off x="1154954" y="2636157"/>
-            <a:ext cx="8825659" cy="945243"/>
+            <a:off x="1154954" y="2603500"/>
+            <a:ext cx="8825659" cy="1704549"/>
           </a:xfrm>
         </p:spPr>
         <p:txBody>
@@ -13712,25 +13801,64 @@
           </a:bodyPr>
           <a:lstStyle/>
           <a:p>
-            <a:r>
-              <a:rPr lang="en-CA" sz="2000" dirty="0"/>
-              <a:t>We’re already halfway through the course!</a:t>
-            </a:r>
-          </a:p>
-          <a:p>
-            <a:r>
-              <a:rPr lang="en-CA" sz="2000" dirty="0"/>
-              <a:t>We’ll take some time to review what we did so far…</a:t>
+            <a:pPr lvl="1"/>
+            <a:r>
+              <a:rPr lang="en-US" sz="1800" dirty="0"/>
+              <a:t>upper</a:t>
+            </a:r>
+          </a:p>
+          <a:p>
+            <a:pPr lvl="2"/>
+            <a:r>
+              <a:rPr lang="en-US" sz="1600" dirty="0"/>
+              <a:t>Capitalizes a string</a:t>
+            </a:r>
+          </a:p>
+          <a:p>
+            <a:pPr lvl="2"/>
+            <a:r>
+              <a:rPr lang="en-US" sz="1600" dirty="0"/>
+              <a:t>E.g.</a:t>
             </a:r>
           </a:p>
         </p:txBody>
       </p:sp>
+      <p:pic>
+        <p:nvPicPr>
+          <p:cNvPr id="6" name="Picture 5">
+            <a:extLst>
+              <a:ext uri="{FF2B5EF4-FFF2-40B4-BE49-F238E27FC236}">
+                <a16:creationId xmlns:a16="http://schemas.microsoft.com/office/drawing/2014/main" id="{B66647C6-E619-502C-546E-8A40A8047765}"/>
+              </a:ext>
+            </a:extLst>
+          </p:cNvPr>
+          <p:cNvPicPr>
+            <a:picLocks noChangeAspect="1"/>
+          </p:cNvPicPr>
+          <p:nvPr/>
+        </p:nvPicPr>
+        <p:blipFill>
+          <a:blip r:embed="rId2"/>
+          <a:stretch>
+            <a:fillRect/>
+          </a:stretch>
+        </p:blipFill>
+        <p:spPr>
+          <a:xfrm>
+            <a:off x="3258574" y="3526922"/>
+            <a:ext cx="3600953" cy="1105054"/>
+          </a:xfrm>
+          <a:prstGeom prst="rect">
+            <a:avLst/>
+          </a:prstGeom>
+        </p:spPr>
+      </p:pic>
       <p:sp>
         <p:nvSpPr>
-          <p:cNvPr id="4" name="Content Placeholder 2">
+          <p:cNvPr id="8" name="Content Placeholder 2">
             <a:extLst>
               <a:ext uri="{FF2B5EF4-FFF2-40B4-BE49-F238E27FC236}">
-                <a16:creationId xmlns:a16="http://schemas.microsoft.com/office/drawing/2014/main" id="{D347D111-8AC3-2670-CAB6-D8FE00EF09B5}"/>
+                <a16:creationId xmlns:a16="http://schemas.microsoft.com/office/drawing/2014/main" id="{64CA4F43-8558-FF0D-26CC-6C117389538D}"/>
               </a:ext>
             </a:extLst>
           </p:cNvPr>
@@ -13741,8 +13869,8 @@
         </p:nvSpPr>
         <p:spPr>
           <a:xfrm>
-            <a:off x="1041997" y="3859133"/>
-            <a:ext cx="4929091" cy="2029279"/>
+            <a:off x="1154954" y="4518712"/>
+            <a:ext cx="8825659" cy="1704549"/>
           </a:xfrm>
           <a:prstGeom prst="rect">
             <a:avLst/>
@@ -13980,40 +14108,212 @@
             </a:lvl9pPr>
           </a:lstStyle>
           <a:p>
-            <a:r>
-              <a:rPr lang="en-CA" sz="2400" dirty="0"/>
-              <a:t>Objects:</a:t>
-            </a:r>
-          </a:p>
-          <a:p>
             <a:pPr lvl="1"/>
             <a:r>
-              <a:rPr lang="en-CA" sz="2000" dirty="0"/>
-              <a:t>Strings</a:t>
+              <a:rPr lang="en-US" sz="1800" dirty="0"/>
+              <a:t>lower</a:t>
             </a:r>
           </a:p>
           <a:p>
             <a:pPr lvl="2"/>
             <a:r>
-              <a:rPr lang="en-CA" sz="1800" dirty="0"/>
-              <a:t>Represent specific text enclosed in quotation marks</a:t>
+              <a:rPr lang="en-US" sz="1600" dirty="0"/>
+              <a:t>Lowercases a string</a:t>
             </a:r>
           </a:p>
           <a:p>
             <a:pPr lvl="2"/>
             <a:r>
-              <a:rPr lang="en-CA" sz="1800" dirty="0"/>
-              <a:t>E.g. name = “Jade”</a:t>
-            </a:r>
+              <a:rPr lang="en-US" sz="1600" dirty="0"/>
+              <a:t>E.g.</a:t>
+            </a:r>
+          </a:p>
+        </p:txBody>
+      </p:sp>
+      <p:pic>
+        <p:nvPicPr>
+          <p:cNvPr id="10" name="Picture 9">
+            <a:extLst>
+              <a:ext uri="{FF2B5EF4-FFF2-40B4-BE49-F238E27FC236}">
+                <a16:creationId xmlns:a16="http://schemas.microsoft.com/office/drawing/2014/main" id="{FDBF286F-F125-0135-C7E4-9F52F38E5E26}"/>
+              </a:ext>
+            </a:extLst>
+          </p:cNvPr>
+          <p:cNvPicPr>
+            <a:picLocks noChangeAspect="1"/>
+          </p:cNvPicPr>
+          <p:nvPr/>
+        </p:nvPicPr>
+        <p:blipFill>
+          <a:blip r:embed="rId3"/>
+          <a:stretch>
+            <a:fillRect/>
+          </a:stretch>
+        </p:blipFill>
+        <p:spPr>
+          <a:xfrm>
+            <a:off x="3229994" y="5468671"/>
+            <a:ext cx="3658111" cy="1209844"/>
+          </a:xfrm>
+          <a:prstGeom prst="rect">
+            <a:avLst/>
+          </a:prstGeom>
+        </p:spPr>
+      </p:pic>
+    </p:spTree>
+    <p:extLst>
+      <p:ext uri="{BB962C8B-B14F-4D97-AF65-F5344CB8AC3E}">
+        <p14:creationId xmlns:p14="http://schemas.microsoft.com/office/powerpoint/2010/main" val="20836087"/>
+      </p:ext>
+    </p:extLst>
+  </p:cSld>
+  <p:clrMapOvr>
+    <a:masterClrMapping/>
+  </p:clrMapOvr>
+</p:sld>
+</file>
+
+<file path=ppt/slides/slide12.xml><?xml version="1.0" encoding="utf-8"?>
+<p:sld xmlns:a="http://schemas.openxmlformats.org/drawingml/2006/main" xmlns:r="http://schemas.openxmlformats.org/officeDocument/2006/relationships" xmlns:p="http://schemas.openxmlformats.org/presentationml/2006/main">
+  <p:cSld>
+    <p:spTree>
+      <p:nvGrpSpPr>
+        <p:cNvPr id="1" name=""/>
+        <p:cNvGrpSpPr/>
+        <p:nvPr/>
+      </p:nvGrpSpPr>
+      <p:grpSpPr>
+        <a:xfrm>
+          <a:off x="0" y="0"/>
+          <a:ext cx="0" cy="0"/>
+          <a:chOff x="0" y="0"/>
+          <a:chExt cx="0" cy="0"/>
+        </a:xfrm>
+      </p:grpSpPr>
+      <p:sp>
+        <p:nvSpPr>
+          <p:cNvPr id="2" name="Title 1">
+            <a:extLst>
+              <a:ext uri="{FF2B5EF4-FFF2-40B4-BE49-F238E27FC236}">
+                <a16:creationId xmlns:a16="http://schemas.microsoft.com/office/drawing/2014/main" id="{F9FD61E1-DCCB-E6D1-DB8A-EE8134DC6BC7}"/>
+              </a:ext>
+            </a:extLst>
+          </p:cNvPr>
+          <p:cNvSpPr>
+            <a:spLocks noGrp="1"/>
+          </p:cNvSpPr>
+          <p:nvPr>
+            <p:ph type="title"/>
+          </p:nvPr>
+        </p:nvSpPr>
+        <p:spPr/>
+        <p:txBody>
+          <a:bodyPr/>
+          <a:lstStyle/>
+          <a:p>
+            <a:r>
+              <a:rPr lang="en-US" dirty="0"/>
+              <a:t>Useful NumPy methods</a:t>
+            </a:r>
+            <a:endParaRPr lang="en-CA" dirty="0"/>
           </a:p>
         </p:txBody>
       </p:sp>
       <p:sp>
         <p:nvSpPr>
-          <p:cNvPr id="5" name="Content Placeholder 2">
+          <p:cNvPr id="3" name="Content Placeholder 2">
             <a:extLst>
               <a:ext uri="{FF2B5EF4-FFF2-40B4-BE49-F238E27FC236}">
-                <a16:creationId xmlns:a16="http://schemas.microsoft.com/office/drawing/2014/main" id="{B07E4BA6-CAFB-4779-4473-0A01F0A8140F}"/>
+                <a16:creationId xmlns:a16="http://schemas.microsoft.com/office/drawing/2014/main" id="{ECA3D722-FF7D-4A16-5E50-1F336298803A}"/>
+              </a:ext>
+            </a:extLst>
+          </p:cNvPr>
+          <p:cNvSpPr>
+            <a:spLocks noGrp="1"/>
+          </p:cNvSpPr>
+          <p:nvPr>
+            <p:ph idx="1"/>
+          </p:nvPr>
+        </p:nvSpPr>
+        <p:spPr>
+          <a:xfrm>
+            <a:off x="1154954" y="2603500"/>
+            <a:ext cx="8825659" cy="1672665"/>
+          </a:xfrm>
+        </p:spPr>
+        <p:txBody>
+          <a:bodyPr>
+            <a:normAutofit/>
+          </a:bodyPr>
+          <a:lstStyle/>
+          <a:p>
+            <a:r>
+              <a:rPr lang="en-US" sz="2000" dirty="0" err="1"/>
+              <a:t>Numpy</a:t>
+            </a:r>
+            <a:r>
+              <a:rPr lang="en-US" sz="2000" dirty="0"/>
+              <a:t> has a LOT of useful methods you can use on arrays</a:t>
+            </a:r>
+          </a:p>
+          <a:p>
+            <a:r>
+              <a:rPr lang="en-US" sz="2000" dirty="0"/>
+              <a:t>These include…</a:t>
+            </a:r>
+          </a:p>
+          <a:p>
+            <a:pPr lvl="1"/>
+            <a:r>
+              <a:rPr lang="en-US" sz="1800" dirty="0"/>
+              <a:t>size</a:t>
+            </a:r>
+          </a:p>
+          <a:p>
+            <a:pPr lvl="2"/>
+            <a:r>
+              <a:rPr lang="en-US" sz="1600" dirty="0"/>
+              <a:t>Returns the number of elements in your array</a:t>
+            </a:r>
+          </a:p>
+        </p:txBody>
+      </p:sp>
+      <p:pic>
+        <p:nvPicPr>
+          <p:cNvPr id="5" name="Picture 4">
+            <a:extLst>
+              <a:ext uri="{FF2B5EF4-FFF2-40B4-BE49-F238E27FC236}">
+                <a16:creationId xmlns:a16="http://schemas.microsoft.com/office/drawing/2014/main" id="{29B51080-E244-E02B-528B-1A81B7A70749}"/>
+              </a:ext>
+            </a:extLst>
+          </p:cNvPr>
+          <p:cNvPicPr>
+            <a:picLocks noChangeAspect="1"/>
+          </p:cNvPicPr>
+          <p:nvPr/>
+        </p:nvPicPr>
+        <p:blipFill>
+          <a:blip r:embed="rId2"/>
+          <a:stretch>
+            <a:fillRect/>
+          </a:stretch>
+        </p:blipFill>
+        <p:spPr>
+          <a:xfrm>
+            <a:off x="2287116" y="4313084"/>
+            <a:ext cx="4067743" cy="885949"/>
+          </a:xfrm>
+          <a:prstGeom prst="rect">
+            <a:avLst/>
+          </a:prstGeom>
+        </p:spPr>
+      </p:pic>
+      <p:sp>
+        <p:nvSpPr>
+          <p:cNvPr id="6" name="Content Placeholder 2">
+            <a:extLst>
+              <a:ext uri="{FF2B5EF4-FFF2-40B4-BE49-F238E27FC236}">
+                <a16:creationId xmlns:a16="http://schemas.microsoft.com/office/drawing/2014/main" id="{99C5E69E-A224-7FB5-875F-CC165C5E7DFB}"/>
               </a:ext>
             </a:extLst>
           </p:cNvPr>
@@ -14024,8 +14324,8 @@
         </p:nvSpPr>
         <p:spPr>
           <a:xfrm>
-            <a:off x="6065479" y="3859133"/>
-            <a:ext cx="6126521" cy="2434320"/>
+            <a:off x="1217707" y="5048000"/>
+            <a:ext cx="4752787" cy="1361766"/>
           </a:xfrm>
           <a:prstGeom prst="rect">
             <a:avLst/>
@@ -14265,55 +14565,53 @@
           <a:p>
             <a:pPr lvl="1"/>
             <a:r>
-              <a:rPr lang="en-CA" sz="1800" dirty="0"/>
-              <a:t>Integers</a:t>
+              <a:rPr lang="en-US" sz="1800" dirty="0"/>
+              <a:t>shape</a:t>
             </a:r>
           </a:p>
           <a:p>
             <a:pPr lvl="2"/>
             <a:r>
-              <a:rPr lang="en-CA" sz="1600" dirty="0"/>
-              <a:t>Round numbers (no decimal places)</a:t>
-            </a:r>
-          </a:p>
-          <a:p>
-            <a:pPr lvl="2"/>
-            <a:r>
-              <a:rPr lang="en-CA" sz="1600" dirty="0"/>
-              <a:t>E.g. 42</a:t>
-            </a:r>
-          </a:p>
-          <a:p>
-            <a:pPr lvl="1"/>
-            <a:r>
-              <a:rPr lang="en-CA" sz="1800" dirty="0"/>
-              <a:t>Floating point numbers (float)</a:t>
-            </a:r>
-          </a:p>
-          <a:p>
-            <a:pPr lvl="2"/>
-            <a:r>
-              <a:rPr lang="en-CA" sz="1600" dirty="0"/>
-              <a:t>Numbers with decimal places</a:t>
-            </a:r>
-          </a:p>
-          <a:p>
-            <a:pPr lvl="2"/>
-            <a:r>
-              <a:rPr lang="en-CA" sz="1600" dirty="0"/>
-              <a:t>E.g. 42.0</a:t>
-            </a:r>
-          </a:p>
-          <a:p>
-            <a:pPr lvl="2"/>
-            <a:endParaRPr lang="en-CA" sz="1600" dirty="0"/>
+              <a:rPr lang="en-US" sz="1600" dirty="0"/>
+              <a:t>Returns the shape of an n-dimensional array (array of arrays)</a:t>
+            </a:r>
           </a:p>
         </p:txBody>
       </p:sp>
+      <p:pic>
+        <p:nvPicPr>
+          <p:cNvPr id="8" name="Picture 7">
+            <a:extLst>
+              <a:ext uri="{FF2B5EF4-FFF2-40B4-BE49-F238E27FC236}">
+                <a16:creationId xmlns:a16="http://schemas.microsoft.com/office/drawing/2014/main" id="{6CB037F8-4E56-BE4D-D91B-C4A02C2EA8FC}"/>
+              </a:ext>
+            </a:extLst>
+          </p:cNvPr>
+          <p:cNvPicPr>
+            <a:picLocks noChangeAspect="1"/>
+          </p:cNvPicPr>
+          <p:nvPr/>
+        </p:nvPicPr>
+        <p:blipFill>
+          <a:blip r:embed="rId3"/>
+          <a:stretch>
+            <a:fillRect/>
+          </a:stretch>
+        </p:blipFill>
+        <p:spPr>
+          <a:xfrm>
+            <a:off x="5970494" y="5135577"/>
+            <a:ext cx="2634508" cy="1337645"/>
+          </a:xfrm>
+          <a:prstGeom prst="rect">
+            <a:avLst/>
+          </a:prstGeom>
+        </p:spPr>
+      </p:pic>
     </p:spTree>
     <p:extLst>
       <p:ext uri="{BB962C8B-B14F-4D97-AF65-F5344CB8AC3E}">
-        <p14:creationId xmlns:p14="http://schemas.microsoft.com/office/powerpoint/2010/main" val="3979916045"/>
+        <p14:creationId xmlns:p14="http://schemas.microsoft.com/office/powerpoint/2010/main" val="2748041221"/>
       </p:ext>
     </p:extLst>
   </p:cSld>
@@ -14323,708 +14621,7 @@
 </p:sld>
 </file>
 
-<file path=ppt/slides/slide3.xml><?xml version="1.0" encoding="utf-8"?>
-<p:sld xmlns:a="http://schemas.openxmlformats.org/drawingml/2006/main" xmlns:r="http://schemas.openxmlformats.org/officeDocument/2006/relationships" xmlns:p="http://schemas.openxmlformats.org/presentationml/2006/main">
-  <p:cSld>
-    <p:spTree>
-      <p:nvGrpSpPr>
-        <p:cNvPr id="1" name=""/>
-        <p:cNvGrpSpPr/>
-        <p:nvPr/>
-      </p:nvGrpSpPr>
-      <p:grpSpPr>
-        <a:xfrm>
-          <a:off x="0" y="0"/>
-          <a:ext cx="0" cy="0"/>
-          <a:chOff x="0" y="0"/>
-          <a:chExt cx="0" cy="0"/>
-        </a:xfrm>
-      </p:grpSpPr>
-      <p:sp>
-        <p:nvSpPr>
-          <p:cNvPr id="2" name="Title 1">
-            <a:extLst>
-              <a:ext uri="{FF2B5EF4-FFF2-40B4-BE49-F238E27FC236}">
-                <a16:creationId xmlns:a16="http://schemas.microsoft.com/office/drawing/2014/main" id="{B5058D07-BDB4-0507-2A23-3ED383A390EC}"/>
-              </a:ext>
-            </a:extLst>
-          </p:cNvPr>
-          <p:cNvSpPr>
-            <a:spLocks noGrp="1"/>
-          </p:cNvSpPr>
-          <p:nvPr>
-            <p:ph type="title"/>
-          </p:nvPr>
-        </p:nvSpPr>
-        <p:spPr/>
-        <p:txBody>
-          <a:bodyPr/>
-          <a:lstStyle/>
-          <a:p>
-            <a:r>
-              <a:rPr lang="en-CA" dirty="0"/>
-              <a:t>What we learned so far…</a:t>
-            </a:r>
-          </a:p>
-        </p:txBody>
-      </p:sp>
-      <p:sp>
-        <p:nvSpPr>
-          <p:cNvPr id="3" name="Content Placeholder 2">
-            <a:extLst>
-              <a:ext uri="{FF2B5EF4-FFF2-40B4-BE49-F238E27FC236}">
-                <a16:creationId xmlns:a16="http://schemas.microsoft.com/office/drawing/2014/main" id="{86FA524D-D4D8-D3EB-1167-57EC3CDE9F2F}"/>
-              </a:ext>
-            </a:extLst>
-          </p:cNvPr>
-          <p:cNvSpPr>
-            <a:spLocks noGrp="1"/>
-          </p:cNvSpPr>
-          <p:nvPr>
-            <p:ph idx="1"/>
-          </p:nvPr>
-        </p:nvSpPr>
-        <p:spPr>
-          <a:xfrm>
-            <a:off x="1683170" y="2407556"/>
-            <a:ext cx="8825659" cy="4265385"/>
-          </a:xfrm>
-        </p:spPr>
-        <p:txBody>
-          <a:bodyPr>
-            <a:normAutofit/>
-          </a:bodyPr>
-          <a:lstStyle/>
-          <a:p>
-            <a:r>
-              <a:rPr lang="en-CA" sz="2400" dirty="0"/>
-              <a:t>Objects (cont.)</a:t>
-            </a:r>
-          </a:p>
-          <a:p>
-            <a:pPr lvl="1"/>
-            <a:r>
-              <a:rPr lang="en-CA" sz="2000" dirty="0"/>
-              <a:t>Lists</a:t>
-            </a:r>
-          </a:p>
-          <a:p>
-            <a:pPr lvl="2"/>
-            <a:r>
-              <a:rPr lang="en-CA" sz="1800" dirty="0"/>
-              <a:t>Used to store several objects</a:t>
-            </a:r>
-          </a:p>
-          <a:p>
-            <a:pPr lvl="2"/>
-            <a:r>
-              <a:rPr lang="en-CA" sz="1800" dirty="0"/>
-              <a:t>E.g. [“hello”, “world”, 24, 8.2]</a:t>
-            </a:r>
-          </a:p>
-          <a:p>
-            <a:pPr lvl="1"/>
-            <a:r>
-              <a:rPr lang="en-CA" sz="2000" dirty="0"/>
-              <a:t>Arrays</a:t>
-            </a:r>
-          </a:p>
-          <a:p>
-            <a:pPr lvl="2"/>
-            <a:r>
-              <a:rPr lang="en-CA" sz="1800" dirty="0"/>
-              <a:t>From </a:t>
-            </a:r>
-            <a:r>
-              <a:rPr lang="en-CA" sz="1800" dirty="0" err="1">
-                <a:latin typeface="Courier New" panose="02070309020205020404" pitchFamily="49" charset="0"/>
-                <a:cs typeface="Courier New" panose="02070309020205020404" pitchFamily="49" charset="0"/>
-              </a:rPr>
-              <a:t>numpy</a:t>
-            </a:r>
-            <a:r>
-              <a:rPr lang="en-CA" sz="1800" dirty="0"/>
-              <a:t> package</a:t>
-            </a:r>
-          </a:p>
-          <a:p>
-            <a:pPr lvl="2"/>
-            <a:r>
-              <a:rPr lang="en-CA" sz="1800" dirty="0"/>
-              <a:t>Similar to lists, but can also perform element-wise operations</a:t>
-            </a:r>
-          </a:p>
-          <a:p>
-            <a:pPr lvl="1"/>
-            <a:r>
-              <a:rPr lang="en-CA" sz="2000" dirty="0"/>
-              <a:t>Booleans</a:t>
-            </a:r>
-          </a:p>
-          <a:p>
-            <a:pPr lvl="2"/>
-            <a:r>
-              <a:rPr lang="en-CA" sz="1800" dirty="0"/>
-              <a:t>Two possible values, True or False</a:t>
-            </a:r>
-          </a:p>
-        </p:txBody>
-      </p:sp>
-    </p:spTree>
-    <p:extLst>
-      <p:ext uri="{BB962C8B-B14F-4D97-AF65-F5344CB8AC3E}">
-        <p14:creationId xmlns:p14="http://schemas.microsoft.com/office/powerpoint/2010/main" val="2894575126"/>
-      </p:ext>
-    </p:extLst>
-  </p:cSld>
-  <p:clrMapOvr>
-    <a:masterClrMapping/>
-  </p:clrMapOvr>
-</p:sld>
-</file>
-
-<file path=ppt/slides/slide4.xml><?xml version="1.0" encoding="utf-8"?>
-<p:sld xmlns:a="http://schemas.openxmlformats.org/drawingml/2006/main" xmlns:r="http://schemas.openxmlformats.org/officeDocument/2006/relationships" xmlns:p="http://schemas.openxmlformats.org/presentationml/2006/main">
-  <p:cSld>
-    <p:spTree>
-      <p:nvGrpSpPr>
-        <p:cNvPr id="1" name=""/>
-        <p:cNvGrpSpPr/>
-        <p:nvPr/>
-      </p:nvGrpSpPr>
-      <p:grpSpPr>
-        <a:xfrm>
-          <a:off x="0" y="0"/>
-          <a:ext cx="0" cy="0"/>
-          <a:chOff x="0" y="0"/>
-          <a:chExt cx="0" cy="0"/>
-        </a:xfrm>
-      </p:grpSpPr>
-      <p:sp>
-        <p:nvSpPr>
-          <p:cNvPr id="2" name="Title 1">
-            <a:extLst>
-              <a:ext uri="{FF2B5EF4-FFF2-40B4-BE49-F238E27FC236}">
-                <a16:creationId xmlns:a16="http://schemas.microsoft.com/office/drawing/2014/main" id="{5A2D124E-3C50-43FB-CAFC-098CF63DE8EF}"/>
-              </a:ext>
-            </a:extLst>
-          </p:cNvPr>
-          <p:cNvSpPr>
-            <a:spLocks noGrp="1"/>
-          </p:cNvSpPr>
-          <p:nvPr>
-            <p:ph type="title"/>
-          </p:nvPr>
-        </p:nvSpPr>
-        <p:spPr/>
-        <p:txBody>
-          <a:bodyPr/>
-          <a:lstStyle/>
-          <a:p>
-            <a:r>
-              <a:rPr lang="en-CA" dirty="0"/>
-              <a:t>What we learned so far…</a:t>
-            </a:r>
-          </a:p>
-        </p:txBody>
-      </p:sp>
-      <p:sp>
-        <p:nvSpPr>
-          <p:cNvPr id="3" name="Content Placeholder 2">
-            <a:extLst>
-              <a:ext uri="{FF2B5EF4-FFF2-40B4-BE49-F238E27FC236}">
-                <a16:creationId xmlns:a16="http://schemas.microsoft.com/office/drawing/2014/main" id="{44B0A09C-5FA8-68BF-3FDB-67A278360BD3}"/>
-              </a:ext>
-            </a:extLst>
-          </p:cNvPr>
-          <p:cNvSpPr>
-            <a:spLocks noGrp="1"/>
-          </p:cNvSpPr>
-          <p:nvPr>
-            <p:ph idx="1"/>
-          </p:nvPr>
-        </p:nvSpPr>
-        <p:spPr>
-          <a:xfrm>
-            <a:off x="1231154" y="2266042"/>
-            <a:ext cx="8825659" cy="4515757"/>
-          </a:xfrm>
-        </p:spPr>
-        <p:txBody>
-          <a:bodyPr>
-            <a:normAutofit/>
-          </a:bodyPr>
-          <a:lstStyle/>
-          <a:p>
-            <a:r>
-              <a:rPr lang="en-CA" sz="2400" dirty="0"/>
-              <a:t>Statements</a:t>
-            </a:r>
-          </a:p>
-          <a:p>
-            <a:pPr lvl="1"/>
-            <a:r>
-              <a:rPr lang="en-CA" sz="2000" dirty="0"/>
-              <a:t>if statement</a:t>
-            </a:r>
-          </a:p>
-          <a:p>
-            <a:pPr lvl="2"/>
-            <a:r>
-              <a:rPr lang="en-CA" sz="1800" dirty="0"/>
-              <a:t>Specifies code to run </a:t>
-            </a:r>
-            <a:r>
-              <a:rPr lang="en-CA" sz="1800" i="1" dirty="0"/>
-              <a:t>if</a:t>
-            </a:r>
-            <a:r>
-              <a:rPr lang="en-CA" sz="1800" dirty="0"/>
-              <a:t> a certain condition is met</a:t>
-            </a:r>
-          </a:p>
-          <a:p>
-            <a:pPr lvl="2"/>
-            <a:r>
-              <a:rPr lang="en-CA" sz="1800" dirty="0"/>
-              <a:t>Can be accompanied by an </a:t>
-            </a:r>
-            <a:r>
-              <a:rPr lang="en-CA" sz="1800" dirty="0" err="1"/>
-              <a:t>elif</a:t>
-            </a:r>
-            <a:r>
-              <a:rPr lang="en-CA" sz="1800" dirty="0"/>
-              <a:t> or else statement</a:t>
-            </a:r>
-          </a:p>
-          <a:p>
-            <a:pPr lvl="1"/>
-            <a:r>
-              <a:rPr lang="en-CA" sz="2000" dirty="0"/>
-              <a:t>for loop</a:t>
-            </a:r>
-          </a:p>
-          <a:p>
-            <a:pPr lvl="2"/>
-            <a:r>
-              <a:rPr lang="en-CA" sz="1800" dirty="0"/>
-              <a:t>Runs a specific code a determinate number of times</a:t>
-            </a:r>
-          </a:p>
-          <a:p>
-            <a:pPr lvl="2"/>
-            <a:r>
-              <a:rPr lang="en-CA" sz="1800" dirty="0"/>
-              <a:t>Code loops until all elements specified in the for statement have been iterated through</a:t>
-            </a:r>
-          </a:p>
-          <a:p>
-            <a:pPr lvl="1"/>
-            <a:r>
-              <a:rPr lang="en-CA" sz="2000" dirty="0"/>
-              <a:t>while loop</a:t>
-            </a:r>
-          </a:p>
-          <a:p>
-            <a:pPr lvl="2"/>
-            <a:r>
-              <a:rPr lang="en-CA" sz="1800" dirty="0"/>
-              <a:t>Runs a specific code an indeterminate number of times</a:t>
-            </a:r>
-          </a:p>
-          <a:p>
-            <a:pPr lvl="2"/>
-            <a:r>
-              <a:rPr lang="en-CA" sz="1800" dirty="0"/>
-              <a:t>Code loops until condition specified in while statement is met</a:t>
-            </a:r>
-          </a:p>
-          <a:p>
-            <a:pPr lvl="2"/>
-            <a:endParaRPr lang="en-CA" sz="1800" dirty="0"/>
-          </a:p>
-        </p:txBody>
-      </p:sp>
-    </p:spTree>
-    <p:extLst>
-      <p:ext uri="{BB962C8B-B14F-4D97-AF65-F5344CB8AC3E}">
-        <p14:creationId xmlns:p14="http://schemas.microsoft.com/office/powerpoint/2010/main" val="3033083569"/>
-      </p:ext>
-    </p:extLst>
-  </p:cSld>
-  <p:clrMapOvr>
-    <a:masterClrMapping/>
-  </p:clrMapOvr>
-</p:sld>
-</file>
-
-<file path=ppt/slides/slide5.xml><?xml version="1.0" encoding="utf-8"?>
-<p:sld xmlns:a="http://schemas.openxmlformats.org/drawingml/2006/main" xmlns:r="http://schemas.openxmlformats.org/officeDocument/2006/relationships" xmlns:p="http://schemas.openxmlformats.org/presentationml/2006/main">
-  <p:cSld>
-    <p:spTree>
-      <p:nvGrpSpPr>
-        <p:cNvPr id="1" name=""/>
-        <p:cNvGrpSpPr/>
-        <p:nvPr/>
-      </p:nvGrpSpPr>
-      <p:grpSpPr>
-        <a:xfrm>
-          <a:off x="0" y="0"/>
-          <a:ext cx="0" cy="0"/>
-          <a:chOff x="0" y="0"/>
-          <a:chExt cx="0" cy="0"/>
-        </a:xfrm>
-      </p:grpSpPr>
-      <p:sp>
-        <p:nvSpPr>
-          <p:cNvPr id="2" name="Title 1">
-            <a:extLst>
-              <a:ext uri="{FF2B5EF4-FFF2-40B4-BE49-F238E27FC236}">
-                <a16:creationId xmlns:a16="http://schemas.microsoft.com/office/drawing/2014/main" id="{FCB9DF14-F283-BBF6-2BB4-A63424AA273C}"/>
-              </a:ext>
-            </a:extLst>
-          </p:cNvPr>
-          <p:cNvSpPr>
-            <a:spLocks noGrp="1"/>
-          </p:cNvSpPr>
-          <p:nvPr>
-            <p:ph type="title"/>
-          </p:nvPr>
-        </p:nvSpPr>
-        <p:spPr/>
-        <p:txBody>
-          <a:bodyPr/>
-          <a:lstStyle/>
-          <a:p>
-            <a:r>
-              <a:rPr lang="en-CA" dirty="0"/>
-              <a:t>What we learned so far…</a:t>
-            </a:r>
-          </a:p>
-        </p:txBody>
-      </p:sp>
-      <p:sp>
-        <p:nvSpPr>
-          <p:cNvPr id="3" name="Content Placeholder 2">
-            <a:extLst>
-              <a:ext uri="{FF2B5EF4-FFF2-40B4-BE49-F238E27FC236}">
-                <a16:creationId xmlns:a16="http://schemas.microsoft.com/office/drawing/2014/main" id="{B1394FD5-3BD6-2A18-D311-0453C40A7112}"/>
-              </a:ext>
-            </a:extLst>
-          </p:cNvPr>
-          <p:cNvSpPr>
-            <a:spLocks noGrp="1"/>
-          </p:cNvSpPr>
-          <p:nvPr>
-            <p:ph idx="1"/>
-          </p:nvPr>
-        </p:nvSpPr>
-        <p:spPr>
-          <a:xfrm>
-            <a:off x="1154954" y="2329543"/>
-            <a:ext cx="9360646" cy="4528457"/>
-          </a:xfrm>
-        </p:spPr>
-        <p:txBody>
-          <a:bodyPr>
-            <a:normAutofit lnSpcReduction="10000"/>
-          </a:bodyPr>
-          <a:lstStyle/>
-          <a:p>
-            <a:r>
-              <a:rPr lang="en-CA" sz="2400" dirty="0"/>
-              <a:t>Built-in Python functions</a:t>
-            </a:r>
-          </a:p>
-          <a:p>
-            <a:pPr lvl="1"/>
-            <a:r>
-              <a:rPr lang="en-CA" sz="2000" dirty="0"/>
-              <a:t>print()</a:t>
-            </a:r>
-          </a:p>
-          <a:p>
-            <a:pPr lvl="2"/>
-            <a:r>
-              <a:rPr lang="en-CA" sz="1800" dirty="0"/>
-              <a:t>Prints out whatever is between the parentheses</a:t>
-            </a:r>
-          </a:p>
-          <a:p>
-            <a:pPr lvl="1"/>
-            <a:r>
-              <a:rPr lang="en-CA" sz="2000" dirty="0"/>
-              <a:t>int()</a:t>
-            </a:r>
-          </a:p>
-          <a:p>
-            <a:pPr lvl="2"/>
-            <a:r>
-              <a:rPr lang="en-CA" sz="1800" dirty="0"/>
-              <a:t>Transforms a string or float to an integer</a:t>
-            </a:r>
-          </a:p>
-          <a:p>
-            <a:pPr lvl="2"/>
-            <a:r>
-              <a:rPr lang="en-CA" sz="1800" dirty="0"/>
-              <a:t>If the float is not a round number, int() rounds </a:t>
-            </a:r>
-            <a:r>
-              <a:rPr lang="en-CA" sz="1800" i="1" dirty="0"/>
-              <a:t>down</a:t>
-            </a:r>
-          </a:p>
-          <a:p>
-            <a:pPr lvl="3"/>
-            <a:r>
-              <a:rPr lang="en-CA" sz="1600" dirty="0"/>
-              <a:t>E.g. int(4.9) = 4</a:t>
-            </a:r>
-          </a:p>
-          <a:p>
-            <a:pPr lvl="1"/>
-            <a:r>
-              <a:rPr lang="en-CA" sz="2000" dirty="0"/>
-              <a:t>string()</a:t>
-            </a:r>
-          </a:p>
-          <a:p>
-            <a:pPr lvl="2"/>
-            <a:r>
-              <a:rPr lang="en-CA" sz="1800" dirty="0"/>
-              <a:t>Transform what is between the parentheses into a string</a:t>
-            </a:r>
-          </a:p>
-          <a:p>
-            <a:pPr lvl="1"/>
-            <a:r>
-              <a:rPr lang="en-CA" sz="2000" dirty="0"/>
-              <a:t>float()</a:t>
-            </a:r>
-          </a:p>
-          <a:p>
-            <a:pPr lvl="2"/>
-            <a:r>
-              <a:rPr lang="en-CA" sz="1800" dirty="0"/>
-              <a:t>Transform what is between the parentheses into a floating point number</a:t>
-            </a:r>
-          </a:p>
-        </p:txBody>
-      </p:sp>
-    </p:spTree>
-    <p:extLst>
-      <p:ext uri="{BB962C8B-B14F-4D97-AF65-F5344CB8AC3E}">
-        <p14:creationId xmlns:p14="http://schemas.microsoft.com/office/powerpoint/2010/main" val="1494722630"/>
-      </p:ext>
-    </p:extLst>
-  </p:cSld>
-  <p:clrMapOvr>
-    <a:masterClrMapping/>
-  </p:clrMapOvr>
-</p:sld>
-</file>
-
-<file path=ppt/slides/slide6.xml><?xml version="1.0" encoding="utf-8"?>
-<p:sld xmlns:a="http://schemas.openxmlformats.org/drawingml/2006/main" xmlns:r="http://schemas.openxmlformats.org/officeDocument/2006/relationships" xmlns:p="http://schemas.openxmlformats.org/presentationml/2006/main">
-  <p:cSld>
-    <p:spTree>
-      <p:nvGrpSpPr>
-        <p:cNvPr id="1" name=""/>
-        <p:cNvGrpSpPr/>
-        <p:nvPr/>
-      </p:nvGrpSpPr>
-      <p:grpSpPr>
-        <a:xfrm>
-          <a:off x="0" y="0"/>
-          <a:ext cx="0" cy="0"/>
-          <a:chOff x="0" y="0"/>
-          <a:chExt cx="0" cy="0"/>
-        </a:xfrm>
-      </p:grpSpPr>
-      <p:sp>
-        <p:nvSpPr>
-          <p:cNvPr id="2" name="Title 1">
-            <a:extLst>
-              <a:ext uri="{FF2B5EF4-FFF2-40B4-BE49-F238E27FC236}">
-                <a16:creationId xmlns:a16="http://schemas.microsoft.com/office/drawing/2014/main" id="{22C77693-7FEB-E7D3-8AC0-EE542DCA45AB}"/>
-              </a:ext>
-            </a:extLst>
-          </p:cNvPr>
-          <p:cNvSpPr>
-            <a:spLocks noGrp="1"/>
-          </p:cNvSpPr>
-          <p:nvPr>
-            <p:ph type="title"/>
-          </p:nvPr>
-        </p:nvSpPr>
-        <p:spPr/>
-        <p:txBody>
-          <a:bodyPr/>
-          <a:lstStyle/>
-          <a:p>
-            <a:r>
-              <a:rPr lang="en-CA" dirty="0"/>
-              <a:t>What we learned so far…</a:t>
-            </a:r>
-          </a:p>
-        </p:txBody>
-      </p:sp>
-      <p:sp>
-        <p:nvSpPr>
-          <p:cNvPr id="3" name="Content Placeholder 2">
-            <a:extLst>
-              <a:ext uri="{FF2B5EF4-FFF2-40B4-BE49-F238E27FC236}">
-                <a16:creationId xmlns:a16="http://schemas.microsoft.com/office/drawing/2014/main" id="{BFE73BA5-9E2A-9A6C-136C-BA7E8D341EDB}"/>
-              </a:ext>
-            </a:extLst>
-          </p:cNvPr>
-          <p:cNvSpPr>
-            <a:spLocks noGrp="1"/>
-          </p:cNvSpPr>
-          <p:nvPr>
-            <p:ph idx="1"/>
-          </p:nvPr>
-        </p:nvSpPr>
-        <p:spPr>
-          <a:xfrm>
-            <a:off x="969362" y="2331357"/>
-            <a:ext cx="10253275" cy="4526643"/>
-          </a:xfrm>
-        </p:spPr>
-        <p:txBody>
-          <a:bodyPr>
-            <a:normAutofit fontScale="92500" lnSpcReduction="10000"/>
-          </a:bodyPr>
-          <a:lstStyle/>
-          <a:p>
-            <a:r>
-              <a:rPr lang="en-CA" sz="2400" dirty="0"/>
-              <a:t>Built-in Python functions (cont.)</a:t>
-            </a:r>
-          </a:p>
-          <a:p>
-            <a:pPr lvl="1"/>
-            <a:r>
-              <a:rPr lang="en-CA" sz="2000" dirty="0"/>
-              <a:t>type()</a:t>
-            </a:r>
-          </a:p>
-          <a:p>
-            <a:pPr lvl="2"/>
-            <a:r>
-              <a:rPr lang="en-CA" sz="1800" dirty="0"/>
-              <a:t>Returns the object type</a:t>
-            </a:r>
-          </a:p>
-          <a:p>
-            <a:pPr lvl="2"/>
-            <a:r>
-              <a:rPr lang="en-CA" sz="1800" dirty="0"/>
-              <a:t>E.g. type(12) = int</a:t>
-            </a:r>
-          </a:p>
-          <a:p>
-            <a:pPr lvl="2"/>
-            <a:r>
-              <a:rPr lang="en-CA" sz="1800" dirty="0"/>
-              <a:t>E.g. type(“hello”) = str</a:t>
-            </a:r>
-          </a:p>
-          <a:p>
-            <a:pPr lvl="1"/>
-            <a:r>
-              <a:rPr lang="en-CA" sz="2000" dirty="0" err="1"/>
-              <a:t>len</a:t>
-            </a:r>
-            <a:r>
-              <a:rPr lang="en-CA" sz="2000" dirty="0"/>
-              <a:t>()</a:t>
-            </a:r>
-          </a:p>
-          <a:p>
-            <a:pPr lvl="2"/>
-            <a:r>
-              <a:rPr lang="en-CA" sz="1800" dirty="0"/>
-              <a:t>Returns the length of the list (number of elements in the list)</a:t>
-            </a:r>
-          </a:p>
-          <a:p>
-            <a:pPr lvl="2"/>
-            <a:r>
-              <a:rPr lang="en-CA" sz="1800" dirty="0"/>
-              <a:t>Does NOT work on </a:t>
-            </a:r>
-            <a:r>
-              <a:rPr lang="en-CA" sz="1800" dirty="0" err="1"/>
-              <a:t>numpy</a:t>
-            </a:r>
-            <a:r>
-              <a:rPr lang="en-CA" sz="1800" dirty="0"/>
-              <a:t> arrays</a:t>
-            </a:r>
-          </a:p>
-          <a:p>
-            <a:pPr lvl="2"/>
-            <a:r>
-              <a:rPr lang="en-CA" sz="1800" dirty="0"/>
-              <a:t>E.g. </a:t>
-            </a:r>
-            <a:r>
-              <a:rPr lang="en-CA" sz="1800" dirty="0" err="1"/>
-              <a:t>len</a:t>
-            </a:r>
-            <a:r>
-              <a:rPr lang="en-CA" sz="1800" dirty="0"/>
-              <a:t>([1, 2, 3, 4]) = 4</a:t>
-            </a:r>
-          </a:p>
-          <a:p>
-            <a:pPr lvl="1"/>
-            <a:r>
-              <a:rPr lang="en-CA" sz="2000" dirty="0"/>
-              <a:t>round(n)</a:t>
-            </a:r>
-          </a:p>
-          <a:p>
-            <a:pPr lvl="2"/>
-            <a:r>
-              <a:rPr lang="en-CA" sz="1800" dirty="0"/>
-              <a:t>Rounds a floating point number to</a:t>
-            </a:r>
-            <a:r>
-              <a:rPr lang="en-CA" sz="1800" i="1" dirty="0"/>
-              <a:t> n </a:t>
-            </a:r>
-            <a:r>
-              <a:rPr lang="en-CA" sz="1800" dirty="0"/>
-              <a:t>decimal places</a:t>
-            </a:r>
-          </a:p>
-          <a:p>
-            <a:pPr lvl="2"/>
-            <a:r>
-              <a:rPr lang="en-CA" sz="1800" dirty="0"/>
-              <a:t>E.g. round(3.141593, 2) = 3.14</a:t>
-            </a:r>
-          </a:p>
-        </p:txBody>
-      </p:sp>
-    </p:spTree>
-    <p:extLst>
-      <p:ext uri="{BB962C8B-B14F-4D97-AF65-F5344CB8AC3E}">
-        <p14:creationId xmlns:p14="http://schemas.microsoft.com/office/powerpoint/2010/main" val="3452023125"/>
-      </p:ext>
-    </p:extLst>
-  </p:cSld>
-  <p:clrMapOvr>
-    <a:masterClrMapping/>
-  </p:clrMapOvr>
-</p:sld>
-</file>
-
-<file path=ppt/slides/slide7.xml><?xml version="1.0" encoding="utf-8"?>
+<file path=ppt/slides/slide13.xml><?xml version="1.0" encoding="utf-8"?>
 <p:sld xmlns:a="http://schemas.openxmlformats.org/drawingml/2006/main" xmlns:r="http://schemas.openxmlformats.org/officeDocument/2006/relationships" xmlns:p="http://schemas.openxmlformats.org/presentationml/2006/main">
   <p:cSld>
     <p:spTree>
@@ -15087,7 +14684,7 @@
         </p:nvSpPr>
         <p:spPr>
           <a:xfrm>
-            <a:off x="1034143" y="2281466"/>
+            <a:off x="173531" y="2286002"/>
             <a:ext cx="3820886" cy="4489450"/>
           </a:xfrm>
         </p:spPr>
@@ -15194,8 +14791,8 @@
         </p:nvSpPr>
         <p:spPr>
           <a:xfrm>
-            <a:off x="5481230" y="2368550"/>
-            <a:ext cx="5676627" cy="4406902"/>
+            <a:off x="3652429" y="2286002"/>
+            <a:ext cx="5159877" cy="4406902"/>
           </a:xfrm>
           <a:prstGeom prst="rect">
             <a:avLst/>
@@ -15434,111 +15031,385 @@
           </a:lstStyle>
           <a:p>
             <a:r>
+              <a:rPr lang="en-CA" sz="2400" dirty="0"/>
+              <a:t>Advanced operations (using </a:t>
+            </a:r>
+            <a:r>
+              <a:rPr lang="en-CA" sz="2400" dirty="0" err="1"/>
+              <a:t>numpy</a:t>
+            </a:r>
+            <a:r>
+              <a:rPr lang="en-CA" sz="2400" dirty="0"/>
+              <a:t>)</a:t>
+            </a:r>
+          </a:p>
+          <a:p>
+            <a:pPr lvl="1"/>
+            <a:r>
               <a:rPr lang="en-CA" sz="2000" dirty="0"/>
-              <a:t>Advanced operations (using </a:t>
-            </a:r>
-            <a:r>
-              <a:rPr lang="en-CA" sz="2000" dirty="0" err="1"/>
-              <a:t>numpy</a:t>
-            </a:r>
+              <a:t>Square root</a:t>
+            </a:r>
+          </a:p>
+          <a:p>
+            <a:pPr lvl="2"/>
+            <a:r>
+              <a:rPr lang="en-CA" sz="1800" dirty="0" err="1"/>
+              <a:t>numpy.sqrt</a:t>
+            </a:r>
+            <a:r>
+              <a:rPr lang="en-CA" sz="1800" dirty="0"/>
+              <a:t>()</a:t>
+            </a:r>
+          </a:p>
+          <a:p>
+            <a:pPr lvl="1"/>
             <a:r>
               <a:rPr lang="en-CA" sz="2000" dirty="0"/>
-              <a:t>)</a:t>
+              <a:t>Natural exponential</a:t>
+            </a:r>
+          </a:p>
+          <a:p>
+            <a:pPr lvl="2"/>
+            <a:r>
+              <a:rPr lang="en-CA" sz="1800" dirty="0" err="1"/>
+              <a:t>numpy.exp</a:t>
+            </a:r>
+            <a:r>
+              <a:rPr lang="en-CA" sz="1800" dirty="0"/>
+              <a:t>()</a:t>
             </a:r>
           </a:p>
           <a:p>
             <a:pPr lvl="1"/>
             <a:r>
+              <a:rPr lang="en-CA" sz="2000" dirty="0"/>
+              <a:t>Mean of an array</a:t>
+            </a:r>
+          </a:p>
+          <a:p>
+            <a:pPr lvl="2"/>
+            <a:r>
+              <a:rPr lang="en-CA" sz="1800" dirty="0" err="1"/>
+              <a:t>numpy.mean</a:t>
+            </a:r>
+            <a:r>
               <a:rPr lang="en-CA" sz="1800" dirty="0"/>
-              <a:t>Square root</a:t>
+              <a:t>()</a:t>
+            </a:r>
+          </a:p>
+          <a:p>
+            <a:pPr lvl="1"/>
+            <a:r>
+              <a:rPr lang="en-CA" sz="2000" dirty="0"/>
+              <a:t>Standard deviation of an array</a:t>
             </a:r>
           </a:p>
           <a:p>
             <a:pPr lvl="2"/>
             <a:r>
-              <a:rPr lang="en-CA" sz="1600" dirty="0" err="1"/>
-              <a:t>numpy.sqrt</a:t>
-            </a:r>
-            <a:r>
-              <a:rPr lang="en-CA" sz="1600" dirty="0"/>
+              <a:rPr lang="en-CA" sz="1800" dirty="0" err="1"/>
+              <a:t>numpy.std</a:t>
+            </a:r>
+            <a:r>
+              <a:rPr lang="en-CA" sz="1800" dirty="0"/>
               <a:t>()</a:t>
             </a:r>
           </a:p>
+        </p:txBody>
+      </p:sp>
+      <p:sp>
+        <p:nvSpPr>
+          <p:cNvPr id="6" name="Content Placeholder 2">
+            <a:extLst>
+              <a:ext uri="{FF2B5EF4-FFF2-40B4-BE49-F238E27FC236}">
+                <a16:creationId xmlns:a16="http://schemas.microsoft.com/office/drawing/2014/main" id="{E7760B52-B2A0-66CF-EC3D-71B8A0B74656}"/>
+              </a:ext>
+            </a:extLst>
+          </p:cNvPr>
+          <p:cNvSpPr txBox="1">
+            <a:spLocks/>
+          </p:cNvSpPr>
+          <p:nvPr/>
+        </p:nvSpPr>
+        <p:spPr>
+          <a:xfrm>
+            <a:off x="7585543" y="3118966"/>
+            <a:ext cx="3957797" cy="3739034"/>
+          </a:xfrm>
+          <a:prstGeom prst="rect">
+            <a:avLst/>
+          </a:prstGeom>
+        </p:spPr>
+        <p:txBody>
+          <a:bodyPr vert="horz" lIns="91440" tIns="45720" rIns="91440" bIns="45720" rtlCol="0">
+            <a:normAutofit/>
+          </a:bodyPr>
+          <a:lstStyle>
+            <a:lvl1pPr marL="342900" indent="-342900" algn="l" defTabSz="457200" rtl="0" eaLnBrk="1" latinLnBrk="0" hangingPunct="1">
+              <a:spcBef>
+                <a:spcPts val="1000"/>
+              </a:spcBef>
+              <a:spcAft>
+                <a:spcPts val="0"/>
+              </a:spcAft>
+              <a:buClr>
+                <a:schemeClr val="accent1"/>
+              </a:buClr>
+              <a:buSzPct val="80000"/>
+              <a:buFont typeface="Wingdings 3" charset="2"/>
+              <a:buChar char=""/>
+              <a:defRPr sz="1800" b="0" i="0" kern="1200">
+                <a:solidFill>
+                  <a:schemeClr val="tx1">
+                    <a:lumMod val="75000"/>
+                    <a:lumOff val="25000"/>
+                  </a:schemeClr>
+                </a:solidFill>
+                <a:latin typeface="+mn-lt"/>
+                <a:ea typeface="+mn-ea"/>
+                <a:cs typeface="+mn-cs"/>
+              </a:defRPr>
+            </a:lvl1pPr>
+            <a:lvl2pPr marL="742950" indent="-285750" algn="l" defTabSz="457200" rtl="0" eaLnBrk="1" latinLnBrk="0" hangingPunct="1">
+              <a:spcBef>
+                <a:spcPts val="1000"/>
+              </a:spcBef>
+              <a:spcAft>
+                <a:spcPts val="0"/>
+              </a:spcAft>
+              <a:buClr>
+                <a:schemeClr val="accent1"/>
+              </a:buClr>
+              <a:buSzPct val="80000"/>
+              <a:buFont typeface="Wingdings 3" charset="2"/>
+              <a:buChar char=""/>
+              <a:defRPr sz="1600" b="0" i="0" kern="1200">
+                <a:solidFill>
+                  <a:schemeClr val="tx1">
+                    <a:lumMod val="75000"/>
+                    <a:lumOff val="25000"/>
+                  </a:schemeClr>
+                </a:solidFill>
+                <a:latin typeface="+mn-lt"/>
+                <a:ea typeface="+mn-ea"/>
+                <a:cs typeface="+mn-cs"/>
+              </a:defRPr>
+            </a:lvl2pPr>
+            <a:lvl3pPr marL="1143000" indent="-228600" algn="l" defTabSz="457200" rtl="0" eaLnBrk="1" latinLnBrk="0" hangingPunct="1">
+              <a:spcBef>
+                <a:spcPts val="1000"/>
+              </a:spcBef>
+              <a:spcAft>
+                <a:spcPts val="0"/>
+              </a:spcAft>
+              <a:buClr>
+                <a:schemeClr val="accent1"/>
+              </a:buClr>
+              <a:buSzPct val="80000"/>
+              <a:buFont typeface="Wingdings 3" charset="2"/>
+              <a:buChar char=""/>
+              <a:defRPr sz="1400" b="0" i="0" kern="1200">
+                <a:solidFill>
+                  <a:schemeClr val="tx1">
+                    <a:lumMod val="75000"/>
+                    <a:lumOff val="25000"/>
+                  </a:schemeClr>
+                </a:solidFill>
+                <a:latin typeface="+mn-lt"/>
+                <a:ea typeface="+mn-ea"/>
+                <a:cs typeface="+mn-cs"/>
+              </a:defRPr>
+            </a:lvl3pPr>
+            <a:lvl4pPr marL="1600200" indent="-228600" algn="l" defTabSz="457200" rtl="0" eaLnBrk="1" latinLnBrk="0" hangingPunct="1">
+              <a:spcBef>
+                <a:spcPts val="1000"/>
+              </a:spcBef>
+              <a:spcAft>
+                <a:spcPts val="0"/>
+              </a:spcAft>
+              <a:buClr>
+                <a:schemeClr val="accent1"/>
+              </a:buClr>
+              <a:buSzPct val="80000"/>
+              <a:buFont typeface="Wingdings 3" charset="2"/>
+              <a:buChar char=""/>
+              <a:defRPr sz="1200" b="0" i="0" kern="1200">
+                <a:solidFill>
+                  <a:schemeClr val="tx1">
+                    <a:lumMod val="75000"/>
+                    <a:lumOff val="25000"/>
+                  </a:schemeClr>
+                </a:solidFill>
+                <a:latin typeface="+mn-lt"/>
+                <a:ea typeface="+mn-ea"/>
+                <a:cs typeface="+mn-cs"/>
+              </a:defRPr>
+            </a:lvl4pPr>
+            <a:lvl5pPr marL="2057400" indent="-228600" algn="l" defTabSz="457200" rtl="0" eaLnBrk="1" latinLnBrk="0" hangingPunct="1">
+              <a:spcBef>
+                <a:spcPts val="1000"/>
+              </a:spcBef>
+              <a:spcAft>
+                <a:spcPts val="0"/>
+              </a:spcAft>
+              <a:buClr>
+                <a:schemeClr val="accent1"/>
+              </a:buClr>
+              <a:buSzPct val="80000"/>
+              <a:buFont typeface="Wingdings 3" charset="2"/>
+              <a:buChar char=""/>
+              <a:defRPr sz="1200" b="0" i="0" kern="1200">
+                <a:solidFill>
+                  <a:schemeClr val="tx1">
+                    <a:lumMod val="75000"/>
+                    <a:lumOff val="25000"/>
+                  </a:schemeClr>
+                </a:solidFill>
+                <a:latin typeface="+mn-lt"/>
+                <a:ea typeface="+mn-ea"/>
+                <a:cs typeface="+mn-cs"/>
+              </a:defRPr>
+            </a:lvl5pPr>
+            <a:lvl6pPr marL="2514600" indent="-228600" algn="l" defTabSz="457200" rtl="0" eaLnBrk="1" latinLnBrk="0" hangingPunct="1">
+              <a:spcBef>
+                <a:spcPts val="1000"/>
+              </a:spcBef>
+              <a:spcAft>
+                <a:spcPts val="0"/>
+              </a:spcAft>
+              <a:buClr>
+                <a:schemeClr val="accent1"/>
+              </a:buClr>
+              <a:buSzPct val="80000"/>
+              <a:buFont typeface="Wingdings 3" charset="2"/>
+              <a:buChar char=""/>
+              <a:defRPr sz="1200" b="0" i="0" kern="1200">
+                <a:solidFill>
+                  <a:schemeClr val="tx1">
+                    <a:lumMod val="75000"/>
+                    <a:lumOff val="25000"/>
+                  </a:schemeClr>
+                </a:solidFill>
+                <a:latin typeface="+mn-lt"/>
+                <a:ea typeface="+mn-ea"/>
+                <a:cs typeface="+mn-cs"/>
+              </a:defRPr>
+            </a:lvl6pPr>
+            <a:lvl7pPr marL="2971800" indent="-228600" algn="l" defTabSz="457200" rtl="0" eaLnBrk="1" latinLnBrk="0" hangingPunct="1">
+              <a:spcBef>
+                <a:spcPts val="1000"/>
+              </a:spcBef>
+              <a:spcAft>
+                <a:spcPts val="0"/>
+              </a:spcAft>
+              <a:buClr>
+                <a:schemeClr val="accent1"/>
+              </a:buClr>
+              <a:buSzPct val="80000"/>
+              <a:buFont typeface="Wingdings 3" charset="2"/>
+              <a:buChar char=""/>
+              <a:defRPr sz="1200" b="0" i="0" kern="1200">
+                <a:solidFill>
+                  <a:schemeClr val="tx1">
+                    <a:lumMod val="75000"/>
+                    <a:lumOff val="25000"/>
+                  </a:schemeClr>
+                </a:solidFill>
+                <a:latin typeface="+mn-lt"/>
+                <a:ea typeface="+mn-ea"/>
+                <a:cs typeface="+mn-cs"/>
+              </a:defRPr>
+            </a:lvl7pPr>
+            <a:lvl8pPr marL="3429000" indent="-228600" algn="l" defTabSz="457200" rtl="0" eaLnBrk="1" latinLnBrk="0" hangingPunct="1">
+              <a:spcBef>
+                <a:spcPts val="1000"/>
+              </a:spcBef>
+              <a:spcAft>
+                <a:spcPts val="0"/>
+              </a:spcAft>
+              <a:buClr>
+                <a:schemeClr val="accent1"/>
+              </a:buClr>
+              <a:buSzPct val="80000"/>
+              <a:buFont typeface="Wingdings 3" charset="2"/>
+              <a:buChar char=""/>
+              <a:defRPr sz="1200" b="0" i="0" kern="1200">
+                <a:solidFill>
+                  <a:schemeClr val="tx1">
+                    <a:lumMod val="75000"/>
+                    <a:lumOff val="25000"/>
+                  </a:schemeClr>
+                </a:solidFill>
+                <a:latin typeface="+mn-lt"/>
+                <a:ea typeface="+mn-ea"/>
+                <a:cs typeface="+mn-cs"/>
+              </a:defRPr>
+            </a:lvl8pPr>
+            <a:lvl9pPr marL="3886200" indent="-228600" algn="l" defTabSz="457200" rtl="0" eaLnBrk="1" latinLnBrk="0" hangingPunct="1">
+              <a:spcBef>
+                <a:spcPts val="1000"/>
+              </a:spcBef>
+              <a:spcAft>
+                <a:spcPts val="0"/>
+              </a:spcAft>
+              <a:buClr>
+                <a:schemeClr val="accent1"/>
+              </a:buClr>
+              <a:buSzPct val="80000"/>
+              <a:buFont typeface="Wingdings 3" charset="2"/>
+              <a:buChar char=""/>
+              <a:defRPr sz="1200" b="0" i="0" kern="1200">
+                <a:solidFill>
+                  <a:schemeClr val="tx1">
+                    <a:lumMod val="75000"/>
+                    <a:lumOff val="25000"/>
+                  </a:schemeClr>
+                </a:solidFill>
+                <a:latin typeface="+mn-lt"/>
+                <a:ea typeface="+mn-ea"/>
+                <a:cs typeface="+mn-cs"/>
+              </a:defRPr>
+            </a:lvl9pPr>
+          </a:lstStyle>
           <a:p>
             <a:pPr lvl="1"/>
             <a:r>
+              <a:rPr lang="en-CA" sz="2000" dirty="0"/>
+              <a:t>Variance of an array</a:t>
+            </a:r>
+          </a:p>
+          <a:p>
+            <a:pPr lvl="2"/>
+            <a:r>
+              <a:rPr lang="en-CA" sz="1800" dirty="0" err="1"/>
+              <a:t>numpy.var</a:t>
+            </a:r>
+            <a:r>
               <a:rPr lang="en-CA" sz="1800" dirty="0"/>
-              <a:t>Natural exponential</a:t>
+              <a:t>()</a:t>
+            </a:r>
+          </a:p>
+          <a:p>
+            <a:pPr lvl="1"/>
+            <a:r>
+              <a:rPr lang="en-CA" sz="2000" dirty="0"/>
+              <a:t>Factorial</a:t>
             </a:r>
           </a:p>
           <a:p>
             <a:pPr lvl="2"/>
             <a:r>
-              <a:rPr lang="en-CA" sz="1600" dirty="0" err="1"/>
-              <a:t>numpy.exp</a:t>
-            </a:r>
-            <a:r>
-              <a:rPr lang="en-CA" sz="1600" dirty="0"/>
+              <a:rPr lang="en-CA" sz="1800" dirty="0" err="1"/>
+              <a:t>numpy.math.factorial</a:t>
+            </a:r>
+            <a:r>
+              <a:rPr lang="en-CA" sz="1800" dirty="0"/>
               <a:t>()</a:t>
             </a:r>
           </a:p>
           <a:p>
-            <a:pPr lvl="1"/>
-            <a:r>
-              <a:rPr lang="en-CA" sz="1800" dirty="0"/>
-              <a:t>Mean of an array</a:t>
-            </a:r>
-          </a:p>
-          <a:p>
             <a:pPr lvl="2"/>
-            <a:r>
-              <a:rPr lang="en-CA" sz="1600" dirty="0" err="1"/>
-              <a:t>numpy.mean</a:t>
-            </a:r>
-            <a:r>
-              <a:rPr lang="en-CA" sz="1600" dirty="0"/>
-              <a:t>()</a:t>
-            </a:r>
-          </a:p>
-          <a:p>
-            <a:pPr lvl="1"/>
-            <a:r>
-              <a:rPr lang="en-CA" sz="1800" dirty="0"/>
-              <a:t>Standard deviation of an array</a:t>
-            </a:r>
-          </a:p>
-          <a:p>
-            <a:pPr lvl="2"/>
-            <a:r>
-              <a:rPr lang="en-CA" sz="1600" dirty="0" err="1"/>
-              <a:t>numpy.std</a:t>
-            </a:r>
-            <a:r>
-              <a:rPr lang="en-CA" sz="1600" dirty="0"/>
-              <a:t>()</a:t>
-            </a:r>
-          </a:p>
-          <a:p>
-            <a:pPr lvl="1"/>
-            <a:r>
-              <a:rPr lang="en-CA" sz="1800" dirty="0"/>
-              <a:t>Variance of an array</a:t>
-            </a:r>
-          </a:p>
-          <a:p>
-            <a:pPr lvl="2"/>
-            <a:r>
-              <a:rPr lang="en-CA" sz="1600" dirty="0" err="1"/>
-              <a:t>numpy.var</a:t>
-            </a:r>
-            <a:r>
-              <a:rPr lang="en-CA" sz="1600" dirty="0"/>
-              <a:t>()</a:t>
-            </a:r>
-          </a:p>
-          <a:p>
-            <a:pPr lvl="2"/>
-            <a:endParaRPr lang="en-CA" sz="1600" dirty="0"/>
+            <a:endParaRPr lang="en-CA" sz="1800" dirty="0"/>
           </a:p>
         </p:txBody>
       </p:sp>
@@ -15555,7 +15426,7 @@
 </p:sld>
 </file>
 
-<file path=ppt/slides/slide8.xml><?xml version="1.0" encoding="utf-8"?>
+<file path=ppt/slides/slide14.xml><?xml version="1.0" encoding="utf-8"?>
 <p:sld xmlns:a="http://schemas.openxmlformats.org/drawingml/2006/main" xmlns:r="http://schemas.openxmlformats.org/officeDocument/2006/relationships" xmlns:p="http://schemas.openxmlformats.org/presentationml/2006/main">
   <p:cSld>
     <p:spTree>
@@ -15774,7 +15645,7 @@
 </p:sld>
 </file>
 
-<file path=ppt/slides/slide9.xml><?xml version="1.0" encoding="utf-8"?>
+<file path=ppt/slides/slide15.xml><?xml version="1.0" encoding="utf-8"?>
 <p:sld xmlns:a="http://schemas.openxmlformats.org/drawingml/2006/main" xmlns:r="http://schemas.openxmlformats.org/officeDocument/2006/relationships" xmlns:p="http://schemas.openxmlformats.org/presentationml/2006/main">
   <p:cSld>
     <p:spTree>
@@ -15961,6 +15832,2832 @@
     <p:extLst>
       <p:ext uri="{BB962C8B-B14F-4D97-AF65-F5344CB8AC3E}">
         <p14:creationId xmlns:p14="http://schemas.microsoft.com/office/powerpoint/2010/main" val="245545103"/>
+      </p:ext>
+    </p:extLst>
+  </p:cSld>
+  <p:clrMapOvr>
+    <a:masterClrMapping/>
+  </p:clrMapOvr>
+</p:sld>
+</file>
+
+<file path=ppt/slides/slide16.xml><?xml version="1.0" encoding="utf-8"?>
+<p:sld xmlns:a="http://schemas.openxmlformats.org/drawingml/2006/main" xmlns:r="http://schemas.openxmlformats.org/officeDocument/2006/relationships" xmlns:p="http://schemas.openxmlformats.org/presentationml/2006/main">
+  <p:cSld>
+    <p:spTree>
+      <p:nvGrpSpPr>
+        <p:cNvPr id="1" name=""/>
+        <p:cNvGrpSpPr/>
+        <p:nvPr/>
+      </p:nvGrpSpPr>
+      <p:grpSpPr>
+        <a:xfrm>
+          <a:off x="0" y="0"/>
+          <a:ext cx="0" cy="0"/>
+          <a:chOff x="0" y="0"/>
+          <a:chExt cx="0" cy="0"/>
+        </a:xfrm>
+      </p:grpSpPr>
+      <p:sp>
+        <p:nvSpPr>
+          <p:cNvPr id="2" name="Title 1">
+            <a:extLst>
+              <a:ext uri="{FF2B5EF4-FFF2-40B4-BE49-F238E27FC236}">
+                <a16:creationId xmlns:a16="http://schemas.microsoft.com/office/drawing/2014/main" id="{6A52CF54-D915-A114-0276-6693824C14E1}"/>
+              </a:ext>
+            </a:extLst>
+          </p:cNvPr>
+          <p:cNvSpPr>
+            <a:spLocks noGrp="1"/>
+          </p:cNvSpPr>
+          <p:nvPr>
+            <p:ph type="title"/>
+          </p:nvPr>
+        </p:nvSpPr>
+        <p:spPr/>
+        <p:txBody>
+          <a:bodyPr/>
+          <a:lstStyle/>
+          <a:p>
+            <a:r>
+              <a:rPr lang="en-CA" dirty="0"/>
+              <a:t>Review Exercises</a:t>
+            </a:r>
+          </a:p>
+        </p:txBody>
+      </p:sp>
+      <p:sp>
+        <p:nvSpPr>
+          <p:cNvPr id="3" name="Content Placeholder 2">
+            <a:extLst>
+              <a:ext uri="{FF2B5EF4-FFF2-40B4-BE49-F238E27FC236}">
+                <a16:creationId xmlns:a16="http://schemas.microsoft.com/office/drawing/2014/main" id="{910141A2-1E03-4F85-3DF6-E12642778538}"/>
+              </a:ext>
+            </a:extLst>
+          </p:cNvPr>
+          <p:cNvSpPr>
+            <a:spLocks noGrp="1"/>
+          </p:cNvSpPr>
+          <p:nvPr>
+            <p:ph idx="1"/>
+          </p:nvPr>
+        </p:nvSpPr>
+        <p:spPr>
+          <a:xfrm>
+            <a:off x="1683170" y="2468032"/>
+            <a:ext cx="8825659" cy="3416300"/>
+          </a:xfrm>
+        </p:spPr>
+        <p:txBody>
+          <a:bodyPr>
+            <a:normAutofit/>
+          </a:bodyPr>
+          <a:lstStyle/>
+          <a:p>
+            <a:r>
+              <a:rPr lang="en-CA" sz="2400" dirty="0"/>
+              <a:t>Let’s work through all the exercises for Week 5 today!</a:t>
+            </a:r>
+          </a:p>
+        </p:txBody>
+      </p:sp>
+    </p:spTree>
+    <p:extLst>
+      <p:ext uri="{BB962C8B-B14F-4D97-AF65-F5344CB8AC3E}">
+        <p14:creationId xmlns:p14="http://schemas.microsoft.com/office/powerpoint/2010/main" val="251330630"/>
+      </p:ext>
+    </p:extLst>
+  </p:cSld>
+  <p:clrMapOvr>
+    <a:masterClrMapping/>
+  </p:clrMapOvr>
+</p:sld>
+</file>
+
+<file path=ppt/slides/slide2.xml><?xml version="1.0" encoding="utf-8"?>
+<p:sld xmlns:a="http://schemas.openxmlformats.org/drawingml/2006/main" xmlns:r="http://schemas.openxmlformats.org/officeDocument/2006/relationships" xmlns:p="http://schemas.openxmlformats.org/presentationml/2006/main">
+  <p:cSld>
+    <p:spTree>
+      <p:nvGrpSpPr>
+        <p:cNvPr id="1" name=""/>
+        <p:cNvGrpSpPr/>
+        <p:nvPr/>
+      </p:nvGrpSpPr>
+      <p:grpSpPr>
+        <a:xfrm>
+          <a:off x="0" y="0"/>
+          <a:ext cx="0" cy="0"/>
+          <a:chOff x="0" y="0"/>
+          <a:chExt cx="0" cy="0"/>
+        </a:xfrm>
+      </p:grpSpPr>
+      <p:sp>
+        <p:nvSpPr>
+          <p:cNvPr id="2" name="Title 1">
+            <a:extLst>
+              <a:ext uri="{FF2B5EF4-FFF2-40B4-BE49-F238E27FC236}">
+                <a16:creationId xmlns:a16="http://schemas.microsoft.com/office/drawing/2014/main" id="{3ADF0212-B1D3-9CC0-EFD6-07689E8FE279}"/>
+              </a:ext>
+            </a:extLst>
+          </p:cNvPr>
+          <p:cNvSpPr>
+            <a:spLocks noGrp="1"/>
+          </p:cNvSpPr>
+          <p:nvPr>
+            <p:ph type="title"/>
+          </p:nvPr>
+        </p:nvSpPr>
+        <p:spPr/>
+        <p:txBody>
+          <a:bodyPr/>
+          <a:lstStyle/>
+          <a:p>
+            <a:r>
+              <a:rPr lang="en-CA" dirty="0"/>
+              <a:t>What we learned so far…</a:t>
+            </a:r>
+          </a:p>
+        </p:txBody>
+      </p:sp>
+      <p:sp>
+        <p:nvSpPr>
+          <p:cNvPr id="3" name="Content Placeholder 2">
+            <a:extLst>
+              <a:ext uri="{FF2B5EF4-FFF2-40B4-BE49-F238E27FC236}">
+                <a16:creationId xmlns:a16="http://schemas.microsoft.com/office/drawing/2014/main" id="{B316358C-FDE3-B022-6258-5E763F545C75}"/>
+              </a:ext>
+            </a:extLst>
+          </p:cNvPr>
+          <p:cNvSpPr>
+            <a:spLocks noGrp="1"/>
+          </p:cNvSpPr>
+          <p:nvPr>
+            <p:ph idx="1"/>
+          </p:nvPr>
+        </p:nvSpPr>
+        <p:spPr>
+          <a:xfrm>
+            <a:off x="1154954" y="2636157"/>
+            <a:ext cx="8825659" cy="945243"/>
+          </a:xfrm>
+        </p:spPr>
+        <p:txBody>
+          <a:bodyPr>
+            <a:normAutofit/>
+          </a:bodyPr>
+          <a:lstStyle/>
+          <a:p>
+            <a:r>
+              <a:rPr lang="en-CA" sz="2000" dirty="0"/>
+              <a:t>We’re already halfway through the course!</a:t>
+            </a:r>
+          </a:p>
+          <a:p>
+            <a:r>
+              <a:rPr lang="en-CA" sz="2000" dirty="0"/>
+              <a:t>We’ll take some time to review what we did so far…</a:t>
+            </a:r>
+          </a:p>
+        </p:txBody>
+      </p:sp>
+      <p:sp>
+        <p:nvSpPr>
+          <p:cNvPr id="4" name="Content Placeholder 2">
+            <a:extLst>
+              <a:ext uri="{FF2B5EF4-FFF2-40B4-BE49-F238E27FC236}">
+                <a16:creationId xmlns:a16="http://schemas.microsoft.com/office/drawing/2014/main" id="{D347D111-8AC3-2670-CAB6-D8FE00EF09B5}"/>
+              </a:ext>
+            </a:extLst>
+          </p:cNvPr>
+          <p:cNvSpPr txBox="1">
+            <a:spLocks/>
+          </p:cNvSpPr>
+          <p:nvPr/>
+        </p:nvSpPr>
+        <p:spPr>
+          <a:xfrm>
+            <a:off x="1041997" y="3859133"/>
+            <a:ext cx="4929091" cy="2029279"/>
+          </a:xfrm>
+          <a:prstGeom prst="rect">
+            <a:avLst/>
+          </a:prstGeom>
+        </p:spPr>
+        <p:txBody>
+          <a:bodyPr vert="horz" lIns="91440" tIns="45720" rIns="91440" bIns="45720" rtlCol="0">
+            <a:normAutofit/>
+          </a:bodyPr>
+          <a:lstStyle>
+            <a:lvl1pPr marL="342900" indent="-342900" algn="l" defTabSz="457200" rtl="0" eaLnBrk="1" latinLnBrk="0" hangingPunct="1">
+              <a:spcBef>
+                <a:spcPts val="1000"/>
+              </a:spcBef>
+              <a:spcAft>
+                <a:spcPts val="0"/>
+              </a:spcAft>
+              <a:buClr>
+                <a:schemeClr val="accent1"/>
+              </a:buClr>
+              <a:buSzPct val="80000"/>
+              <a:buFont typeface="Wingdings 3" charset="2"/>
+              <a:buChar char=""/>
+              <a:defRPr sz="1800" b="0" i="0" kern="1200">
+                <a:solidFill>
+                  <a:schemeClr val="tx1">
+                    <a:lumMod val="75000"/>
+                    <a:lumOff val="25000"/>
+                  </a:schemeClr>
+                </a:solidFill>
+                <a:latin typeface="+mn-lt"/>
+                <a:ea typeface="+mn-ea"/>
+                <a:cs typeface="+mn-cs"/>
+              </a:defRPr>
+            </a:lvl1pPr>
+            <a:lvl2pPr marL="742950" indent="-285750" algn="l" defTabSz="457200" rtl="0" eaLnBrk="1" latinLnBrk="0" hangingPunct="1">
+              <a:spcBef>
+                <a:spcPts val="1000"/>
+              </a:spcBef>
+              <a:spcAft>
+                <a:spcPts val="0"/>
+              </a:spcAft>
+              <a:buClr>
+                <a:schemeClr val="accent1"/>
+              </a:buClr>
+              <a:buSzPct val="80000"/>
+              <a:buFont typeface="Wingdings 3" charset="2"/>
+              <a:buChar char=""/>
+              <a:defRPr sz="1600" b="0" i="0" kern="1200">
+                <a:solidFill>
+                  <a:schemeClr val="tx1">
+                    <a:lumMod val="75000"/>
+                    <a:lumOff val="25000"/>
+                  </a:schemeClr>
+                </a:solidFill>
+                <a:latin typeface="+mn-lt"/>
+                <a:ea typeface="+mn-ea"/>
+                <a:cs typeface="+mn-cs"/>
+              </a:defRPr>
+            </a:lvl2pPr>
+            <a:lvl3pPr marL="1143000" indent="-228600" algn="l" defTabSz="457200" rtl="0" eaLnBrk="1" latinLnBrk="0" hangingPunct="1">
+              <a:spcBef>
+                <a:spcPts val="1000"/>
+              </a:spcBef>
+              <a:spcAft>
+                <a:spcPts val="0"/>
+              </a:spcAft>
+              <a:buClr>
+                <a:schemeClr val="accent1"/>
+              </a:buClr>
+              <a:buSzPct val="80000"/>
+              <a:buFont typeface="Wingdings 3" charset="2"/>
+              <a:buChar char=""/>
+              <a:defRPr sz="1400" b="0" i="0" kern="1200">
+                <a:solidFill>
+                  <a:schemeClr val="tx1">
+                    <a:lumMod val="75000"/>
+                    <a:lumOff val="25000"/>
+                  </a:schemeClr>
+                </a:solidFill>
+                <a:latin typeface="+mn-lt"/>
+                <a:ea typeface="+mn-ea"/>
+                <a:cs typeface="+mn-cs"/>
+              </a:defRPr>
+            </a:lvl3pPr>
+            <a:lvl4pPr marL="1600200" indent="-228600" algn="l" defTabSz="457200" rtl="0" eaLnBrk="1" latinLnBrk="0" hangingPunct="1">
+              <a:spcBef>
+                <a:spcPts val="1000"/>
+              </a:spcBef>
+              <a:spcAft>
+                <a:spcPts val="0"/>
+              </a:spcAft>
+              <a:buClr>
+                <a:schemeClr val="accent1"/>
+              </a:buClr>
+              <a:buSzPct val="80000"/>
+              <a:buFont typeface="Wingdings 3" charset="2"/>
+              <a:buChar char=""/>
+              <a:defRPr sz="1200" b="0" i="0" kern="1200">
+                <a:solidFill>
+                  <a:schemeClr val="tx1">
+                    <a:lumMod val="75000"/>
+                    <a:lumOff val="25000"/>
+                  </a:schemeClr>
+                </a:solidFill>
+                <a:latin typeface="+mn-lt"/>
+                <a:ea typeface="+mn-ea"/>
+                <a:cs typeface="+mn-cs"/>
+              </a:defRPr>
+            </a:lvl4pPr>
+            <a:lvl5pPr marL="2057400" indent="-228600" algn="l" defTabSz="457200" rtl="0" eaLnBrk="1" latinLnBrk="0" hangingPunct="1">
+              <a:spcBef>
+                <a:spcPts val="1000"/>
+              </a:spcBef>
+              <a:spcAft>
+                <a:spcPts val="0"/>
+              </a:spcAft>
+              <a:buClr>
+                <a:schemeClr val="accent1"/>
+              </a:buClr>
+              <a:buSzPct val="80000"/>
+              <a:buFont typeface="Wingdings 3" charset="2"/>
+              <a:buChar char=""/>
+              <a:defRPr sz="1200" b="0" i="0" kern="1200">
+                <a:solidFill>
+                  <a:schemeClr val="tx1">
+                    <a:lumMod val="75000"/>
+                    <a:lumOff val="25000"/>
+                  </a:schemeClr>
+                </a:solidFill>
+                <a:latin typeface="+mn-lt"/>
+                <a:ea typeface="+mn-ea"/>
+                <a:cs typeface="+mn-cs"/>
+              </a:defRPr>
+            </a:lvl5pPr>
+            <a:lvl6pPr marL="2514600" indent="-228600" algn="l" defTabSz="457200" rtl="0" eaLnBrk="1" latinLnBrk="0" hangingPunct="1">
+              <a:spcBef>
+                <a:spcPts val="1000"/>
+              </a:spcBef>
+              <a:spcAft>
+                <a:spcPts val="0"/>
+              </a:spcAft>
+              <a:buClr>
+                <a:schemeClr val="accent1"/>
+              </a:buClr>
+              <a:buSzPct val="80000"/>
+              <a:buFont typeface="Wingdings 3" charset="2"/>
+              <a:buChar char=""/>
+              <a:defRPr sz="1200" b="0" i="0" kern="1200">
+                <a:solidFill>
+                  <a:schemeClr val="tx1">
+                    <a:lumMod val="75000"/>
+                    <a:lumOff val="25000"/>
+                  </a:schemeClr>
+                </a:solidFill>
+                <a:latin typeface="+mn-lt"/>
+                <a:ea typeface="+mn-ea"/>
+                <a:cs typeface="+mn-cs"/>
+              </a:defRPr>
+            </a:lvl6pPr>
+            <a:lvl7pPr marL="2971800" indent="-228600" algn="l" defTabSz="457200" rtl="0" eaLnBrk="1" latinLnBrk="0" hangingPunct="1">
+              <a:spcBef>
+                <a:spcPts val="1000"/>
+              </a:spcBef>
+              <a:spcAft>
+                <a:spcPts val="0"/>
+              </a:spcAft>
+              <a:buClr>
+                <a:schemeClr val="accent1"/>
+              </a:buClr>
+              <a:buSzPct val="80000"/>
+              <a:buFont typeface="Wingdings 3" charset="2"/>
+              <a:buChar char=""/>
+              <a:defRPr sz="1200" b="0" i="0" kern="1200">
+                <a:solidFill>
+                  <a:schemeClr val="tx1">
+                    <a:lumMod val="75000"/>
+                    <a:lumOff val="25000"/>
+                  </a:schemeClr>
+                </a:solidFill>
+                <a:latin typeface="+mn-lt"/>
+                <a:ea typeface="+mn-ea"/>
+                <a:cs typeface="+mn-cs"/>
+              </a:defRPr>
+            </a:lvl7pPr>
+            <a:lvl8pPr marL="3429000" indent="-228600" algn="l" defTabSz="457200" rtl="0" eaLnBrk="1" latinLnBrk="0" hangingPunct="1">
+              <a:spcBef>
+                <a:spcPts val="1000"/>
+              </a:spcBef>
+              <a:spcAft>
+                <a:spcPts val="0"/>
+              </a:spcAft>
+              <a:buClr>
+                <a:schemeClr val="accent1"/>
+              </a:buClr>
+              <a:buSzPct val="80000"/>
+              <a:buFont typeface="Wingdings 3" charset="2"/>
+              <a:buChar char=""/>
+              <a:defRPr sz="1200" b="0" i="0" kern="1200">
+                <a:solidFill>
+                  <a:schemeClr val="tx1">
+                    <a:lumMod val="75000"/>
+                    <a:lumOff val="25000"/>
+                  </a:schemeClr>
+                </a:solidFill>
+                <a:latin typeface="+mn-lt"/>
+                <a:ea typeface="+mn-ea"/>
+                <a:cs typeface="+mn-cs"/>
+              </a:defRPr>
+            </a:lvl8pPr>
+            <a:lvl9pPr marL="3886200" indent="-228600" algn="l" defTabSz="457200" rtl="0" eaLnBrk="1" latinLnBrk="0" hangingPunct="1">
+              <a:spcBef>
+                <a:spcPts val="1000"/>
+              </a:spcBef>
+              <a:spcAft>
+                <a:spcPts val="0"/>
+              </a:spcAft>
+              <a:buClr>
+                <a:schemeClr val="accent1"/>
+              </a:buClr>
+              <a:buSzPct val="80000"/>
+              <a:buFont typeface="Wingdings 3" charset="2"/>
+              <a:buChar char=""/>
+              <a:defRPr sz="1200" b="0" i="0" kern="1200">
+                <a:solidFill>
+                  <a:schemeClr val="tx1">
+                    <a:lumMod val="75000"/>
+                    <a:lumOff val="25000"/>
+                  </a:schemeClr>
+                </a:solidFill>
+                <a:latin typeface="+mn-lt"/>
+                <a:ea typeface="+mn-ea"/>
+                <a:cs typeface="+mn-cs"/>
+              </a:defRPr>
+            </a:lvl9pPr>
+          </a:lstStyle>
+          <a:p>
+            <a:r>
+              <a:rPr lang="en-CA" sz="2400" dirty="0"/>
+              <a:t>Objects:</a:t>
+            </a:r>
+          </a:p>
+          <a:p>
+            <a:pPr lvl="1"/>
+            <a:r>
+              <a:rPr lang="en-CA" sz="2000" dirty="0"/>
+              <a:t>Strings</a:t>
+            </a:r>
+          </a:p>
+          <a:p>
+            <a:pPr lvl="2"/>
+            <a:r>
+              <a:rPr lang="en-CA" sz="1800" dirty="0"/>
+              <a:t>Represent specific text enclosed in quotation marks</a:t>
+            </a:r>
+          </a:p>
+          <a:p>
+            <a:pPr lvl="2"/>
+            <a:r>
+              <a:rPr lang="en-CA" sz="1800" dirty="0"/>
+              <a:t>E.g. name = “Jade”</a:t>
+            </a:r>
+          </a:p>
+        </p:txBody>
+      </p:sp>
+      <p:sp>
+        <p:nvSpPr>
+          <p:cNvPr id="5" name="Content Placeholder 2">
+            <a:extLst>
+              <a:ext uri="{FF2B5EF4-FFF2-40B4-BE49-F238E27FC236}">
+                <a16:creationId xmlns:a16="http://schemas.microsoft.com/office/drawing/2014/main" id="{B07E4BA6-CAFB-4779-4473-0A01F0A8140F}"/>
+              </a:ext>
+            </a:extLst>
+          </p:cNvPr>
+          <p:cNvSpPr txBox="1">
+            <a:spLocks/>
+          </p:cNvSpPr>
+          <p:nvPr/>
+        </p:nvSpPr>
+        <p:spPr>
+          <a:xfrm>
+            <a:off x="6065479" y="3859133"/>
+            <a:ext cx="6126521" cy="2434320"/>
+          </a:xfrm>
+          <a:prstGeom prst="rect">
+            <a:avLst/>
+          </a:prstGeom>
+        </p:spPr>
+        <p:txBody>
+          <a:bodyPr vert="horz" lIns="91440" tIns="45720" rIns="91440" bIns="45720" rtlCol="0">
+            <a:normAutofit/>
+          </a:bodyPr>
+          <a:lstStyle>
+            <a:lvl1pPr marL="342900" indent="-342900" algn="l" defTabSz="457200" rtl="0" eaLnBrk="1" latinLnBrk="0" hangingPunct="1">
+              <a:spcBef>
+                <a:spcPts val="1000"/>
+              </a:spcBef>
+              <a:spcAft>
+                <a:spcPts val="0"/>
+              </a:spcAft>
+              <a:buClr>
+                <a:schemeClr val="accent1"/>
+              </a:buClr>
+              <a:buSzPct val="80000"/>
+              <a:buFont typeface="Wingdings 3" charset="2"/>
+              <a:buChar char=""/>
+              <a:defRPr sz="1800" b="0" i="0" kern="1200">
+                <a:solidFill>
+                  <a:schemeClr val="tx1">
+                    <a:lumMod val="75000"/>
+                    <a:lumOff val="25000"/>
+                  </a:schemeClr>
+                </a:solidFill>
+                <a:latin typeface="+mn-lt"/>
+                <a:ea typeface="+mn-ea"/>
+                <a:cs typeface="+mn-cs"/>
+              </a:defRPr>
+            </a:lvl1pPr>
+            <a:lvl2pPr marL="742950" indent="-285750" algn="l" defTabSz="457200" rtl="0" eaLnBrk="1" latinLnBrk="0" hangingPunct="1">
+              <a:spcBef>
+                <a:spcPts val="1000"/>
+              </a:spcBef>
+              <a:spcAft>
+                <a:spcPts val="0"/>
+              </a:spcAft>
+              <a:buClr>
+                <a:schemeClr val="accent1"/>
+              </a:buClr>
+              <a:buSzPct val="80000"/>
+              <a:buFont typeface="Wingdings 3" charset="2"/>
+              <a:buChar char=""/>
+              <a:defRPr sz="1600" b="0" i="0" kern="1200">
+                <a:solidFill>
+                  <a:schemeClr val="tx1">
+                    <a:lumMod val="75000"/>
+                    <a:lumOff val="25000"/>
+                  </a:schemeClr>
+                </a:solidFill>
+                <a:latin typeface="+mn-lt"/>
+                <a:ea typeface="+mn-ea"/>
+                <a:cs typeface="+mn-cs"/>
+              </a:defRPr>
+            </a:lvl2pPr>
+            <a:lvl3pPr marL="1143000" indent="-228600" algn="l" defTabSz="457200" rtl="0" eaLnBrk="1" latinLnBrk="0" hangingPunct="1">
+              <a:spcBef>
+                <a:spcPts val="1000"/>
+              </a:spcBef>
+              <a:spcAft>
+                <a:spcPts val="0"/>
+              </a:spcAft>
+              <a:buClr>
+                <a:schemeClr val="accent1"/>
+              </a:buClr>
+              <a:buSzPct val="80000"/>
+              <a:buFont typeface="Wingdings 3" charset="2"/>
+              <a:buChar char=""/>
+              <a:defRPr sz="1400" b="0" i="0" kern="1200">
+                <a:solidFill>
+                  <a:schemeClr val="tx1">
+                    <a:lumMod val="75000"/>
+                    <a:lumOff val="25000"/>
+                  </a:schemeClr>
+                </a:solidFill>
+                <a:latin typeface="+mn-lt"/>
+                <a:ea typeface="+mn-ea"/>
+                <a:cs typeface="+mn-cs"/>
+              </a:defRPr>
+            </a:lvl3pPr>
+            <a:lvl4pPr marL="1600200" indent="-228600" algn="l" defTabSz="457200" rtl="0" eaLnBrk="1" latinLnBrk="0" hangingPunct="1">
+              <a:spcBef>
+                <a:spcPts val="1000"/>
+              </a:spcBef>
+              <a:spcAft>
+                <a:spcPts val="0"/>
+              </a:spcAft>
+              <a:buClr>
+                <a:schemeClr val="accent1"/>
+              </a:buClr>
+              <a:buSzPct val="80000"/>
+              <a:buFont typeface="Wingdings 3" charset="2"/>
+              <a:buChar char=""/>
+              <a:defRPr sz="1200" b="0" i="0" kern="1200">
+                <a:solidFill>
+                  <a:schemeClr val="tx1">
+                    <a:lumMod val="75000"/>
+                    <a:lumOff val="25000"/>
+                  </a:schemeClr>
+                </a:solidFill>
+                <a:latin typeface="+mn-lt"/>
+                <a:ea typeface="+mn-ea"/>
+                <a:cs typeface="+mn-cs"/>
+              </a:defRPr>
+            </a:lvl4pPr>
+            <a:lvl5pPr marL="2057400" indent="-228600" algn="l" defTabSz="457200" rtl="0" eaLnBrk="1" latinLnBrk="0" hangingPunct="1">
+              <a:spcBef>
+                <a:spcPts val="1000"/>
+              </a:spcBef>
+              <a:spcAft>
+                <a:spcPts val="0"/>
+              </a:spcAft>
+              <a:buClr>
+                <a:schemeClr val="accent1"/>
+              </a:buClr>
+              <a:buSzPct val="80000"/>
+              <a:buFont typeface="Wingdings 3" charset="2"/>
+              <a:buChar char=""/>
+              <a:defRPr sz="1200" b="0" i="0" kern="1200">
+                <a:solidFill>
+                  <a:schemeClr val="tx1">
+                    <a:lumMod val="75000"/>
+                    <a:lumOff val="25000"/>
+                  </a:schemeClr>
+                </a:solidFill>
+                <a:latin typeface="+mn-lt"/>
+                <a:ea typeface="+mn-ea"/>
+                <a:cs typeface="+mn-cs"/>
+              </a:defRPr>
+            </a:lvl5pPr>
+            <a:lvl6pPr marL="2514600" indent="-228600" algn="l" defTabSz="457200" rtl="0" eaLnBrk="1" latinLnBrk="0" hangingPunct="1">
+              <a:spcBef>
+                <a:spcPts val="1000"/>
+              </a:spcBef>
+              <a:spcAft>
+                <a:spcPts val="0"/>
+              </a:spcAft>
+              <a:buClr>
+                <a:schemeClr val="accent1"/>
+              </a:buClr>
+              <a:buSzPct val="80000"/>
+              <a:buFont typeface="Wingdings 3" charset="2"/>
+              <a:buChar char=""/>
+              <a:defRPr sz="1200" b="0" i="0" kern="1200">
+                <a:solidFill>
+                  <a:schemeClr val="tx1">
+                    <a:lumMod val="75000"/>
+                    <a:lumOff val="25000"/>
+                  </a:schemeClr>
+                </a:solidFill>
+                <a:latin typeface="+mn-lt"/>
+                <a:ea typeface="+mn-ea"/>
+                <a:cs typeface="+mn-cs"/>
+              </a:defRPr>
+            </a:lvl6pPr>
+            <a:lvl7pPr marL="2971800" indent="-228600" algn="l" defTabSz="457200" rtl="0" eaLnBrk="1" latinLnBrk="0" hangingPunct="1">
+              <a:spcBef>
+                <a:spcPts val="1000"/>
+              </a:spcBef>
+              <a:spcAft>
+                <a:spcPts val="0"/>
+              </a:spcAft>
+              <a:buClr>
+                <a:schemeClr val="accent1"/>
+              </a:buClr>
+              <a:buSzPct val="80000"/>
+              <a:buFont typeface="Wingdings 3" charset="2"/>
+              <a:buChar char=""/>
+              <a:defRPr sz="1200" b="0" i="0" kern="1200">
+                <a:solidFill>
+                  <a:schemeClr val="tx1">
+                    <a:lumMod val="75000"/>
+                    <a:lumOff val="25000"/>
+                  </a:schemeClr>
+                </a:solidFill>
+                <a:latin typeface="+mn-lt"/>
+                <a:ea typeface="+mn-ea"/>
+                <a:cs typeface="+mn-cs"/>
+              </a:defRPr>
+            </a:lvl7pPr>
+            <a:lvl8pPr marL="3429000" indent="-228600" algn="l" defTabSz="457200" rtl="0" eaLnBrk="1" latinLnBrk="0" hangingPunct="1">
+              <a:spcBef>
+                <a:spcPts val="1000"/>
+              </a:spcBef>
+              <a:spcAft>
+                <a:spcPts val="0"/>
+              </a:spcAft>
+              <a:buClr>
+                <a:schemeClr val="accent1"/>
+              </a:buClr>
+              <a:buSzPct val="80000"/>
+              <a:buFont typeface="Wingdings 3" charset="2"/>
+              <a:buChar char=""/>
+              <a:defRPr sz="1200" b="0" i="0" kern="1200">
+                <a:solidFill>
+                  <a:schemeClr val="tx1">
+                    <a:lumMod val="75000"/>
+                    <a:lumOff val="25000"/>
+                  </a:schemeClr>
+                </a:solidFill>
+                <a:latin typeface="+mn-lt"/>
+                <a:ea typeface="+mn-ea"/>
+                <a:cs typeface="+mn-cs"/>
+              </a:defRPr>
+            </a:lvl8pPr>
+            <a:lvl9pPr marL="3886200" indent="-228600" algn="l" defTabSz="457200" rtl="0" eaLnBrk="1" latinLnBrk="0" hangingPunct="1">
+              <a:spcBef>
+                <a:spcPts val="1000"/>
+              </a:spcBef>
+              <a:spcAft>
+                <a:spcPts val="0"/>
+              </a:spcAft>
+              <a:buClr>
+                <a:schemeClr val="accent1"/>
+              </a:buClr>
+              <a:buSzPct val="80000"/>
+              <a:buFont typeface="Wingdings 3" charset="2"/>
+              <a:buChar char=""/>
+              <a:defRPr sz="1200" b="0" i="0" kern="1200">
+                <a:solidFill>
+                  <a:schemeClr val="tx1">
+                    <a:lumMod val="75000"/>
+                    <a:lumOff val="25000"/>
+                  </a:schemeClr>
+                </a:solidFill>
+                <a:latin typeface="+mn-lt"/>
+                <a:ea typeface="+mn-ea"/>
+                <a:cs typeface="+mn-cs"/>
+              </a:defRPr>
+            </a:lvl9pPr>
+          </a:lstStyle>
+          <a:p>
+            <a:pPr lvl="1"/>
+            <a:r>
+              <a:rPr lang="en-CA" sz="1800" dirty="0"/>
+              <a:t>Integers</a:t>
+            </a:r>
+          </a:p>
+          <a:p>
+            <a:pPr lvl="2"/>
+            <a:r>
+              <a:rPr lang="en-CA" sz="1600" dirty="0"/>
+              <a:t>Round numbers (no decimal places)</a:t>
+            </a:r>
+          </a:p>
+          <a:p>
+            <a:pPr lvl="2"/>
+            <a:r>
+              <a:rPr lang="en-CA" sz="1600" dirty="0"/>
+              <a:t>E.g. 42</a:t>
+            </a:r>
+          </a:p>
+          <a:p>
+            <a:pPr lvl="1"/>
+            <a:r>
+              <a:rPr lang="en-CA" sz="1800" dirty="0"/>
+              <a:t>Floating point numbers (float)</a:t>
+            </a:r>
+          </a:p>
+          <a:p>
+            <a:pPr lvl="2"/>
+            <a:r>
+              <a:rPr lang="en-CA" sz="1600" dirty="0"/>
+              <a:t>Numbers with decimal places</a:t>
+            </a:r>
+          </a:p>
+          <a:p>
+            <a:pPr lvl="2"/>
+            <a:r>
+              <a:rPr lang="en-CA" sz="1600" dirty="0"/>
+              <a:t>E.g. 42.0</a:t>
+            </a:r>
+          </a:p>
+          <a:p>
+            <a:pPr lvl="2"/>
+            <a:endParaRPr lang="en-CA" sz="1600" dirty="0"/>
+          </a:p>
+        </p:txBody>
+      </p:sp>
+    </p:spTree>
+    <p:extLst>
+      <p:ext uri="{BB962C8B-B14F-4D97-AF65-F5344CB8AC3E}">
+        <p14:creationId xmlns:p14="http://schemas.microsoft.com/office/powerpoint/2010/main" val="3979916045"/>
+      </p:ext>
+    </p:extLst>
+  </p:cSld>
+  <p:clrMapOvr>
+    <a:masterClrMapping/>
+  </p:clrMapOvr>
+</p:sld>
+</file>
+
+<file path=ppt/slides/slide3.xml><?xml version="1.0" encoding="utf-8"?>
+<p:sld xmlns:a="http://schemas.openxmlformats.org/drawingml/2006/main" xmlns:r="http://schemas.openxmlformats.org/officeDocument/2006/relationships" xmlns:p="http://schemas.openxmlformats.org/presentationml/2006/main">
+  <p:cSld>
+    <p:spTree>
+      <p:nvGrpSpPr>
+        <p:cNvPr id="1" name=""/>
+        <p:cNvGrpSpPr/>
+        <p:nvPr/>
+      </p:nvGrpSpPr>
+      <p:grpSpPr>
+        <a:xfrm>
+          <a:off x="0" y="0"/>
+          <a:ext cx="0" cy="0"/>
+          <a:chOff x="0" y="0"/>
+          <a:chExt cx="0" cy="0"/>
+        </a:xfrm>
+      </p:grpSpPr>
+      <p:sp>
+        <p:nvSpPr>
+          <p:cNvPr id="2" name="Title 1">
+            <a:extLst>
+              <a:ext uri="{FF2B5EF4-FFF2-40B4-BE49-F238E27FC236}">
+                <a16:creationId xmlns:a16="http://schemas.microsoft.com/office/drawing/2014/main" id="{B5058D07-BDB4-0507-2A23-3ED383A390EC}"/>
+              </a:ext>
+            </a:extLst>
+          </p:cNvPr>
+          <p:cNvSpPr>
+            <a:spLocks noGrp="1"/>
+          </p:cNvSpPr>
+          <p:nvPr>
+            <p:ph type="title"/>
+          </p:nvPr>
+        </p:nvSpPr>
+        <p:spPr/>
+        <p:txBody>
+          <a:bodyPr/>
+          <a:lstStyle/>
+          <a:p>
+            <a:r>
+              <a:rPr lang="en-CA" dirty="0"/>
+              <a:t>What we learned so far…</a:t>
+            </a:r>
+          </a:p>
+        </p:txBody>
+      </p:sp>
+      <p:sp>
+        <p:nvSpPr>
+          <p:cNvPr id="3" name="Content Placeholder 2">
+            <a:extLst>
+              <a:ext uri="{FF2B5EF4-FFF2-40B4-BE49-F238E27FC236}">
+                <a16:creationId xmlns:a16="http://schemas.microsoft.com/office/drawing/2014/main" id="{86FA524D-D4D8-D3EB-1167-57EC3CDE9F2F}"/>
+              </a:ext>
+            </a:extLst>
+          </p:cNvPr>
+          <p:cNvSpPr>
+            <a:spLocks noGrp="1"/>
+          </p:cNvSpPr>
+          <p:nvPr>
+            <p:ph idx="1"/>
+          </p:nvPr>
+        </p:nvSpPr>
+        <p:spPr>
+          <a:xfrm>
+            <a:off x="338465" y="2407556"/>
+            <a:ext cx="5632029" cy="4265385"/>
+          </a:xfrm>
+        </p:spPr>
+        <p:txBody>
+          <a:bodyPr>
+            <a:normAutofit/>
+          </a:bodyPr>
+          <a:lstStyle/>
+          <a:p>
+            <a:r>
+              <a:rPr lang="en-CA" sz="2400" dirty="0"/>
+              <a:t>Objects (cont.)</a:t>
+            </a:r>
+          </a:p>
+          <a:p>
+            <a:pPr lvl="1"/>
+            <a:r>
+              <a:rPr lang="en-CA" sz="2000" dirty="0"/>
+              <a:t>Lists</a:t>
+            </a:r>
+          </a:p>
+          <a:p>
+            <a:pPr lvl="2"/>
+            <a:r>
+              <a:rPr lang="en-CA" sz="1800" dirty="0"/>
+              <a:t>Used to store several objects</a:t>
+            </a:r>
+          </a:p>
+          <a:p>
+            <a:pPr lvl="2"/>
+            <a:r>
+              <a:rPr lang="en-CA" sz="1800" dirty="0"/>
+              <a:t>E.g. [“hello”, “world”, 24, 8.2]</a:t>
+            </a:r>
+          </a:p>
+          <a:p>
+            <a:pPr lvl="1"/>
+            <a:r>
+              <a:rPr lang="en-CA" sz="2000" dirty="0"/>
+              <a:t>Arrays</a:t>
+            </a:r>
+          </a:p>
+          <a:p>
+            <a:pPr lvl="2"/>
+            <a:r>
+              <a:rPr lang="en-CA" sz="1800" dirty="0"/>
+              <a:t>From </a:t>
+            </a:r>
+            <a:r>
+              <a:rPr lang="en-CA" sz="1800" dirty="0" err="1">
+                <a:latin typeface="Courier New" panose="02070309020205020404" pitchFamily="49" charset="0"/>
+                <a:cs typeface="Courier New" panose="02070309020205020404" pitchFamily="49" charset="0"/>
+              </a:rPr>
+              <a:t>numpy</a:t>
+            </a:r>
+            <a:r>
+              <a:rPr lang="en-CA" sz="1800" dirty="0"/>
+              <a:t> package</a:t>
+            </a:r>
+          </a:p>
+          <a:p>
+            <a:pPr lvl="2"/>
+            <a:r>
+              <a:rPr lang="en-CA" sz="1800" dirty="0"/>
+              <a:t>Similar to lists, but can also perform element-wise operations</a:t>
+            </a:r>
+          </a:p>
+          <a:p>
+            <a:pPr lvl="1"/>
+            <a:r>
+              <a:rPr lang="en-CA" sz="2000" dirty="0"/>
+              <a:t>Booleans</a:t>
+            </a:r>
+          </a:p>
+          <a:p>
+            <a:pPr lvl="2"/>
+            <a:r>
+              <a:rPr lang="en-CA" sz="1800" dirty="0"/>
+              <a:t>Two possible values, True or False</a:t>
+            </a:r>
+          </a:p>
+        </p:txBody>
+      </p:sp>
+      <p:sp>
+        <p:nvSpPr>
+          <p:cNvPr id="4" name="Content Placeholder 2">
+            <a:extLst>
+              <a:ext uri="{FF2B5EF4-FFF2-40B4-BE49-F238E27FC236}">
+                <a16:creationId xmlns:a16="http://schemas.microsoft.com/office/drawing/2014/main" id="{93714D66-5411-DD3F-57C7-89E0C3EEA0BD}"/>
+              </a:ext>
+            </a:extLst>
+          </p:cNvPr>
+          <p:cNvSpPr txBox="1">
+            <a:spLocks/>
+          </p:cNvSpPr>
+          <p:nvPr/>
+        </p:nvSpPr>
+        <p:spPr>
+          <a:xfrm>
+            <a:off x="5726253" y="2421536"/>
+            <a:ext cx="5632030" cy="4265385"/>
+          </a:xfrm>
+          <a:prstGeom prst="rect">
+            <a:avLst/>
+          </a:prstGeom>
+        </p:spPr>
+        <p:txBody>
+          <a:bodyPr vert="horz" lIns="91440" tIns="45720" rIns="91440" bIns="45720" rtlCol="0">
+            <a:normAutofit/>
+          </a:bodyPr>
+          <a:lstStyle>
+            <a:lvl1pPr marL="342900" indent="-342900" algn="l" defTabSz="457200" rtl="0" eaLnBrk="1" latinLnBrk="0" hangingPunct="1">
+              <a:spcBef>
+                <a:spcPts val="1000"/>
+              </a:spcBef>
+              <a:spcAft>
+                <a:spcPts val="0"/>
+              </a:spcAft>
+              <a:buClr>
+                <a:schemeClr val="accent1"/>
+              </a:buClr>
+              <a:buSzPct val="80000"/>
+              <a:buFont typeface="Wingdings 3" charset="2"/>
+              <a:buChar char=""/>
+              <a:defRPr sz="1800" b="0" i="0" kern="1200">
+                <a:solidFill>
+                  <a:schemeClr val="tx1">
+                    <a:lumMod val="75000"/>
+                    <a:lumOff val="25000"/>
+                  </a:schemeClr>
+                </a:solidFill>
+                <a:latin typeface="+mn-lt"/>
+                <a:ea typeface="+mn-ea"/>
+                <a:cs typeface="+mn-cs"/>
+              </a:defRPr>
+            </a:lvl1pPr>
+            <a:lvl2pPr marL="742950" indent="-285750" algn="l" defTabSz="457200" rtl="0" eaLnBrk="1" latinLnBrk="0" hangingPunct="1">
+              <a:spcBef>
+                <a:spcPts val="1000"/>
+              </a:spcBef>
+              <a:spcAft>
+                <a:spcPts val="0"/>
+              </a:spcAft>
+              <a:buClr>
+                <a:schemeClr val="accent1"/>
+              </a:buClr>
+              <a:buSzPct val="80000"/>
+              <a:buFont typeface="Wingdings 3" charset="2"/>
+              <a:buChar char=""/>
+              <a:defRPr sz="1600" b="0" i="0" kern="1200">
+                <a:solidFill>
+                  <a:schemeClr val="tx1">
+                    <a:lumMod val="75000"/>
+                    <a:lumOff val="25000"/>
+                  </a:schemeClr>
+                </a:solidFill>
+                <a:latin typeface="+mn-lt"/>
+                <a:ea typeface="+mn-ea"/>
+                <a:cs typeface="+mn-cs"/>
+              </a:defRPr>
+            </a:lvl2pPr>
+            <a:lvl3pPr marL="1143000" indent="-228600" algn="l" defTabSz="457200" rtl="0" eaLnBrk="1" latinLnBrk="0" hangingPunct="1">
+              <a:spcBef>
+                <a:spcPts val="1000"/>
+              </a:spcBef>
+              <a:spcAft>
+                <a:spcPts val="0"/>
+              </a:spcAft>
+              <a:buClr>
+                <a:schemeClr val="accent1"/>
+              </a:buClr>
+              <a:buSzPct val="80000"/>
+              <a:buFont typeface="Wingdings 3" charset="2"/>
+              <a:buChar char=""/>
+              <a:defRPr sz="1400" b="0" i="0" kern="1200">
+                <a:solidFill>
+                  <a:schemeClr val="tx1">
+                    <a:lumMod val="75000"/>
+                    <a:lumOff val="25000"/>
+                  </a:schemeClr>
+                </a:solidFill>
+                <a:latin typeface="+mn-lt"/>
+                <a:ea typeface="+mn-ea"/>
+                <a:cs typeface="+mn-cs"/>
+              </a:defRPr>
+            </a:lvl3pPr>
+            <a:lvl4pPr marL="1600200" indent="-228600" algn="l" defTabSz="457200" rtl="0" eaLnBrk="1" latinLnBrk="0" hangingPunct="1">
+              <a:spcBef>
+                <a:spcPts val="1000"/>
+              </a:spcBef>
+              <a:spcAft>
+                <a:spcPts val="0"/>
+              </a:spcAft>
+              <a:buClr>
+                <a:schemeClr val="accent1"/>
+              </a:buClr>
+              <a:buSzPct val="80000"/>
+              <a:buFont typeface="Wingdings 3" charset="2"/>
+              <a:buChar char=""/>
+              <a:defRPr sz="1200" b="0" i="0" kern="1200">
+                <a:solidFill>
+                  <a:schemeClr val="tx1">
+                    <a:lumMod val="75000"/>
+                    <a:lumOff val="25000"/>
+                  </a:schemeClr>
+                </a:solidFill>
+                <a:latin typeface="+mn-lt"/>
+                <a:ea typeface="+mn-ea"/>
+                <a:cs typeface="+mn-cs"/>
+              </a:defRPr>
+            </a:lvl4pPr>
+            <a:lvl5pPr marL="2057400" indent="-228600" algn="l" defTabSz="457200" rtl="0" eaLnBrk="1" latinLnBrk="0" hangingPunct="1">
+              <a:spcBef>
+                <a:spcPts val="1000"/>
+              </a:spcBef>
+              <a:spcAft>
+                <a:spcPts val="0"/>
+              </a:spcAft>
+              <a:buClr>
+                <a:schemeClr val="accent1"/>
+              </a:buClr>
+              <a:buSzPct val="80000"/>
+              <a:buFont typeface="Wingdings 3" charset="2"/>
+              <a:buChar char=""/>
+              <a:defRPr sz="1200" b="0" i="0" kern="1200">
+                <a:solidFill>
+                  <a:schemeClr val="tx1">
+                    <a:lumMod val="75000"/>
+                    <a:lumOff val="25000"/>
+                  </a:schemeClr>
+                </a:solidFill>
+                <a:latin typeface="+mn-lt"/>
+                <a:ea typeface="+mn-ea"/>
+                <a:cs typeface="+mn-cs"/>
+              </a:defRPr>
+            </a:lvl5pPr>
+            <a:lvl6pPr marL="2514600" indent="-228600" algn="l" defTabSz="457200" rtl="0" eaLnBrk="1" latinLnBrk="0" hangingPunct="1">
+              <a:spcBef>
+                <a:spcPts val="1000"/>
+              </a:spcBef>
+              <a:spcAft>
+                <a:spcPts val="0"/>
+              </a:spcAft>
+              <a:buClr>
+                <a:schemeClr val="accent1"/>
+              </a:buClr>
+              <a:buSzPct val="80000"/>
+              <a:buFont typeface="Wingdings 3" charset="2"/>
+              <a:buChar char=""/>
+              <a:defRPr sz="1200" b="0" i="0" kern="1200">
+                <a:solidFill>
+                  <a:schemeClr val="tx1">
+                    <a:lumMod val="75000"/>
+                    <a:lumOff val="25000"/>
+                  </a:schemeClr>
+                </a:solidFill>
+                <a:latin typeface="+mn-lt"/>
+                <a:ea typeface="+mn-ea"/>
+                <a:cs typeface="+mn-cs"/>
+              </a:defRPr>
+            </a:lvl6pPr>
+            <a:lvl7pPr marL="2971800" indent="-228600" algn="l" defTabSz="457200" rtl="0" eaLnBrk="1" latinLnBrk="0" hangingPunct="1">
+              <a:spcBef>
+                <a:spcPts val="1000"/>
+              </a:spcBef>
+              <a:spcAft>
+                <a:spcPts val="0"/>
+              </a:spcAft>
+              <a:buClr>
+                <a:schemeClr val="accent1"/>
+              </a:buClr>
+              <a:buSzPct val="80000"/>
+              <a:buFont typeface="Wingdings 3" charset="2"/>
+              <a:buChar char=""/>
+              <a:defRPr sz="1200" b="0" i="0" kern="1200">
+                <a:solidFill>
+                  <a:schemeClr val="tx1">
+                    <a:lumMod val="75000"/>
+                    <a:lumOff val="25000"/>
+                  </a:schemeClr>
+                </a:solidFill>
+                <a:latin typeface="+mn-lt"/>
+                <a:ea typeface="+mn-ea"/>
+                <a:cs typeface="+mn-cs"/>
+              </a:defRPr>
+            </a:lvl7pPr>
+            <a:lvl8pPr marL="3429000" indent="-228600" algn="l" defTabSz="457200" rtl="0" eaLnBrk="1" latinLnBrk="0" hangingPunct="1">
+              <a:spcBef>
+                <a:spcPts val="1000"/>
+              </a:spcBef>
+              <a:spcAft>
+                <a:spcPts val="0"/>
+              </a:spcAft>
+              <a:buClr>
+                <a:schemeClr val="accent1"/>
+              </a:buClr>
+              <a:buSzPct val="80000"/>
+              <a:buFont typeface="Wingdings 3" charset="2"/>
+              <a:buChar char=""/>
+              <a:defRPr sz="1200" b="0" i="0" kern="1200">
+                <a:solidFill>
+                  <a:schemeClr val="tx1">
+                    <a:lumMod val="75000"/>
+                    <a:lumOff val="25000"/>
+                  </a:schemeClr>
+                </a:solidFill>
+                <a:latin typeface="+mn-lt"/>
+                <a:ea typeface="+mn-ea"/>
+                <a:cs typeface="+mn-cs"/>
+              </a:defRPr>
+            </a:lvl8pPr>
+            <a:lvl9pPr marL="3886200" indent="-228600" algn="l" defTabSz="457200" rtl="0" eaLnBrk="1" latinLnBrk="0" hangingPunct="1">
+              <a:spcBef>
+                <a:spcPts val="1000"/>
+              </a:spcBef>
+              <a:spcAft>
+                <a:spcPts val="0"/>
+              </a:spcAft>
+              <a:buClr>
+                <a:schemeClr val="accent1"/>
+              </a:buClr>
+              <a:buSzPct val="80000"/>
+              <a:buFont typeface="Wingdings 3" charset="2"/>
+              <a:buChar char=""/>
+              <a:defRPr sz="1200" b="0" i="0" kern="1200">
+                <a:solidFill>
+                  <a:schemeClr val="tx1">
+                    <a:lumMod val="75000"/>
+                    <a:lumOff val="25000"/>
+                  </a:schemeClr>
+                </a:solidFill>
+                <a:latin typeface="+mn-lt"/>
+                <a:ea typeface="+mn-ea"/>
+                <a:cs typeface="+mn-cs"/>
+              </a:defRPr>
+            </a:lvl9pPr>
+          </a:lstStyle>
+          <a:p>
+            <a:pPr lvl="1">
+              <a:lnSpc>
+                <a:spcPct val="150000"/>
+              </a:lnSpc>
+            </a:pPr>
+            <a:r>
+              <a:rPr lang="en-US" sz="2000" dirty="0"/>
+              <a:t>N</a:t>
+            </a:r>
+            <a:r>
+              <a:rPr lang="en-CA" sz="2000" dirty="0" err="1"/>
+              <a:t>oneType</a:t>
+            </a:r>
+            <a:endParaRPr lang="en-CA" sz="2000" dirty="0"/>
+          </a:p>
+          <a:p>
+            <a:pPr lvl="2">
+              <a:lnSpc>
+                <a:spcPct val="150000"/>
+              </a:lnSpc>
+            </a:pPr>
+            <a:r>
+              <a:rPr lang="en-CA" sz="1800" dirty="0"/>
+              <a:t>Object returned by default when you forget to include a return statement in your function</a:t>
+            </a:r>
+          </a:p>
+          <a:p>
+            <a:pPr lvl="2">
+              <a:lnSpc>
+                <a:spcPct val="150000"/>
+              </a:lnSpc>
+            </a:pPr>
+            <a:r>
+              <a:rPr lang="en-CA" sz="1800" dirty="0"/>
+              <a:t>Functionally useless</a:t>
+            </a:r>
+          </a:p>
+        </p:txBody>
+      </p:sp>
+    </p:spTree>
+    <p:extLst>
+      <p:ext uri="{BB962C8B-B14F-4D97-AF65-F5344CB8AC3E}">
+        <p14:creationId xmlns:p14="http://schemas.microsoft.com/office/powerpoint/2010/main" val="2894575126"/>
+      </p:ext>
+    </p:extLst>
+  </p:cSld>
+  <p:clrMapOvr>
+    <a:masterClrMapping/>
+  </p:clrMapOvr>
+</p:sld>
+</file>
+
+<file path=ppt/slides/slide4.xml><?xml version="1.0" encoding="utf-8"?>
+<p:sld xmlns:a="http://schemas.openxmlformats.org/drawingml/2006/main" xmlns:r="http://schemas.openxmlformats.org/officeDocument/2006/relationships" xmlns:p="http://schemas.openxmlformats.org/presentationml/2006/main">
+  <p:cSld>
+    <p:spTree>
+      <p:nvGrpSpPr>
+        <p:cNvPr id="1" name=""/>
+        <p:cNvGrpSpPr/>
+        <p:nvPr/>
+      </p:nvGrpSpPr>
+      <p:grpSpPr>
+        <a:xfrm>
+          <a:off x="0" y="0"/>
+          <a:ext cx="0" cy="0"/>
+          <a:chOff x="0" y="0"/>
+          <a:chExt cx="0" cy="0"/>
+        </a:xfrm>
+      </p:grpSpPr>
+      <p:sp>
+        <p:nvSpPr>
+          <p:cNvPr id="2" name="Title 1">
+            <a:extLst>
+              <a:ext uri="{FF2B5EF4-FFF2-40B4-BE49-F238E27FC236}">
+                <a16:creationId xmlns:a16="http://schemas.microsoft.com/office/drawing/2014/main" id="{5A2D124E-3C50-43FB-CAFC-098CF63DE8EF}"/>
+              </a:ext>
+            </a:extLst>
+          </p:cNvPr>
+          <p:cNvSpPr>
+            <a:spLocks noGrp="1"/>
+          </p:cNvSpPr>
+          <p:nvPr>
+            <p:ph type="title"/>
+          </p:nvPr>
+        </p:nvSpPr>
+        <p:spPr/>
+        <p:txBody>
+          <a:bodyPr/>
+          <a:lstStyle/>
+          <a:p>
+            <a:r>
+              <a:rPr lang="en-CA" dirty="0"/>
+              <a:t>What we learned so far…</a:t>
+            </a:r>
+          </a:p>
+        </p:txBody>
+      </p:sp>
+      <p:sp>
+        <p:nvSpPr>
+          <p:cNvPr id="3" name="Content Placeholder 2">
+            <a:extLst>
+              <a:ext uri="{FF2B5EF4-FFF2-40B4-BE49-F238E27FC236}">
+                <a16:creationId xmlns:a16="http://schemas.microsoft.com/office/drawing/2014/main" id="{44B0A09C-5FA8-68BF-3FDB-67A278360BD3}"/>
+              </a:ext>
+            </a:extLst>
+          </p:cNvPr>
+          <p:cNvSpPr>
+            <a:spLocks noGrp="1"/>
+          </p:cNvSpPr>
+          <p:nvPr>
+            <p:ph idx="1"/>
+          </p:nvPr>
+        </p:nvSpPr>
+        <p:spPr>
+          <a:xfrm>
+            <a:off x="1231154" y="2266042"/>
+            <a:ext cx="8825659" cy="4515757"/>
+          </a:xfrm>
+        </p:spPr>
+        <p:txBody>
+          <a:bodyPr>
+            <a:normAutofit/>
+          </a:bodyPr>
+          <a:lstStyle/>
+          <a:p>
+            <a:r>
+              <a:rPr lang="en-CA" sz="2400" dirty="0"/>
+              <a:t>Statements</a:t>
+            </a:r>
+          </a:p>
+          <a:p>
+            <a:pPr lvl="1"/>
+            <a:r>
+              <a:rPr lang="en-CA" sz="2000" dirty="0"/>
+              <a:t>if statement</a:t>
+            </a:r>
+          </a:p>
+          <a:p>
+            <a:pPr lvl="2"/>
+            <a:r>
+              <a:rPr lang="en-CA" sz="1800" dirty="0"/>
+              <a:t>Specifies code to run </a:t>
+            </a:r>
+            <a:r>
+              <a:rPr lang="en-CA" sz="1800" i="1" dirty="0"/>
+              <a:t>if</a:t>
+            </a:r>
+            <a:r>
+              <a:rPr lang="en-CA" sz="1800" dirty="0"/>
+              <a:t> a certain condition is met</a:t>
+            </a:r>
+          </a:p>
+          <a:p>
+            <a:pPr lvl="2"/>
+            <a:r>
+              <a:rPr lang="en-CA" sz="1800" dirty="0"/>
+              <a:t>Can be accompanied by an </a:t>
+            </a:r>
+            <a:r>
+              <a:rPr lang="en-CA" sz="1800" dirty="0" err="1"/>
+              <a:t>elif</a:t>
+            </a:r>
+            <a:r>
+              <a:rPr lang="en-CA" sz="1800" dirty="0"/>
+              <a:t> or else statement</a:t>
+            </a:r>
+          </a:p>
+          <a:p>
+            <a:pPr lvl="1"/>
+            <a:r>
+              <a:rPr lang="en-CA" sz="2000" dirty="0"/>
+              <a:t>for loop</a:t>
+            </a:r>
+          </a:p>
+          <a:p>
+            <a:pPr lvl="2"/>
+            <a:r>
+              <a:rPr lang="en-CA" sz="1800" dirty="0"/>
+              <a:t>Runs a specific code a determinate number of times</a:t>
+            </a:r>
+          </a:p>
+          <a:p>
+            <a:pPr lvl="2"/>
+            <a:r>
+              <a:rPr lang="en-CA" sz="1800" dirty="0"/>
+              <a:t>Code loops until all elements specified in the for statement have been iterated through</a:t>
+            </a:r>
+          </a:p>
+          <a:p>
+            <a:pPr lvl="1"/>
+            <a:r>
+              <a:rPr lang="en-CA" sz="2000" dirty="0"/>
+              <a:t>while loop</a:t>
+            </a:r>
+          </a:p>
+          <a:p>
+            <a:pPr lvl="2"/>
+            <a:r>
+              <a:rPr lang="en-CA" sz="1800" dirty="0"/>
+              <a:t>Runs a specific code an indeterminate number of times</a:t>
+            </a:r>
+          </a:p>
+          <a:p>
+            <a:pPr lvl="2"/>
+            <a:r>
+              <a:rPr lang="en-CA" sz="1800" dirty="0"/>
+              <a:t>Code loops until condition specified in while statement is met</a:t>
+            </a:r>
+          </a:p>
+          <a:p>
+            <a:pPr lvl="2"/>
+            <a:endParaRPr lang="en-CA" sz="1800" dirty="0"/>
+          </a:p>
+        </p:txBody>
+      </p:sp>
+    </p:spTree>
+    <p:extLst>
+      <p:ext uri="{BB962C8B-B14F-4D97-AF65-F5344CB8AC3E}">
+        <p14:creationId xmlns:p14="http://schemas.microsoft.com/office/powerpoint/2010/main" val="3033083569"/>
+      </p:ext>
+    </p:extLst>
+  </p:cSld>
+  <p:clrMapOvr>
+    <a:masterClrMapping/>
+  </p:clrMapOvr>
+</p:sld>
+</file>
+
+<file path=ppt/slides/slide5.xml><?xml version="1.0" encoding="utf-8"?>
+<p:sld xmlns:a="http://schemas.openxmlformats.org/drawingml/2006/main" xmlns:r="http://schemas.openxmlformats.org/officeDocument/2006/relationships" xmlns:p="http://schemas.openxmlformats.org/presentationml/2006/main">
+  <p:cSld>
+    <p:spTree>
+      <p:nvGrpSpPr>
+        <p:cNvPr id="1" name=""/>
+        <p:cNvGrpSpPr/>
+        <p:nvPr/>
+      </p:nvGrpSpPr>
+      <p:grpSpPr>
+        <a:xfrm>
+          <a:off x="0" y="0"/>
+          <a:ext cx="0" cy="0"/>
+          <a:chOff x="0" y="0"/>
+          <a:chExt cx="0" cy="0"/>
+        </a:xfrm>
+      </p:grpSpPr>
+      <p:sp>
+        <p:nvSpPr>
+          <p:cNvPr id="2" name="Title 1">
+            <a:extLst>
+              <a:ext uri="{FF2B5EF4-FFF2-40B4-BE49-F238E27FC236}">
+                <a16:creationId xmlns:a16="http://schemas.microsoft.com/office/drawing/2014/main" id="{5A2D124E-3C50-43FB-CAFC-098CF63DE8EF}"/>
+              </a:ext>
+            </a:extLst>
+          </p:cNvPr>
+          <p:cNvSpPr>
+            <a:spLocks noGrp="1"/>
+          </p:cNvSpPr>
+          <p:nvPr>
+            <p:ph type="title"/>
+          </p:nvPr>
+        </p:nvSpPr>
+        <p:spPr/>
+        <p:txBody>
+          <a:bodyPr/>
+          <a:lstStyle/>
+          <a:p>
+            <a:r>
+              <a:rPr lang="en-CA" dirty="0"/>
+              <a:t>What we learned so far…</a:t>
+            </a:r>
+          </a:p>
+        </p:txBody>
+      </p:sp>
+      <p:sp>
+        <p:nvSpPr>
+          <p:cNvPr id="3" name="Content Placeholder 2">
+            <a:extLst>
+              <a:ext uri="{FF2B5EF4-FFF2-40B4-BE49-F238E27FC236}">
+                <a16:creationId xmlns:a16="http://schemas.microsoft.com/office/drawing/2014/main" id="{44B0A09C-5FA8-68BF-3FDB-67A278360BD3}"/>
+              </a:ext>
+            </a:extLst>
+          </p:cNvPr>
+          <p:cNvSpPr>
+            <a:spLocks noGrp="1"/>
+          </p:cNvSpPr>
+          <p:nvPr>
+            <p:ph idx="1"/>
+          </p:nvPr>
+        </p:nvSpPr>
+        <p:spPr>
+          <a:xfrm>
+            <a:off x="1231154" y="2266042"/>
+            <a:ext cx="8825659" cy="3552052"/>
+          </a:xfrm>
+        </p:spPr>
+        <p:txBody>
+          <a:bodyPr>
+            <a:normAutofit/>
+          </a:bodyPr>
+          <a:lstStyle/>
+          <a:p>
+            <a:pPr>
+              <a:lnSpc>
+                <a:spcPct val="150000"/>
+              </a:lnSpc>
+            </a:pPr>
+            <a:r>
+              <a:rPr lang="en-CA" sz="2400" dirty="0"/>
+              <a:t>Statements (cont.)</a:t>
+            </a:r>
+          </a:p>
+          <a:p>
+            <a:pPr lvl="1">
+              <a:lnSpc>
+                <a:spcPct val="150000"/>
+              </a:lnSpc>
+            </a:pPr>
+            <a:r>
+              <a:rPr lang="en-CA" sz="2000" dirty="0"/>
+              <a:t>return statement</a:t>
+            </a:r>
+          </a:p>
+          <a:p>
+            <a:pPr lvl="2">
+              <a:lnSpc>
+                <a:spcPct val="150000"/>
+              </a:lnSpc>
+            </a:pPr>
+            <a:r>
+              <a:rPr lang="en-CA" sz="1600" dirty="0"/>
+              <a:t>Included in a function’s definition</a:t>
+            </a:r>
+          </a:p>
+          <a:p>
+            <a:pPr lvl="2">
+              <a:lnSpc>
+                <a:spcPct val="150000"/>
+              </a:lnSpc>
+            </a:pPr>
+            <a:r>
+              <a:rPr lang="en-CA" sz="1600" dirty="0"/>
+              <a:t>Specifies the output of the function</a:t>
+            </a:r>
+          </a:p>
+          <a:p>
+            <a:pPr lvl="2">
+              <a:lnSpc>
+                <a:spcPct val="150000"/>
+              </a:lnSpc>
+            </a:pPr>
+            <a:r>
+              <a:rPr lang="en-CA" sz="1600" dirty="0"/>
+              <a:t>A function without a return statements will return None</a:t>
+            </a:r>
+          </a:p>
+          <a:p>
+            <a:pPr lvl="2">
+              <a:lnSpc>
+                <a:spcPct val="150000"/>
+              </a:lnSpc>
+            </a:pPr>
+            <a:endParaRPr lang="en-CA" sz="1800" dirty="0"/>
+          </a:p>
+        </p:txBody>
+      </p:sp>
+    </p:spTree>
+    <p:extLst>
+      <p:ext uri="{BB962C8B-B14F-4D97-AF65-F5344CB8AC3E}">
+        <p14:creationId xmlns:p14="http://schemas.microsoft.com/office/powerpoint/2010/main" val="2884805238"/>
+      </p:ext>
+    </p:extLst>
+  </p:cSld>
+  <p:clrMapOvr>
+    <a:masterClrMapping/>
+  </p:clrMapOvr>
+</p:sld>
+</file>
+
+<file path=ppt/slides/slide6.xml><?xml version="1.0" encoding="utf-8"?>
+<p:sld xmlns:a="http://schemas.openxmlformats.org/drawingml/2006/main" xmlns:r="http://schemas.openxmlformats.org/officeDocument/2006/relationships" xmlns:p="http://schemas.openxmlformats.org/presentationml/2006/main">
+  <p:cSld>
+    <p:spTree>
+      <p:nvGrpSpPr>
+        <p:cNvPr id="1" name=""/>
+        <p:cNvGrpSpPr/>
+        <p:nvPr/>
+      </p:nvGrpSpPr>
+      <p:grpSpPr>
+        <a:xfrm>
+          <a:off x="0" y="0"/>
+          <a:ext cx="0" cy="0"/>
+          <a:chOff x="0" y="0"/>
+          <a:chExt cx="0" cy="0"/>
+        </a:xfrm>
+      </p:grpSpPr>
+      <p:sp>
+        <p:nvSpPr>
+          <p:cNvPr id="2" name="Title 1">
+            <a:extLst>
+              <a:ext uri="{FF2B5EF4-FFF2-40B4-BE49-F238E27FC236}">
+                <a16:creationId xmlns:a16="http://schemas.microsoft.com/office/drawing/2014/main" id="{FCB9DF14-F283-BBF6-2BB4-A63424AA273C}"/>
+              </a:ext>
+            </a:extLst>
+          </p:cNvPr>
+          <p:cNvSpPr>
+            <a:spLocks noGrp="1"/>
+          </p:cNvSpPr>
+          <p:nvPr>
+            <p:ph type="title"/>
+          </p:nvPr>
+        </p:nvSpPr>
+        <p:spPr/>
+        <p:txBody>
+          <a:bodyPr/>
+          <a:lstStyle/>
+          <a:p>
+            <a:r>
+              <a:rPr lang="en-CA" dirty="0"/>
+              <a:t>What we learned so far…</a:t>
+            </a:r>
+          </a:p>
+        </p:txBody>
+      </p:sp>
+      <p:sp>
+        <p:nvSpPr>
+          <p:cNvPr id="3" name="Content Placeholder 2">
+            <a:extLst>
+              <a:ext uri="{FF2B5EF4-FFF2-40B4-BE49-F238E27FC236}">
+                <a16:creationId xmlns:a16="http://schemas.microsoft.com/office/drawing/2014/main" id="{B1394FD5-3BD6-2A18-D311-0453C40A7112}"/>
+              </a:ext>
+            </a:extLst>
+          </p:cNvPr>
+          <p:cNvSpPr>
+            <a:spLocks noGrp="1"/>
+          </p:cNvSpPr>
+          <p:nvPr>
+            <p:ph idx="1"/>
+          </p:nvPr>
+        </p:nvSpPr>
+        <p:spPr>
+          <a:xfrm>
+            <a:off x="1154954" y="2329543"/>
+            <a:ext cx="9360646" cy="4528457"/>
+          </a:xfrm>
+        </p:spPr>
+        <p:txBody>
+          <a:bodyPr>
+            <a:normAutofit lnSpcReduction="10000"/>
+          </a:bodyPr>
+          <a:lstStyle/>
+          <a:p>
+            <a:r>
+              <a:rPr lang="en-CA" sz="2400" dirty="0"/>
+              <a:t>Built-in Python functions</a:t>
+            </a:r>
+          </a:p>
+          <a:p>
+            <a:pPr lvl="1"/>
+            <a:r>
+              <a:rPr lang="en-CA" sz="2000" dirty="0"/>
+              <a:t>print()</a:t>
+            </a:r>
+          </a:p>
+          <a:p>
+            <a:pPr lvl="2"/>
+            <a:r>
+              <a:rPr lang="en-CA" sz="1800" dirty="0"/>
+              <a:t>Prints out whatever is between the parentheses</a:t>
+            </a:r>
+          </a:p>
+          <a:p>
+            <a:pPr lvl="1"/>
+            <a:r>
+              <a:rPr lang="en-CA" sz="2000" dirty="0"/>
+              <a:t>int()</a:t>
+            </a:r>
+          </a:p>
+          <a:p>
+            <a:pPr lvl="2"/>
+            <a:r>
+              <a:rPr lang="en-CA" sz="1800" dirty="0"/>
+              <a:t>Transforms a string or float to an integer</a:t>
+            </a:r>
+          </a:p>
+          <a:p>
+            <a:pPr lvl="2"/>
+            <a:r>
+              <a:rPr lang="en-CA" sz="1800" dirty="0"/>
+              <a:t>If the float is not a round number, int() rounds </a:t>
+            </a:r>
+            <a:r>
+              <a:rPr lang="en-CA" sz="1800" i="1" dirty="0"/>
+              <a:t>down</a:t>
+            </a:r>
+          </a:p>
+          <a:p>
+            <a:pPr lvl="3"/>
+            <a:r>
+              <a:rPr lang="en-CA" sz="1600" dirty="0"/>
+              <a:t>E.g. int(4.9) = 4</a:t>
+            </a:r>
+          </a:p>
+          <a:p>
+            <a:pPr lvl="1"/>
+            <a:r>
+              <a:rPr lang="en-CA" sz="2000" dirty="0"/>
+              <a:t>string()</a:t>
+            </a:r>
+          </a:p>
+          <a:p>
+            <a:pPr lvl="2"/>
+            <a:r>
+              <a:rPr lang="en-CA" sz="1800" dirty="0"/>
+              <a:t>Transform what is between the parentheses into a string</a:t>
+            </a:r>
+          </a:p>
+          <a:p>
+            <a:pPr lvl="1"/>
+            <a:r>
+              <a:rPr lang="en-CA" sz="2000" dirty="0"/>
+              <a:t>float()</a:t>
+            </a:r>
+          </a:p>
+          <a:p>
+            <a:pPr lvl="2"/>
+            <a:r>
+              <a:rPr lang="en-CA" sz="1800" dirty="0"/>
+              <a:t>Transform what is between the parentheses into a floating point number</a:t>
+            </a:r>
+          </a:p>
+        </p:txBody>
+      </p:sp>
+    </p:spTree>
+    <p:extLst>
+      <p:ext uri="{BB962C8B-B14F-4D97-AF65-F5344CB8AC3E}">
+        <p14:creationId xmlns:p14="http://schemas.microsoft.com/office/powerpoint/2010/main" val="1494722630"/>
+      </p:ext>
+    </p:extLst>
+  </p:cSld>
+  <p:clrMapOvr>
+    <a:masterClrMapping/>
+  </p:clrMapOvr>
+</p:sld>
+</file>
+
+<file path=ppt/slides/slide7.xml><?xml version="1.0" encoding="utf-8"?>
+<p:sld xmlns:a="http://schemas.openxmlformats.org/drawingml/2006/main" xmlns:r="http://schemas.openxmlformats.org/officeDocument/2006/relationships" xmlns:p="http://schemas.openxmlformats.org/presentationml/2006/main">
+  <p:cSld>
+    <p:spTree>
+      <p:nvGrpSpPr>
+        <p:cNvPr id="1" name=""/>
+        <p:cNvGrpSpPr/>
+        <p:nvPr/>
+      </p:nvGrpSpPr>
+      <p:grpSpPr>
+        <a:xfrm>
+          <a:off x="0" y="0"/>
+          <a:ext cx="0" cy="0"/>
+          <a:chOff x="0" y="0"/>
+          <a:chExt cx="0" cy="0"/>
+        </a:xfrm>
+      </p:grpSpPr>
+      <p:sp>
+        <p:nvSpPr>
+          <p:cNvPr id="2" name="Title 1">
+            <a:extLst>
+              <a:ext uri="{FF2B5EF4-FFF2-40B4-BE49-F238E27FC236}">
+                <a16:creationId xmlns:a16="http://schemas.microsoft.com/office/drawing/2014/main" id="{22C77693-7FEB-E7D3-8AC0-EE542DCA45AB}"/>
+              </a:ext>
+            </a:extLst>
+          </p:cNvPr>
+          <p:cNvSpPr>
+            <a:spLocks noGrp="1"/>
+          </p:cNvSpPr>
+          <p:nvPr>
+            <p:ph type="title"/>
+          </p:nvPr>
+        </p:nvSpPr>
+        <p:spPr/>
+        <p:txBody>
+          <a:bodyPr/>
+          <a:lstStyle/>
+          <a:p>
+            <a:r>
+              <a:rPr lang="en-CA" dirty="0"/>
+              <a:t>What we learned so far…</a:t>
+            </a:r>
+          </a:p>
+        </p:txBody>
+      </p:sp>
+      <p:sp>
+        <p:nvSpPr>
+          <p:cNvPr id="3" name="Content Placeholder 2">
+            <a:extLst>
+              <a:ext uri="{FF2B5EF4-FFF2-40B4-BE49-F238E27FC236}">
+                <a16:creationId xmlns:a16="http://schemas.microsoft.com/office/drawing/2014/main" id="{BFE73BA5-9E2A-9A6C-136C-BA7E8D341EDB}"/>
+              </a:ext>
+            </a:extLst>
+          </p:cNvPr>
+          <p:cNvSpPr>
+            <a:spLocks noGrp="1"/>
+          </p:cNvSpPr>
+          <p:nvPr>
+            <p:ph idx="1"/>
+          </p:nvPr>
+        </p:nvSpPr>
+        <p:spPr>
+          <a:xfrm>
+            <a:off x="969362" y="2331357"/>
+            <a:ext cx="10253275" cy="4526643"/>
+          </a:xfrm>
+        </p:spPr>
+        <p:txBody>
+          <a:bodyPr>
+            <a:normAutofit fontScale="92500" lnSpcReduction="10000"/>
+          </a:bodyPr>
+          <a:lstStyle/>
+          <a:p>
+            <a:r>
+              <a:rPr lang="en-CA" sz="2400" dirty="0"/>
+              <a:t>Built-in Python functions (cont.)</a:t>
+            </a:r>
+          </a:p>
+          <a:p>
+            <a:pPr lvl="1"/>
+            <a:r>
+              <a:rPr lang="en-CA" sz="2000" dirty="0"/>
+              <a:t>type()</a:t>
+            </a:r>
+          </a:p>
+          <a:p>
+            <a:pPr lvl="2"/>
+            <a:r>
+              <a:rPr lang="en-CA" sz="1800" dirty="0"/>
+              <a:t>Returns the object type</a:t>
+            </a:r>
+          </a:p>
+          <a:p>
+            <a:pPr lvl="2"/>
+            <a:r>
+              <a:rPr lang="en-CA" sz="1800" dirty="0"/>
+              <a:t>E.g. type(12) = int</a:t>
+            </a:r>
+          </a:p>
+          <a:p>
+            <a:pPr lvl="2"/>
+            <a:r>
+              <a:rPr lang="en-CA" sz="1800" dirty="0"/>
+              <a:t>E.g. type(“hello”) = str</a:t>
+            </a:r>
+          </a:p>
+          <a:p>
+            <a:pPr lvl="1"/>
+            <a:r>
+              <a:rPr lang="en-CA" sz="2000" dirty="0" err="1"/>
+              <a:t>len</a:t>
+            </a:r>
+            <a:r>
+              <a:rPr lang="en-CA" sz="2000" dirty="0"/>
+              <a:t>()</a:t>
+            </a:r>
+          </a:p>
+          <a:p>
+            <a:pPr lvl="2"/>
+            <a:r>
+              <a:rPr lang="en-CA" sz="1800" dirty="0"/>
+              <a:t>Returns the length of the list (number of elements in the list)</a:t>
+            </a:r>
+          </a:p>
+          <a:p>
+            <a:pPr lvl="2"/>
+            <a:r>
+              <a:rPr lang="en-CA" sz="1800" dirty="0"/>
+              <a:t>Does NOT work on </a:t>
+            </a:r>
+            <a:r>
+              <a:rPr lang="en-CA" sz="1800" dirty="0" err="1"/>
+              <a:t>numpy</a:t>
+            </a:r>
+            <a:r>
+              <a:rPr lang="en-CA" sz="1800" dirty="0"/>
+              <a:t> arrays</a:t>
+            </a:r>
+          </a:p>
+          <a:p>
+            <a:pPr lvl="2"/>
+            <a:r>
+              <a:rPr lang="en-CA" sz="1800" dirty="0"/>
+              <a:t>E.g. </a:t>
+            </a:r>
+            <a:r>
+              <a:rPr lang="en-CA" sz="1800" dirty="0" err="1"/>
+              <a:t>len</a:t>
+            </a:r>
+            <a:r>
+              <a:rPr lang="en-CA" sz="1800" dirty="0"/>
+              <a:t>([1, 2, 3, 4]) = 4</a:t>
+            </a:r>
+          </a:p>
+          <a:p>
+            <a:pPr lvl="1"/>
+            <a:r>
+              <a:rPr lang="en-CA" sz="2000" dirty="0"/>
+              <a:t>round(n)</a:t>
+            </a:r>
+          </a:p>
+          <a:p>
+            <a:pPr lvl="2"/>
+            <a:r>
+              <a:rPr lang="en-CA" sz="1800" dirty="0"/>
+              <a:t>Rounds a floating point number to</a:t>
+            </a:r>
+            <a:r>
+              <a:rPr lang="en-CA" sz="1800" i="1" dirty="0"/>
+              <a:t> n </a:t>
+            </a:r>
+            <a:r>
+              <a:rPr lang="en-CA" sz="1800" dirty="0"/>
+              <a:t>decimal places</a:t>
+            </a:r>
+          </a:p>
+          <a:p>
+            <a:pPr lvl="2"/>
+            <a:r>
+              <a:rPr lang="en-CA" sz="1800" dirty="0"/>
+              <a:t>E.g. round(3.141593, 2) = 3.14</a:t>
+            </a:r>
+          </a:p>
+        </p:txBody>
+      </p:sp>
+    </p:spTree>
+    <p:extLst>
+      <p:ext uri="{BB962C8B-B14F-4D97-AF65-F5344CB8AC3E}">
+        <p14:creationId xmlns:p14="http://schemas.microsoft.com/office/powerpoint/2010/main" val="3452023125"/>
+      </p:ext>
+    </p:extLst>
+  </p:cSld>
+  <p:clrMapOvr>
+    <a:masterClrMapping/>
+  </p:clrMapOvr>
+</p:sld>
+</file>
+
+<file path=ppt/slides/slide8.xml><?xml version="1.0" encoding="utf-8"?>
+<p:sld xmlns:a="http://schemas.openxmlformats.org/drawingml/2006/main" xmlns:r="http://schemas.openxmlformats.org/officeDocument/2006/relationships" xmlns:p="http://schemas.openxmlformats.org/presentationml/2006/main">
+  <p:cSld>
+    <p:spTree>
+      <p:nvGrpSpPr>
+        <p:cNvPr id="1" name=""/>
+        <p:cNvGrpSpPr/>
+        <p:nvPr/>
+      </p:nvGrpSpPr>
+      <p:grpSpPr>
+        <a:xfrm>
+          <a:off x="0" y="0"/>
+          <a:ext cx="0" cy="0"/>
+          <a:chOff x="0" y="0"/>
+          <a:chExt cx="0" cy="0"/>
+        </a:xfrm>
+      </p:grpSpPr>
+      <p:sp>
+        <p:nvSpPr>
+          <p:cNvPr id="2" name="Title 1">
+            <a:extLst>
+              <a:ext uri="{FF2B5EF4-FFF2-40B4-BE49-F238E27FC236}">
+                <a16:creationId xmlns:a16="http://schemas.microsoft.com/office/drawing/2014/main" id="{DF073902-DF9C-ACC6-D5EF-62FE118C3643}"/>
+              </a:ext>
+            </a:extLst>
+          </p:cNvPr>
+          <p:cNvSpPr>
+            <a:spLocks noGrp="1"/>
+          </p:cNvSpPr>
+          <p:nvPr>
+            <p:ph type="title"/>
+          </p:nvPr>
+        </p:nvSpPr>
+        <p:spPr/>
+        <p:txBody>
+          <a:bodyPr/>
+          <a:lstStyle/>
+          <a:p>
+            <a:r>
+              <a:rPr lang="en-US" dirty="0"/>
+              <a:t>Quick note on Python methods</a:t>
+            </a:r>
+            <a:endParaRPr lang="en-CA" dirty="0"/>
+          </a:p>
+        </p:txBody>
+      </p:sp>
+      <p:sp>
+        <p:nvSpPr>
+          <p:cNvPr id="4" name="Content Placeholder 2">
+            <a:extLst>
+              <a:ext uri="{FF2B5EF4-FFF2-40B4-BE49-F238E27FC236}">
+                <a16:creationId xmlns:a16="http://schemas.microsoft.com/office/drawing/2014/main" id="{7363330A-0B9C-3C2C-D425-E0BDA5FB4132}"/>
+              </a:ext>
+            </a:extLst>
+          </p:cNvPr>
+          <p:cNvSpPr>
+            <a:spLocks noGrp="1"/>
+          </p:cNvSpPr>
+          <p:nvPr>
+            <p:ph idx="1"/>
+          </p:nvPr>
+        </p:nvSpPr>
+        <p:spPr>
+          <a:xfrm>
+            <a:off x="969362" y="2228244"/>
+            <a:ext cx="10253275" cy="1917914"/>
+          </a:xfrm>
+        </p:spPr>
+        <p:txBody>
+          <a:bodyPr>
+            <a:normAutofit/>
+          </a:bodyPr>
+          <a:lstStyle/>
+          <a:p>
+            <a:pPr>
+              <a:lnSpc>
+                <a:spcPct val="150000"/>
+              </a:lnSpc>
+            </a:pPr>
+            <a:r>
+              <a:rPr lang="en-CA" sz="2000" dirty="0"/>
+              <a:t>A method is similar to a function, but it is called using a different syntax</a:t>
+            </a:r>
+          </a:p>
+          <a:p>
+            <a:pPr>
+              <a:lnSpc>
+                <a:spcPct val="150000"/>
+              </a:lnSpc>
+            </a:pPr>
+            <a:r>
+              <a:rPr lang="en-CA" sz="2000" dirty="0"/>
+              <a:t>Consider a “</a:t>
+            </a:r>
+            <a:r>
+              <a:rPr lang="en-CA" sz="2000" dirty="0" err="1"/>
+              <a:t>hello_world</a:t>
+            </a:r>
+            <a:r>
+              <a:rPr lang="en-CA" sz="2000" dirty="0"/>
+              <a:t>” function and a “</a:t>
+            </a:r>
+            <a:r>
+              <a:rPr lang="en-CA" sz="2000" dirty="0" err="1"/>
+              <a:t>hello_world</a:t>
+            </a:r>
+            <a:r>
+              <a:rPr lang="en-CA" sz="2000" dirty="0"/>
+              <a:t>” method</a:t>
+            </a:r>
+          </a:p>
+          <a:p>
+            <a:pPr>
+              <a:lnSpc>
+                <a:spcPct val="150000"/>
+              </a:lnSpc>
+            </a:pPr>
+            <a:r>
+              <a:rPr lang="en-CA" sz="2000" dirty="0"/>
+              <a:t>To call the function, we would type in something like:</a:t>
+            </a:r>
+            <a:endParaRPr lang="en-CA" sz="1600" dirty="0"/>
+          </a:p>
+        </p:txBody>
+      </p:sp>
+      <p:sp>
+        <p:nvSpPr>
+          <p:cNvPr id="7" name="Content Placeholder 2">
+            <a:extLst>
+              <a:ext uri="{FF2B5EF4-FFF2-40B4-BE49-F238E27FC236}">
+                <a16:creationId xmlns:a16="http://schemas.microsoft.com/office/drawing/2014/main" id="{9F551646-584C-0184-BD35-707A6691C42C}"/>
+              </a:ext>
+            </a:extLst>
+          </p:cNvPr>
+          <p:cNvSpPr txBox="1">
+            <a:spLocks/>
+          </p:cNvSpPr>
+          <p:nvPr/>
+        </p:nvSpPr>
+        <p:spPr>
+          <a:xfrm>
+            <a:off x="969362" y="4693770"/>
+            <a:ext cx="10253275" cy="2084102"/>
+          </a:xfrm>
+          <a:prstGeom prst="rect">
+            <a:avLst/>
+          </a:prstGeom>
+        </p:spPr>
+        <p:txBody>
+          <a:bodyPr vert="horz" lIns="91440" tIns="45720" rIns="91440" bIns="45720" rtlCol="0">
+            <a:normAutofit/>
+          </a:bodyPr>
+          <a:lstStyle>
+            <a:lvl1pPr marL="342900" indent="-342900" algn="l" defTabSz="457200" rtl="0" eaLnBrk="1" latinLnBrk="0" hangingPunct="1">
+              <a:spcBef>
+                <a:spcPts val="1000"/>
+              </a:spcBef>
+              <a:spcAft>
+                <a:spcPts val="0"/>
+              </a:spcAft>
+              <a:buClr>
+                <a:schemeClr val="accent1"/>
+              </a:buClr>
+              <a:buSzPct val="80000"/>
+              <a:buFont typeface="Wingdings 3" charset="2"/>
+              <a:buChar char=""/>
+              <a:defRPr sz="1800" b="0" i="0" kern="1200">
+                <a:solidFill>
+                  <a:schemeClr val="tx1">
+                    <a:lumMod val="75000"/>
+                    <a:lumOff val="25000"/>
+                  </a:schemeClr>
+                </a:solidFill>
+                <a:latin typeface="+mn-lt"/>
+                <a:ea typeface="+mn-ea"/>
+                <a:cs typeface="+mn-cs"/>
+              </a:defRPr>
+            </a:lvl1pPr>
+            <a:lvl2pPr marL="742950" indent="-285750" algn="l" defTabSz="457200" rtl="0" eaLnBrk="1" latinLnBrk="0" hangingPunct="1">
+              <a:spcBef>
+                <a:spcPts val="1000"/>
+              </a:spcBef>
+              <a:spcAft>
+                <a:spcPts val="0"/>
+              </a:spcAft>
+              <a:buClr>
+                <a:schemeClr val="accent1"/>
+              </a:buClr>
+              <a:buSzPct val="80000"/>
+              <a:buFont typeface="Wingdings 3" charset="2"/>
+              <a:buChar char=""/>
+              <a:defRPr sz="1600" b="0" i="0" kern="1200">
+                <a:solidFill>
+                  <a:schemeClr val="tx1">
+                    <a:lumMod val="75000"/>
+                    <a:lumOff val="25000"/>
+                  </a:schemeClr>
+                </a:solidFill>
+                <a:latin typeface="+mn-lt"/>
+                <a:ea typeface="+mn-ea"/>
+                <a:cs typeface="+mn-cs"/>
+              </a:defRPr>
+            </a:lvl2pPr>
+            <a:lvl3pPr marL="1143000" indent="-228600" algn="l" defTabSz="457200" rtl="0" eaLnBrk="1" latinLnBrk="0" hangingPunct="1">
+              <a:spcBef>
+                <a:spcPts val="1000"/>
+              </a:spcBef>
+              <a:spcAft>
+                <a:spcPts val="0"/>
+              </a:spcAft>
+              <a:buClr>
+                <a:schemeClr val="accent1"/>
+              </a:buClr>
+              <a:buSzPct val="80000"/>
+              <a:buFont typeface="Wingdings 3" charset="2"/>
+              <a:buChar char=""/>
+              <a:defRPr sz="1400" b="0" i="0" kern="1200">
+                <a:solidFill>
+                  <a:schemeClr val="tx1">
+                    <a:lumMod val="75000"/>
+                    <a:lumOff val="25000"/>
+                  </a:schemeClr>
+                </a:solidFill>
+                <a:latin typeface="+mn-lt"/>
+                <a:ea typeface="+mn-ea"/>
+                <a:cs typeface="+mn-cs"/>
+              </a:defRPr>
+            </a:lvl3pPr>
+            <a:lvl4pPr marL="1600200" indent="-228600" algn="l" defTabSz="457200" rtl="0" eaLnBrk="1" latinLnBrk="0" hangingPunct="1">
+              <a:spcBef>
+                <a:spcPts val="1000"/>
+              </a:spcBef>
+              <a:spcAft>
+                <a:spcPts val="0"/>
+              </a:spcAft>
+              <a:buClr>
+                <a:schemeClr val="accent1"/>
+              </a:buClr>
+              <a:buSzPct val="80000"/>
+              <a:buFont typeface="Wingdings 3" charset="2"/>
+              <a:buChar char=""/>
+              <a:defRPr sz="1200" b="0" i="0" kern="1200">
+                <a:solidFill>
+                  <a:schemeClr val="tx1">
+                    <a:lumMod val="75000"/>
+                    <a:lumOff val="25000"/>
+                  </a:schemeClr>
+                </a:solidFill>
+                <a:latin typeface="+mn-lt"/>
+                <a:ea typeface="+mn-ea"/>
+                <a:cs typeface="+mn-cs"/>
+              </a:defRPr>
+            </a:lvl4pPr>
+            <a:lvl5pPr marL="2057400" indent="-228600" algn="l" defTabSz="457200" rtl="0" eaLnBrk="1" latinLnBrk="0" hangingPunct="1">
+              <a:spcBef>
+                <a:spcPts val="1000"/>
+              </a:spcBef>
+              <a:spcAft>
+                <a:spcPts val="0"/>
+              </a:spcAft>
+              <a:buClr>
+                <a:schemeClr val="accent1"/>
+              </a:buClr>
+              <a:buSzPct val="80000"/>
+              <a:buFont typeface="Wingdings 3" charset="2"/>
+              <a:buChar char=""/>
+              <a:defRPr sz="1200" b="0" i="0" kern="1200">
+                <a:solidFill>
+                  <a:schemeClr val="tx1">
+                    <a:lumMod val="75000"/>
+                    <a:lumOff val="25000"/>
+                  </a:schemeClr>
+                </a:solidFill>
+                <a:latin typeface="+mn-lt"/>
+                <a:ea typeface="+mn-ea"/>
+                <a:cs typeface="+mn-cs"/>
+              </a:defRPr>
+            </a:lvl5pPr>
+            <a:lvl6pPr marL="2514600" indent="-228600" algn="l" defTabSz="457200" rtl="0" eaLnBrk="1" latinLnBrk="0" hangingPunct="1">
+              <a:spcBef>
+                <a:spcPts val="1000"/>
+              </a:spcBef>
+              <a:spcAft>
+                <a:spcPts val="0"/>
+              </a:spcAft>
+              <a:buClr>
+                <a:schemeClr val="accent1"/>
+              </a:buClr>
+              <a:buSzPct val="80000"/>
+              <a:buFont typeface="Wingdings 3" charset="2"/>
+              <a:buChar char=""/>
+              <a:defRPr sz="1200" b="0" i="0" kern="1200">
+                <a:solidFill>
+                  <a:schemeClr val="tx1">
+                    <a:lumMod val="75000"/>
+                    <a:lumOff val="25000"/>
+                  </a:schemeClr>
+                </a:solidFill>
+                <a:latin typeface="+mn-lt"/>
+                <a:ea typeface="+mn-ea"/>
+                <a:cs typeface="+mn-cs"/>
+              </a:defRPr>
+            </a:lvl6pPr>
+            <a:lvl7pPr marL="2971800" indent="-228600" algn="l" defTabSz="457200" rtl="0" eaLnBrk="1" latinLnBrk="0" hangingPunct="1">
+              <a:spcBef>
+                <a:spcPts val="1000"/>
+              </a:spcBef>
+              <a:spcAft>
+                <a:spcPts val="0"/>
+              </a:spcAft>
+              <a:buClr>
+                <a:schemeClr val="accent1"/>
+              </a:buClr>
+              <a:buSzPct val="80000"/>
+              <a:buFont typeface="Wingdings 3" charset="2"/>
+              <a:buChar char=""/>
+              <a:defRPr sz="1200" b="0" i="0" kern="1200">
+                <a:solidFill>
+                  <a:schemeClr val="tx1">
+                    <a:lumMod val="75000"/>
+                    <a:lumOff val="25000"/>
+                  </a:schemeClr>
+                </a:solidFill>
+                <a:latin typeface="+mn-lt"/>
+                <a:ea typeface="+mn-ea"/>
+                <a:cs typeface="+mn-cs"/>
+              </a:defRPr>
+            </a:lvl7pPr>
+            <a:lvl8pPr marL="3429000" indent="-228600" algn="l" defTabSz="457200" rtl="0" eaLnBrk="1" latinLnBrk="0" hangingPunct="1">
+              <a:spcBef>
+                <a:spcPts val="1000"/>
+              </a:spcBef>
+              <a:spcAft>
+                <a:spcPts val="0"/>
+              </a:spcAft>
+              <a:buClr>
+                <a:schemeClr val="accent1"/>
+              </a:buClr>
+              <a:buSzPct val="80000"/>
+              <a:buFont typeface="Wingdings 3" charset="2"/>
+              <a:buChar char=""/>
+              <a:defRPr sz="1200" b="0" i="0" kern="1200">
+                <a:solidFill>
+                  <a:schemeClr val="tx1">
+                    <a:lumMod val="75000"/>
+                    <a:lumOff val="25000"/>
+                  </a:schemeClr>
+                </a:solidFill>
+                <a:latin typeface="+mn-lt"/>
+                <a:ea typeface="+mn-ea"/>
+                <a:cs typeface="+mn-cs"/>
+              </a:defRPr>
+            </a:lvl8pPr>
+            <a:lvl9pPr marL="3886200" indent="-228600" algn="l" defTabSz="457200" rtl="0" eaLnBrk="1" latinLnBrk="0" hangingPunct="1">
+              <a:spcBef>
+                <a:spcPts val="1000"/>
+              </a:spcBef>
+              <a:spcAft>
+                <a:spcPts val="0"/>
+              </a:spcAft>
+              <a:buClr>
+                <a:schemeClr val="accent1"/>
+              </a:buClr>
+              <a:buSzPct val="80000"/>
+              <a:buFont typeface="Wingdings 3" charset="2"/>
+              <a:buChar char=""/>
+              <a:defRPr sz="1200" b="0" i="0" kern="1200">
+                <a:solidFill>
+                  <a:schemeClr val="tx1">
+                    <a:lumMod val="75000"/>
+                    <a:lumOff val="25000"/>
+                  </a:schemeClr>
+                </a:solidFill>
+                <a:latin typeface="+mn-lt"/>
+                <a:ea typeface="+mn-ea"/>
+                <a:cs typeface="+mn-cs"/>
+              </a:defRPr>
+            </a:lvl9pPr>
+          </a:lstStyle>
+          <a:p>
+            <a:pPr>
+              <a:lnSpc>
+                <a:spcPct val="150000"/>
+              </a:lnSpc>
+            </a:pPr>
+            <a:r>
+              <a:rPr lang="en-US" sz="2000" dirty="0"/>
+              <a:t>This calls on the </a:t>
+            </a:r>
+            <a:r>
+              <a:rPr lang="en-US" sz="2000" dirty="0" err="1"/>
+              <a:t>hello_world</a:t>
+            </a:r>
+            <a:r>
+              <a:rPr lang="en-US" sz="2000" dirty="0"/>
+              <a:t> function, using the variable “obj” (a given object) as input</a:t>
+            </a:r>
+            <a:endParaRPr lang="en-CA" sz="1600" dirty="0"/>
+          </a:p>
+          <a:p>
+            <a:pPr>
+              <a:lnSpc>
+                <a:spcPct val="150000"/>
+              </a:lnSpc>
+            </a:pPr>
+            <a:r>
+              <a:rPr lang="en-CA" sz="2000" dirty="0"/>
+              <a:t>The function then presumably acts on obj (performs some sort of operation or calculation on obj) and returns an output</a:t>
+            </a:r>
+            <a:endParaRPr lang="en-US" sz="2800" dirty="0"/>
+          </a:p>
+        </p:txBody>
+      </p:sp>
+      <p:pic>
+        <p:nvPicPr>
+          <p:cNvPr id="9" name="Picture 8">
+            <a:extLst>
+              <a:ext uri="{FF2B5EF4-FFF2-40B4-BE49-F238E27FC236}">
+                <a16:creationId xmlns:a16="http://schemas.microsoft.com/office/drawing/2014/main" id="{1309C165-0145-F10C-4916-7BB28598B78A}"/>
+              </a:ext>
+            </a:extLst>
+          </p:cNvPr>
+          <p:cNvPicPr>
+            <a:picLocks noChangeAspect="1"/>
+          </p:cNvPicPr>
+          <p:nvPr/>
+        </p:nvPicPr>
+        <p:blipFill>
+          <a:blip r:embed="rId2"/>
+          <a:stretch>
+            <a:fillRect/>
+          </a:stretch>
+        </p:blipFill>
+        <p:spPr>
+          <a:xfrm>
+            <a:off x="4181761" y="4021834"/>
+            <a:ext cx="3828475" cy="671936"/>
+          </a:xfrm>
+          <a:prstGeom prst="rect">
+            <a:avLst/>
+          </a:prstGeom>
+        </p:spPr>
+      </p:pic>
+    </p:spTree>
+    <p:extLst>
+      <p:ext uri="{BB962C8B-B14F-4D97-AF65-F5344CB8AC3E}">
+        <p14:creationId xmlns:p14="http://schemas.microsoft.com/office/powerpoint/2010/main" val="3491839098"/>
+      </p:ext>
+    </p:extLst>
+  </p:cSld>
+  <p:clrMapOvr>
+    <a:masterClrMapping/>
+  </p:clrMapOvr>
+</p:sld>
+</file>
+
+<file path=ppt/slides/slide9.xml><?xml version="1.0" encoding="utf-8"?>
+<p:sld xmlns:a="http://schemas.openxmlformats.org/drawingml/2006/main" xmlns:r="http://schemas.openxmlformats.org/officeDocument/2006/relationships" xmlns:p="http://schemas.openxmlformats.org/presentationml/2006/main">
+  <p:cSld>
+    <p:spTree>
+      <p:nvGrpSpPr>
+        <p:cNvPr id="1" name=""/>
+        <p:cNvGrpSpPr/>
+        <p:nvPr/>
+      </p:nvGrpSpPr>
+      <p:grpSpPr>
+        <a:xfrm>
+          <a:off x="0" y="0"/>
+          <a:ext cx="0" cy="0"/>
+          <a:chOff x="0" y="0"/>
+          <a:chExt cx="0" cy="0"/>
+        </a:xfrm>
+      </p:grpSpPr>
+      <p:sp>
+        <p:nvSpPr>
+          <p:cNvPr id="2" name="Title 1">
+            <a:extLst>
+              <a:ext uri="{FF2B5EF4-FFF2-40B4-BE49-F238E27FC236}">
+                <a16:creationId xmlns:a16="http://schemas.microsoft.com/office/drawing/2014/main" id="{DF073902-DF9C-ACC6-D5EF-62FE118C3643}"/>
+              </a:ext>
+            </a:extLst>
+          </p:cNvPr>
+          <p:cNvSpPr>
+            <a:spLocks noGrp="1"/>
+          </p:cNvSpPr>
+          <p:nvPr>
+            <p:ph type="title"/>
+          </p:nvPr>
+        </p:nvSpPr>
+        <p:spPr/>
+        <p:txBody>
+          <a:bodyPr/>
+          <a:lstStyle/>
+          <a:p>
+            <a:r>
+              <a:rPr lang="en-US" dirty="0"/>
+              <a:t>Quick note on Python methods (cont.)</a:t>
+            </a:r>
+            <a:endParaRPr lang="en-CA" dirty="0"/>
+          </a:p>
+        </p:txBody>
+      </p:sp>
+      <p:sp>
+        <p:nvSpPr>
+          <p:cNvPr id="4" name="Content Placeholder 2">
+            <a:extLst>
+              <a:ext uri="{FF2B5EF4-FFF2-40B4-BE49-F238E27FC236}">
+                <a16:creationId xmlns:a16="http://schemas.microsoft.com/office/drawing/2014/main" id="{7363330A-0B9C-3C2C-D425-E0BDA5FB4132}"/>
+              </a:ext>
+            </a:extLst>
+          </p:cNvPr>
+          <p:cNvSpPr>
+            <a:spLocks noGrp="1"/>
+          </p:cNvSpPr>
+          <p:nvPr>
+            <p:ph idx="1"/>
+          </p:nvPr>
+        </p:nvSpPr>
+        <p:spPr>
+          <a:xfrm>
+            <a:off x="969362" y="2228244"/>
+            <a:ext cx="10253275" cy="1917914"/>
+          </a:xfrm>
+        </p:spPr>
+        <p:txBody>
+          <a:bodyPr>
+            <a:normAutofit/>
+          </a:bodyPr>
+          <a:lstStyle/>
+          <a:p>
+            <a:pPr>
+              <a:lnSpc>
+                <a:spcPct val="150000"/>
+              </a:lnSpc>
+            </a:pPr>
+            <a:r>
+              <a:rPr lang="en-CA" sz="2000" dirty="0"/>
+              <a:t>In contrast, to call the </a:t>
+            </a:r>
+            <a:r>
+              <a:rPr lang="en-CA" sz="2000" dirty="0" err="1"/>
+              <a:t>hello_world</a:t>
+            </a:r>
+            <a:r>
+              <a:rPr lang="en-CA" sz="2000" dirty="0"/>
+              <a:t> method, we would use this syntax:</a:t>
+            </a:r>
+            <a:endParaRPr lang="en-CA" sz="1600" dirty="0"/>
+          </a:p>
+        </p:txBody>
+      </p:sp>
+      <p:sp>
+        <p:nvSpPr>
+          <p:cNvPr id="7" name="Content Placeholder 2">
+            <a:extLst>
+              <a:ext uri="{FF2B5EF4-FFF2-40B4-BE49-F238E27FC236}">
+                <a16:creationId xmlns:a16="http://schemas.microsoft.com/office/drawing/2014/main" id="{9F551646-584C-0184-BD35-707A6691C42C}"/>
+              </a:ext>
+            </a:extLst>
+          </p:cNvPr>
+          <p:cNvSpPr txBox="1">
+            <a:spLocks/>
+          </p:cNvSpPr>
+          <p:nvPr/>
+        </p:nvSpPr>
+        <p:spPr>
+          <a:xfrm>
+            <a:off x="969362" y="3824805"/>
+            <a:ext cx="10253275" cy="2849371"/>
+          </a:xfrm>
+          <a:prstGeom prst="rect">
+            <a:avLst/>
+          </a:prstGeom>
+        </p:spPr>
+        <p:txBody>
+          <a:bodyPr vert="horz" lIns="91440" tIns="45720" rIns="91440" bIns="45720" rtlCol="0">
+            <a:normAutofit/>
+          </a:bodyPr>
+          <a:lstStyle>
+            <a:lvl1pPr marL="342900" indent="-342900" algn="l" defTabSz="457200" rtl="0" eaLnBrk="1" latinLnBrk="0" hangingPunct="1">
+              <a:spcBef>
+                <a:spcPts val="1000"/>
+              </a:spcBef>
+              <a:spcAft>
+                <a:spcPts val="0"/>
+              </a:spcAft>
+              <a:buClr>
+                <a:schemeClr val="accent1"/>
+              </a:buClr>
+              <a:buSzPct val="80000"/>
+              <a:buFont typeface="Wingdings 3" charset="2"/>
+              <a:buChar char=""/>
+              <a:defRPr sz="1800" b="0" i="0" kern="1200">
+                <a:solidFill>
+                  <a:schemeClr val="tx1">
+                    <a:lumMod val="75000"/>
+                    <a:lumOff val="25000"/>
+                  </a:schemeClr>
+                </a:solidFill>
+                <a:latin typeface="+mn-lt"/>
+                <a:ea typeface="+mn-ea"/>
+                <a:cs typeface="+mn-cs"/>
+              </a:defRPr>
+            </a:lvl1pPr>
+            <a:lvl2pPr marL="742950" indent="-285750" algn="l" defTabSz="457200" rtl="0" eaLnBrk="1" latinLnBrk="0" hangingPunct="1">
+              <a:spcBef>
+                <a:spcPts val="1000"/>
+              </a:spcBef>
+              <a:spcAft>
+                <a:spcPts val="0"/>
+              </a:spcAft>
+              <a:buClr>
+                <a:schemeClr val="accent1"/>
+              </a:buClr>
+              <a:buSzPct val="80000"/>
+              <a:buFont typeface="Wingdings 3" charset="2"/>
+              <a:buChar char=""/>
+              <a:defRPr sz="1600" b="0" i="0" kern="1200">
+                <a:solidFill>
+                  <a:schemeClr val="tx1">
+                    <a:lumMod val="75000"/>
+                    <a:lumOff val="25000"/>
+                  </a:schemeClr>
+                </a:solidFill>
+                <a:latin typeface="+mn-lt"/>
+                <a:ea typeface="+mn-ea"/>
+                <a:cs typeface="+mn-cs"/>
+              </a:defRPr>
+            </a:lvl2pPr>
+            <a:lvl3pPr marL="1143000" indent="-228600" algn="l" defTabSz="457200" rtl="0" eaLnBrk="1" latinLnBrk="0" hangingPunct="1">
+              <a:spcBef>
+                <a:spcPts val="1000"/>
+              </a:spcBef>
+              <a:spcAft>
+                <a:spcPts val="0"/>
+              </a:spcAft>
+              <a:buClr>
+                <a:schemeClr val="accent1"/>
+              </a:buClr>
+              <a:buSzPct val="80000"/>
+              <a:buFont typeface="Wingdings 3" charset="2"/>
+              <a:buChar char=""/>
+              <a:defRPr sz="1400" b="0" i="0" kern="1200">
+                <a:solidFill>
+                  <a:schemeClr val="tx1">
+                    <a:lumMod val="75000"/>
+                    <a:lumOff val="25000"/>
+                  </a:schemeClr>
+                </a:solidFill>
+                <a:latin typeface="+mn-lt"/>
+                <a:ea typeface="+mn-ea"/>
+                <a:cs typeface="+mn-cs"/>
+              </a:defRPr>
+            </a:lvl3pPr>
+            <a:lvl4pPr marL="1600200" indent="-228600" algn="l" defTabSz="457200" rtl="0" eaLnBrk="1" latinLnBrk="0" hangingPunct="1">
+              <a:spcBef>
+                <a:spcPts val="1000"/>
+              </a:spcBef>
+              <a:spcAft>
+                <a:spcPts val="0"/>
+              </a:spcAft>
+              <a:buClr>
+                <a:schemeClr val="accent1"/>
+              </a:buClr>
+              <a:buSzPct val="80000"/>
+              <a:buFont typeface="Wingdings 3" charset="2"/>
+              <a:buChar char=""/>
+              <a:defRPr sz="1200" b="0" i="0" kern="1200">
+                <a:solidFill>
+                  <a:schemeClr val="tx1">
+                    <a:lumMod val="75000"/>
+                    <a:lumOff val="25000"/>
+                  </a:schemeClr>
+                </a:solidFill>
+                <a:latin typeface="+mn-lt"/>
+                <a:ea typeface="+mn-ea"/>
+                <a:cs typeface="+mn-cs"/>
+              </a:defRPr>
+            </a:lvl4pPr>
+            <a:lvl5pPr marL="2057400" indent="-228600" algn="l" defTabSz="457200" rtl="0" eaLnBrk="1" latinLnBrk="0" hangingPunct="1">
+              <a:spcBef>
+                <a:spcPts val="1000"/>
+              </a:spcBef>
+              <a:spcAft>
+                <a:spcPts val="0"/>
+              </a:spcAft>
+              <a:buClr>
+                <a:schemeClr val="accent1"/>
+              </a:buClr>
+              <a:buSzPct val="80000"/>
+              <a:buFont typeface="Wingdings 3" charset="2"/>
+              <a:buChar char=""/>
+              <a:defRPr sz="1200" b="0" i="0" kern="1200">
+                <a:solidFill>
+                  <a:schemeClr val="tx1">
+                    <a:lumMod val="75000"/>
+                    <a:lumOff val="25000"/>
+                  </a:schemeClr>
+                </a:solidFill>
+                <a:latin typeface="+mn-lt"/>
+                <a:ea typeface="+mn-ea"/>
+                <a:cs typeface="+mn-cs"/>
+              </a:defRPr>
+            </a:lvl5pPr>
+            <a:lvl6pPr marL="2514600" indent="-228600" algn="l" defTabSz="457200" rtl="0" eaLnBrk="1" latinLnBrk="0" hangingPunct="1">
+              <a:spcBef>
+                <a:spcPts val="1000"/>
+              </a:spcBef>
+              <a:spcAft>
+                <a:spcPts val="0"/>
+              </a:spcAft>
+              <a:buClr>
+                <a:schemeClr val="accent1"/>
+              </a:buClr>
+              <a:buSzPct val="80000"/>
+              <a:buFont typeface="Wingdings 3" charset="2"/>
+              <a:buChar char=""/>
+              <a:defRPr sz="1200" b="0" i="0" kern="1200">
+                <a:solidFill>
+                  <a:schemeClr val="tx1">
+                    <a:lumMod val="75000"/>
+                    <a:lumOff val="25000"/>
+                  </a:schemeClr>
+                </a:solidFill>
+                <a:latin typeface="+mn-lt"/>
+                <a:ea typeface="+mn-ea"/>
+                <a:cs typeface="+mn-cs"/>
+              </a:defRPr>
+            </a:lvl6pPr>
+            <a:lvl7pPr marL="2971800" indent="-228600" algn="l" defTabSz="457200" rtl="0" eaLnBrk="1" latinLnBrk="0" hangingPunct="1">
+              <a:spcBef>
+                <a:spcPts val="1000"/>
+              </a:spcBef>
+              <a:spcAft>
+                <a:spcPts val="0"/>
+              </a:spcAft>
+              <a:buClr>
+                <a:schemeClr val="accent1"/>
+              </a:buClr>
+              <a:buSzPct val="80000"/>
+              <a:buFont typeface="Wingdings 3" charset="2"/>
+              <a:buChar char=""/>
+              <a:defRPr sz="1200" b="0" i="0" kern="1200">
+                <a:solidFill>
+                  <a:schemeClr val="tx1">
+                    <a:lumMod val="75000"/>
+                    <a:lumOff val="25000"/>
+                  </a:schemeClr>
+                </a:solidFill>
+                <a:latin typeface="+mn-lt"/>
+                <a:ea typeface="+mn-ea"/>
+                <a:cs typeface="+mn-cs"/>
+              </a:defRPr>
+            </a:lvl7pPr>
+            <a:lvl8pPr marL="3429000" indent="-228600" algn="l" defTabSz="457200" rtl="0" eaLnBrk="1" latinLnBrk="0" hangingPunct="1">
+              <a:spcBef>
+                <a:spcPts val="1000"/>
+              </a:spcBef>
+              <a:spcAft>
+                <a:spcPts val="0"/>
+              </a:spcAft>
+              <a:buClr>
+                <a:schemeClr val="accent1"/>
+              </a:buClr>
+              <a:buSzPct val="80000"/>
+              <a:buFont typeface="Wingdings 3" charset="2"/>
+              <a:buChar char=""/>
+              <a:defRPr sz="1200" b="0" i="0" kern="1200">
+                <a:solidFill>
+                  <a:schemeClr val="tx1">
+                    <a:lumMod val="75000"/>
+                    <a:lumOff val="25000"/>
+                  </a:schemeClr>
+                </a:solidFill>
+                <a:latin typeface="+mn-lt"/>
+                <a:ea typeface="+mn-ea"/>
+                <a:cs typeface="+mn-cs"/>
+              </a:defRPr>
+            </a:lvl8pPr>
+            <a:lvl9pPr marL="3886200" indent="-228600" algn="l" defTabSz="457200" rtl="0" eaLnBrk="1" latinLnBrk="0" hangingPunct="1">
+              <a:spcBef>
+                <a:spcPts val="1000"/>
+              </a:spcBef>
+              <a:spcAft>
+                <a:spcPts val="0"/>
+              </a:spcAft>
+              <a:buClr>
+                <a:schemeClr val="accent1"/>
+              </a:buClr>
+              <a:buSzPct val="80000"/>
+              <a:buFont typeface="Wingdings 3" charset="2"/>
+              <a:buChar char=""/>
+              <a:defRPr sz="1200" b="0" i="0" kern="1200">
+                <a:solidFill>
+                  <a:schemeClr val="tx1">
+                    <a:lumMod val="75000"/>
+                    <a:lumOff val="25000"/>
+                  </a:schemeClr>
+                </a:solidFill>
+                <a:latin typeface="+mn-lt"/>
+                <a:ea typeface="+mn-ea"/>
+                <a:cs typeface="+mn-cs"/>
+              </a:defRPr>
+            </a:lvl9pPr>
+          </a:lstStyle>
+          <a:p>
+            <a:pPr>
+              <a:lnSpc>
+                <a:spcPct val="150000"/>
+              </a:lnSpc>
+            </a:pPr>
+            <a:r>
+              <a:rPr lang="en-US" sz="2000" dirty="0"/>
+              <a:t>This uses the </a:t>
+            </a:r>
+            <a:r>
+              <a:rPr lang="en-US" sz="2000" dirty="0" err="1"/>
+              <a:t>hello_world</a:t>
+            </a:r>
+            <a:r>
+              <a:rPr lang="en-US" sz="2000" dirty="0"/>
+              <a:t> method on “obj” (a given object)</a:t>
+            </a:r>
+            <a:endParaRPr lang="en-US" sz="2800" dirty="0"/>
+          </a:p>
+          <a:p>
+            <a:pPr>
+              <a:lnSpc>
+                <a:spcPct val="150000"/>
+              </a:lnSpc>
+            </a:pPr>
+            <a:r>
+              <a:rPr lang="en-US" sz="2000" dirty="0"/>
+              <a:t>The method acts directly on obj and doesn’t necessarily produce an output</a:t>
+            </a:r>
+          </a:p>
+          <a:p>
+            <a:pPr>
+              <a:lnSpc>
+                <a:spcPct val="150000"/>
+              </a:lnSpc>
+            </a:pPr>
+            <a:r>
+              <a:rPr lang="en-US" sz="2000" dirty="0"/>
+              <a:t>i.e. It can directly change the value of obj</a:t>
+            </a:r>
+          </a:p>
+          <a:p>
+            <a:pPr>
+              <a:lnSpc>
+                <a:spcPct val="150000"/>
+              </a:lnSpc>
+            </a:pPr>
+            <a:r>
+              <a:rPr lang="en-US" sz="2000" dirty="0"/>
+              <a:t>See next slide for example</a:t>
+            </a:r>
+            <a:endParaRPr lang="en-US" sz="1600" dirty="0"/>
+          </a:p>
+        </p:txBody>
+      </p:sp>
+      <p:pic>
+        <p:nvPicPr>
+          <p:cNvPr id="5" name="Picture 4">
+            <a:extLst>
+              <a:ext uri="{FF2B5EF4-FFF2-40B4-BE49-F238E27FC236}">
+                <a16:creationId xmlns:a16="http://schemas.microsoft.com/office/drawing/2014/main" id="{7B6F8DEB-EDE3-95C9-4EE7-F1BE420D7756}"/>
+              </a:ext>
+            </a:extLst>
+          </p:cNvPr>
+          <p:cNvPicPr>
+            <a:picLocks noChangeAspect="1"/>
+          </p:cNvPicPr>
+          <p:nvPr/>
+        </p:nvPicPr>
+        <p:blipFill>
+          <a:blip r:embed="rId2"/>
+          <a:stretch>
+            <a:fillRect/>
+          </a:stretch>
+        </p:blipFill>
+        <p:spPr>
+          <a:xfrm>
+            <a:off x="4205027" y="2987002"/>
+            <a:ext cx="3781944" cy="765218"/>
+          </a:xfrm>
+          <a:prstGeom prst="rect">
+            <a:avLst/>
+          </a:prstGeom>
+        </p:spPr>
+      </p:pic>
+    </p:spTree>
+    <p:extLst>
+      <p:ext uri="{BB962C8B-B14F-4D97-AF65-F5344CB8AC3E}">
+        <p14:creationId xmlns:p14="http://schemas.microsoft.com/office/powerpoint/2010/main" val="1976633636"/>
       </p:ext>
     </p:extLst>
   </p:cSld>

</xml_diff>

<commit_message>
Finished Week 6 PPT and Exercises. Also wrote some guidelines on how to fix git merge conflicts
</commit_message>
<xml_diff>
--- a/PPTs/Week5.pptx
+++ b/PPTs/Week5.pptx
@@ -462,7 +462,7 @@
           <a:p>
             <a:fld id="{911D48D3-D9A0-44A7-B806-1FECC2308CB0}" type="datetimeFigureOut">
               <a:rPr lang="en-CA" smtClean="0"/>
-              <a:t>2022-07-21</a:t>
+              <a:t>2022-07-25</a:t>
             </a:fld>
             <a:endParaRPr lang="en-CA"/>
           </a:p>
@@ -1550,7 +1550,7 @@
           <a:p>
             <a:fld id="{911D48D3-D9A0-44A7-B806-1FECC2308CB0}" type="datetimeFigureOut">
               <a:rPr lang="en-CA" smtClean="0"/>
-              <a:t>2022-07-21</a:t>
+              <a:t>2022-07-25</a:t>
             </a:fld>
             <a:endParaRPr lang="en-CA"/>
           </a:p>
@@ -2530,7 +2530,7 @@
           <a:p>
             <a:fld id="{911D48D3-D9A0-44A7-B806-1FECC2308CB0}" type="datetimeFigureOut">
               <a:rPr lang="en-CA" smtClean="0"/>
-              <a:t>2022-07-21</a:t>
+              <a:t>2022-07-25</a:t>
             </a:fld>
             <a:endParaRPr lang="en-CA"/>
           </a:p>
@@ -3664,7 +3664,7 @@
           <a:p>
             <a:fld id="{911D48D3-D9A0-44A7-B806-1FECC2308CB0}" type="datetimeFigureOut">
               <a:rPr lang="en-CA" smtClean="0"/>
-              <a:t>2022-07-21</a:t>
+              <a:t>2022-07-25</a:t>
             </a:fld>
             <a:endParaRPr lang="en-CA"/>
           </a:p>
@@ -4697,7 +4697,7 @@
           <a:p>
             <a:fld id="{911D48D3-D9A0-44A7-B806-1FECC2308CB0}" type="datetimeFigureOut">
               <a:rPr lang="en-CA" smtClean="0"/>
-              <a:t>2022-07-21</a:t>
+              <a:t>2022-07-25</a:t>
             </a:fld>
             <a:endParaRPr lang="en-CA"/>
           </a:p>
@@ -5357,7 +5357,7 @@
           <a:p>
             <a:fld id="{911D48D3-D9A0-44A7-B806-1FECC2308CB0}" type="datetimeFigureOut">
               <a:rPr lang="en-CA" smtClean="0"/>
-              <a:t>2022-07-21</a:t>
+              <a:t>2022-07-25</a:t>
             </a:fld>
             <a:endParaRPr lang="en-CA"/>
           </a:p>
@@ -6218,7 +6218,7 @@
           <a:p>
             <a:fld id="{911D48D3-D9A0-44A7-B806-1FECC2308CB0}" type="datetimeFigureOut">
               <a:rPr lang="en-CA" smtClean="0"/>
-              <a:t>2022-07-21</a:t>
+              <a:t>2022-07-25</a:t>
             </a:fld>
             <a:endParaRPr lang="en-CA"/>
           </a:p>
@@ -6408,7 +6408,7 @@
           <a:p>
             <a:fld id="{911D48D3-D9A0-44A7-B806-1FECC2308CB0}" type="datetimeFigureOut">
               <a:rPr lang="en-CA" smtClean="0"/>
-              <a:t>2022-07-21</a:t>
+              <a:t>2022-07-25</a:t>
             </a:fld>
             <a:endParaRPr lang="en-CA"/>
           </a:p>
@@ -7380,7 +7380,7 @@
           <a:p>
             <a:fld id="{911D48D3-D9A0-44A7-B806-1FECC2308CB0}" type="datetimeFigureOut">
               <a:rPr lang="en-CA" smtClean="0"/>
-              <a:t>2022-07-21</a:t>
+              <a:t>2022-07-25</a:t>
             </a:fld>
             <a:endParaRPr lang="en-CA"/>
           </a:p>
@@ -7591,7 +7591,7 @@
           <a:p>
             <a:fld id="{911D48D3-D9A0-44A7-B806-1FECC2308CB0}" type="datetimeFigureOut">
               <a:rPr lang="en-CA" smtClean="0"/>
-              <a:t>2022-07-21</a:t>
+              <a:t>2022-07-25</a:t>
             </a:fld>
             <a:endParaRPr lang="en-CA"/>
           </a:p>
@@ -8625,7 +8625,7 @@
           <a:p>
             <a:fld id="{911D48D3-D9A0-44A7-B806-1FECC2308CB0}" type="datetimeFigureOut">
               <a:rPr lang="en-CA" smtClean="0"/>
-              <a:t>2022-07-21</a:t>
+              <a:t>2022-07-25</a:t>
             </a:fld>
             <a:endParaRPr lang="en-CA"/>
           </a:p>
@@ -8897,7 +8897,7 @@
           <a:p>
             <a:fld id="{911D48D3-D9A0-44A7-B806-1FECC2308CB0}" type="datetimeFigureOut">
               <a:rPr lang="en-CA" smtClean="0"/>
-              <a:t>2022-07-21</a:t>
+              <a:t>2022-07-25</a:t>
             </a:fld>
             <a:endParaRPr lang="en-CA"/>
           </a:p>
@@ -9307,7 +9307,7 @@
           <a:p>
             <a:fld id="{911D48D3-D9A0-44A7-B806-1FECC2308CB0}" type="datetimeFigureOut">
               <a:rPr lang="en-CA" smtClean="0"/>
-              <a:t>2022-07-21</a:t>
+              <a:t>2022-07-25</a:t>
             </a:fld>
             <a:endParaRPr lang="en-CA"/>
           </a:p>
@@ -9434,7 +9434,7 @@
           <a:p>
             <a:fld id="{911D48D3-D9A0-44A7-B806-1FECC2308CB0}" type="datetimeFigureOut">
               <a:rPr lang="en-CA" smtClean="0"/>
-              <a:t>2022-07-21</a:t>
+              <a:t>2022-07-25</a:t>
             </a:fld>
             <a:endParaRPr lang="en-CA"/>
           </a:p>
@@ -9529,7 +9529,7 @@
           <a:p>
             <a:fld id="{911D48D3-D9A0-44A7-B806-1FECC2308CB0}" type="datetimeFigureOut">
               <a:rPr lang="en-CA" smtClean="0"/>
-              <a:t>2022-07-21</a:t>
+              <a:t>2022-07-25</a:t>
             </a:fld>
             <a:endParaRPr lang="en-CA"/>
           </a:p>
@@ -10610,7 +10610,7 @@
           <a:p>
             <a:fld id="{911D48D3-D9A0-44A7-B806-1FECC2308CB0}" type="datetimeFigureOut">
               <a:rPr lang="en-CA" smtClean="0"/>
-              <a:t>2022-07-21</a:t>
+              <a:t>2022-07-25</a:t>
             </a:fld>
             <a:endParaRPr lang="en-CA"/>
           </a:p>
@@ -11718,7 +11718,7 @@
           <a:p>
             <a:fld id="{911D48D3-D9A0-44A7-B806-1FECC2308CB0}" type="datetimeFigureOut">
               <a:rPr lang="en-CA" smtClean="0"/>
-              <a:t>2022-07-21</a:t>
+              <a:t>2022-07-25</a:t>
             </a:fld>
             <a:endParaRPr lang="en-CA"/>
           </a:p>
@@ -12715,7 +12715,7 @@
           <a:p>
             <a:fld id="{911D48D3-D9A0-44A7-B806-1FECC2308CB0}" type="datetimeFigureOut">
               <a:rPr lang="en-CA" smtClean="0"/>
-              <a:t>2022-07-21</a:t>
+              <a:t>2022-07-25</a:t>
             </a:fld>
             <a:endParaRPr lang="en-CA"/>
           </a:p>
@@ -14324,8 +14324,8 @@
         </p:nvSpPr>
         <p:spPr>
           <a:xfrm>
-            <a:off x="1217707" y="5048000"/>
-            <a:ext cx="4752787" cy="1361766"/>
+            <a:off x="1217707" y="5047999"/>
+            <a:ext cx="4976905" cy="1672665"/>
           </a:xfrm>
           <a:prstGeom prst="rect">
             <a:avLst/>
@@ -14576,6 +14576,13 @@
               <a:t>Returns the shape of an n-dimensional array (array of arrays)</a:t>
             </a:r>
           </a:p>
+          <a:p>
+            <a:pPr lvl="2"/>
+            <a:r>
+              <a:rPr lang="en-US" sz="1600" dirty="0"/>
+              <a:t>i.e. the number of rows and columns</a:t>
+            </a:r>
+          </a:p>
         </p:txBody>
       </p:sp>
       <p:pic>
@@ -14600,7 +14607,7 @@
         </p:blipFill>
         <p:spPr>
           <a:xfrm>
-            <a:off x="5970494" y="5135577"/>
+            <a:off x="6107014" y="5190441"/>
             <a:ext cx="2634508" cy="1337645"/>
           </a:xfrm>
           <a:prstGeom prst="rect">
@@ -17135,7 +17142,7 @@
         </p:nvSpPr>
         <p:spPr>
           <a:xfrm>
-            <a:off x="1231154" y="2266042"/>
+            <a:off x="1154954" y="2041925"/>
             <a:ext cx="8825659" cy="4515757"/>
           </a:xfrm>
         </p:spPr>
@@ -17461,7 +17468,7 @@
         </p:nvSpPr>
         <p:spPr>
           <a:xfrm>
-            <a:off x="1154954" y="2329543"/>
+            <a:off x="1154954" y="2159213"/>
             <a:ext cx="9360646" cy="4528457"/>
           </a:xfrm>
         </p:spPr>
@@ -17628,7 +17635,7 @@
         </p:nvSpPr>
         <p:spPr>
           <a:xfrm>
-            <a:off x="969362" y="2331357"/>
+            <a:off x="969362" y="2169993"/>
             <a:ext cx="10253275" cy="4526643"/>
           </a:xfrm>
         </p:spPr>
@@ -17904,7 +17911,7 @@
         </p:nvSpPr>
         <p:spPr>
           <a:xfrm>
-            <a:off x="969362" y="4693770"/>
+            <a:off x="969360" y="4897697"/>
             <a:ext cx="10253275" cy="2084102"/>
           </a:xfrm>
           <a:prstGeom prst="rect">
@@ -18143,11 +18150,6 @@
             </a:lvl9pPr>
           </a:lstStyle>
           <a:p>
-            <a:pPr>
-              <a:lnSpc>
-                <a:spcPct val="150000"/>
-              </a:lnSpc>
-            </a:pPr>
             <a:r>
               <a:rPr lang="en-US" sz="2000" dirty="0"/>
               <a:t>This calls on the </a:t>
@@ -18163,11 +18165,6 @@
             <a:endParaRPr lang="en-CA" sz="1600" dirty="0"/>
           </a:p>
           <a:p>
-            <a:pPr>
-              <a:lnSpc>
-                <a:spcPct val="150000"/>
-              </a:lnSpc>
-            </a:pPr>
             <a:r>
               <a:rPr lang="en-CA" sz="2000" dirty="0"/>
               <a:t>The function then presumably acts on obj (performs some sort of operation or calculation on obj) and returns an output</a:t>

</xml_diff>